<commit_message>
Outlier Detection in Condition Monitoring Presentation
</commit_message>
<xml_diff>
--- a/Documentation/SemiSupervisedMethodsInConditionMonitoring2.pptx
+++ b/Documentation/SemiSupervisedMethodsInConditionMonitoring2.pptx
@@ -3330,7 +3330,7 @@
             <a:fld id="{0BAA8257-9383-4363-9C79-3E8643B51DA6}" type="datetime1">
               <a:rPr lang="de-DE"/>
               <a:pPr/>
-              <a:t>22.07.2013</a:t>
+              <a:t>23.07.2013</a:t>
             </a:fld>
             <a:endParaRPr lang="de-DE"/>
           </a:p>
@@ -3609,7 +3609,7 @@
             <a:fld id="{2B2690EF-7428-44E3-8C6D-0DF4E66EF3AB}" type="datetime1">
               <a:rPr lang="de-DE"/>
               <a:pPr/>
-              <a:t>22.07.2013</a:t>
+              <a:t>23.07.2013</a:t>
             </a:fld>
             <a:endParaRPr lang="de-DE"/>
           </a:p>
@@ -4494,7 +4494,7 @@
             <a:fld id="{80C9CFB2-C2A2-466F-9A9D-55207007DCAA}" type="datetime1">
               <a:rPr lang="de-DE"/>
               <a:pPr/>
-              <a:t>22.07.2013</a:t>
+              <a:t>23.07.2013</a:t>
             </a:fld>
             <a:endParaRPr lang="de-DE"/>
           </a:p>
@@ -4707,7 +4707,7 @@
             <a:fld id="{70843FFB-B759-40E5-BDA0-DA7E379EA0FE}" type="datetime1">
               <a:rPr lang="de-DE"/>
               <a:pPr/>
-              <a:t>22.07.2013</a:t>
+              <a:t>23.07.2013</a:t>
             </a:fld>
             <a:endParaRPr lang="de-DE"/>
           </a:p>
@@ -4914,7 +4914,7 @@
             <a:fld id="{03B44CDA-7D88-4264-B0E0-D9AD28CBE73B}" type="datetime1">
               <a:rPr lang="de-DE"/>
               <a:pPr/>
-              <a:t>22.07.2013</a:t>
+              <a:t>23.07.2013</a:t>
             </a:fld>
             <a:endParaRPr lang="de-DE"/>
           </a:p>
@@ -5139,7 +5139,7 @@
             <a:fld id="{1F1E0E69-EC8C-4B55-B000-A21B4F200C17}" type="datetime1">
               <a:rPr lang="de-DE"/>
               <a:pPr/>
-              <a:t>22.07.2013</a:t>
+              <a:t>23.07.2013</a:t>
             </a:fld>
             <a:endParaRPr lang="de-DE"/>
           </a:p>
@@ -5460,7 +5460,7 @@
             <a:fld id="{3445AF6D-F46D-415C-AD3E-77E0038AE70E}" type="datetime1">
               <a:rPr lang="de-DE"/>
               <a:pPr/>
-              <a:t>22.07.2013</a:t>
+              <a:t>23.07.2013</a:t>
             </a:fld>
             <a:endParaRPr lang="de-DE"/>
           </a:p>
@@ -5920,7 +5920,7 @@
             <a:fld id="{B73EFD57-F3EC-46D7-99C5-D27763E7C6E7}" type="datetime1">
               <a:rPr lang="de-DE"/>
               <a:pPr/>
-              <a:t>22.07.2013</a:t>
+              <a:t>23.07.2013</a:t>
             </a:fld>
             <a:endParaRPr lang="de-DE"/>
           </a:p>
@@ -6071,7 +6071,7 @@
             <a:fld id="{D10A3354-FE10-4AE5-BC69-7D7B7DD72453}" type="datetime1">
               <a:rPr lang="de-DE"/>
               <a:pPr/>
-              <a:t>22.07.2013</a:t>
+              <a:t>23.07.2013</a:t>
             </a:fld>
             <a:endParaRPr lang="de-DE"/>
           </a:p>
@@ -6199,7 +6199,7 @@
             <a:fld id="{15AA6C8F-EBA3-4DD5-BD96-4D9492A5DAA3}" type="datetime1">
               <a:rPr lang="de-DE"/>
               <a:pPr/>
-              <a:t>22.07.2013</a:t>
+              <a:t>23.07.2013</a:t>
             </a:fld>
             <a:endParaRPr lang="de-DE"/>
           </a:p>
@@ -6509,7 +6509,7 @@
             <a:fld id="{A0AEE9D6-2597-4638-9A15-688030BA3E82}" type="datetime1">
               <a:rPr lang="de-DE"/>
               <a:pPr/>
-              <a:t>22.07.2013</a:t>
+              <a:t>23.07.2013</a:t>
             </a:fld>
             <a:endParaRPr lang="de-DE"/>
           </a:p>
@@ -6799,7 +6799,7 @@
             <a:fld id="{B1851BDD-97EF-496F-A69C-E8C566C1C58A}" type="datetime1">
               <a:rPr lang="de-DE"/>
               <a:pPr/>
-              <a:t>22.07.2013</a:t>
+              <a:t>23.07.2013</a:t>
             </a:fld>
             <a:endParaRPr lang="de-DE"/>
           </a:p>
@@ -7165,7 +7165,7 @@
             <a:fld id="{7FDAFA23-E311-4378-990F-5FCA161EBB96}" type="datetime1">
               <a:rPr lang="de-DE"/>
               <a:pPr/>
-              <a:t>22.07.2013</a:t>
+              <a:t>23.07.2013</a:t>
             </a:fld>
             <a:endParaRPr lang="de-DE"/>
           </a:p>
@@ -8616,7 +8616,7 @@
             <a:fld id="{03B44CDA-7D88-4264-B0E0-D9AD28CBE73B}" type="datetime1">
               <a:rPr lang="de-DE" smtClean="0"/>
               <a:pPr/>
-              <a:t>22.07.2013</a:t>
+              <a:t>23.07.2013</a:t>
             </a:fld>
             <a:endParaRPr lang="de-DE"/>
           </a:p>
@@ -8640,11 +8640,42 @@
             <a:pPr>
               <a:defRPr/>
             </a:pPr>
-            <a:r>
-              <a:rPr lang="de-DE" smtClean="0"/>
-              <a:t>Präsentationstitel</a:t>
-            </a:r>
-            <a:endParaRPr lang="de-DE"/>
+            <a:endParaRPr lang="de-DE" dirty="0" smtClean="0"/>
+          </a:p>
+          <a:p>
+            <a:pPr>
+              <a:defRPr/>
+            </a:pPr>
+            <a:r>
+              <a:rPr lang="de-DE" dirty="0" err="1" smtClean="0"/>
+              <a:t>Outlier</a:t>
+            </a:r>
+            <a:r>
+              <a:rPr lang="de-DE" dirty="0" smtClean="0"/>
+              <a:t> </a:t>
+            </a:r>
+            <a:r>
+              <a:rPr lang="de-DE" dirty="0" err="1"/>
+              <a:t>Detection</a:t>
+            </a:r>
+            <a:r>
+              <a:rPr lang="de-DE" dirty="0"/>
+              <a:t> in </a:t>
+            </a:r>
+            <a:r>
+              <a:rPr lang="de-DE" dirty="0" err="1"/>
+              <a:t>Condition</a:t>
+            </a:r>
+            <a:r>
+              <a:rPr lang="de-DE" dirty="0"/>
+              <a:t> Monitoring</a:t>
+            </a:r>
+          </a:p>
+          <a:p>
+            <a:pPr>
+              <a:defRPr/>
+            </a:pPr>
+            <a:endParaRPr lang="de-DE" dirty="0" smtClean="0"/>
           </a:p>
         </p:txBody>
       </p:sp>
@@ -8872,7 +8903,7 @@
             </a:r>
             <a:r>
               <a:rPr lang="de-DE" dirty="0" err="1" smtClean="0"/>
-              <a:t>transfomation</a:t>
+              <a:t>transformation</a:t>
             </a:r>
             <a:r>
               <a:rPr lang="de-DE" dirty="0" smtClean="0"/>
@@ -8902,8 +8933,12 @@
           </a:p>
           <a:p>
             <a:r>
+              <a:rPr lang="de-DE" dirty="0" smtClean="0"/>
+              <a:t>Mel</a:t>
+            </a:r>
+            <a:r>
               <a:rPr lang="de-DE" i="1" dirty="0" smtClean="0"/>
-              <a:t>Mel </a:t>
+              <a:t> </a:t>
             </a:r>
             <a:r>
               <a:rPr lang="de-DE" dirty="0" err="1" smtClean="0"/>
@@ -9019,12 +9054,8 @@
           </a:p>
           <a:p>
             <a:r>
-              <a:rPr lang="de-DE" dirty="0" err="1" smtClean="0"/>
-              <a:t>Conversion</a:t>
-            </a:r>
-            <a:r>
               <a:rPr lang="de-DE" dirty="0" smtClean="0"/>
-              <a:t> </a:t>
+              <a:t>Transformation </a:t>
             </a:r>
             <a:r>
               <a:rPr lang="de-DE" dirty="0" err="1" smtClean="0"/>
@@ -9083,24 +9114,20 @@
               <a:t> </a:t>
             </a:r>
             <a:r>
-              <a:rPr lang="de-DE" i="1" dirty="0" err="1" smtClean="0"/>
-              <a:t>discrete</a:t>
-            </a:r>
-            <a:r>
-              <a:rPr lang="de-DE" i="1" dirty="0" smtClean="0"/>
-              <a:t> </a:t>
-            </a:r>
-            <a:r>
-              <a:rPr lang="de-DE" i="1" dirty="0" err="1" smtClean="0"/>
-              <a:t>cosine</a:t>
-            </a:r>
-            <a:r>
-              <a:rPr lang="de-DE" i="1" dirty="0" smtClean="0"/>
-              <a:t> </a:t>
-            </a:r>
-            <a:r>
-              <a:rPr lang="de-DE" i="1" dirty="0" err="1" smtClean="0"/>
-              <a:t>transform</a:t>
+              <a:rPr lang="de-DE" dirty="0" err="1" smtClean="0"/>
+              <a:t>Discrete</a:t>
+            </a:r>
+            <a:r>
+              <a:rPr lang="de-DE" dirty="0" smtClean="0"/>
+              <a:t> </a:t>
+            </a:r>
+            <a:r>
+              <a:rPr lang="de-DE" dirty="0" err="1" smtClean="0"/>
+              <a:t>Cosine</a:t>
+            </a:r>
+            <a:r>
+              <a:rPr lang="de-DE" dirty="0" smtClean="0"/>
+              <a:t> Transform</a:t>
             </a:r>
             <a:endParaRPr lang="de-DE" dirty="0" smtClean="0"/>
           </a:p>
@@ -9127,7 +9154,7 @@
             <a:fld id="{03B44CDA-7D88-4264-B0E0-D9AD28CBE73B}" type="datetime1">
               <a:rPr lang="de-DE" smtClean="0"/>
               <a:pPr/>
-              <a:t>22.07.2013</a:t>
+              <a:t>23.07.2013</a:t>
             </a:fld>
             <a:endParaRPr lang="de-DE"/>
           </a:p>
@@ -9151,11 +9178,42 @@
             <a:pPr>
               <a:defRPr/>
             </a:pPr>
-            <a:r>
-              <a:rPr lang="de-DE" smtClean="0"/>
-              <a:t>Präsentationstitel</a:t>
-            </a:r>
-            <a:endParaRPr lang="de-DE"/>
+            <a:endParaRPr lang="de-DE" dirty="0" smtClean="0"/>
+          </a:p>
+          <a:p>
+            <a:pPr>
+              <a:defRPr/>
+            </a:pPr>
+            <a:r>
+              <a:rPr lang="de-DE" dirty="0" err="1" smtClean="0"/>
+              <a:t>Outlier</a:t>
+            </a:r>
+            <a:r>
+              <a:rPr lang="de-DE" dirty="0" smtClean="0"/>
+              <a:t> </a:t>
+            </a:r>
+            <a:r>
+              <a:rPr lang="de-DE" dirty="0" err="1"/>
+              <a:t>Detection</a:t>
+            </a:r>
+            <a:r>
+              <a:rPr lang="de-DE" dirty="0"/>
+              <a:t> in </a:t>
+            </a:r>
+            <a:r>
+              <a:rPr lang="de-DE" dirty="0" err="1"/>
+              <a:t>Condition</a:t>
+            </a:r>
+            <a:r>
+              <a:rPr lang="de-DE" dirty="0"/>
+              <a:t> Monitoring</a:t>
+            </a:r>
+          </a:p>
+          <a:p>
+            <a:pPr>
+              <a:defRPr/>
+            </a:pPr>
+            <a:endParaRPr lang="de-DE" dirty="0"/>
           </a:p>
         </p:txBody>
       </p:sp>
@@ -9491,11 +9549,7 @@
             </a:r>
             <a:r>
               <a:rPr lang="de-DE" dirty="0" smtClean="0"/>
-              <a:t> </a:t>
-            </a:r>
-            <a:r>
-              <a:rPr lang="de-DE" dirty="0" smtClean="0"/>
-              <a:t>1 </a:t>
+              <a:t> 1 </a:t>
             </a:r>
             <a:r>
               <a:rPr lang="de-DE" dirty="0" err="1" smtClean="0"/>
@@ -9503,11 +9557,7 @@
             </a:r>
             <a:r>
               <a:rPr lang="de-DE" dirty="0" smtClean="0"/>
-              <a:t> </a:t>
-            </a:r>
-            <a:r>
-              <a:rPr lang="de-DE" dirty="0" smtClean="0"/>
-              <a:t>2</a:t>
+              <a:t> 2</a:t>
             </a:r>
             <a:endParaRPr lang="de-DE" dirty="0"/>
           </a:p>
@@ -9523,6 +9573,14 @@
             <a:r>
               <a:rPr lang="de-DE" dirty="0" err="1" smtClean="0"/>
               <a:t>methods</a:t>
+            </a:r>
+            <a:r>
+              <a:rPr lang="de-DE" dirty="0" smtClean="0"/>
+              <a:t> </a:t>
+            </a:r>
+            <a:r>
+              <a:rPr lang="de-DE" dirty="0" err="1" smtClean="0"/>
+              <a:t>exist</a:t>
             </a:r>
             <a:r>
               <a:rPr lang="de-DE" dirty="0" smtClean="0"/>
@@ -9656,7 +9714,7 @@
             <a:fld id="{03B44CDA-7D88-4264-B0E0-D9AD28CBE73B}" type="datetime1">
               <a:rPr lang="de-DE" smtClean="0"/>
               <a:pPr/>
-              <a:t>22.07.2013</a:t>
+              <a:t>23.07.2013</a:t>
             </a:fld>
             <a:endParaRPr lang="de-DE"/>
           </a:p>
@@ -9680,11 +9738,42 @@
             <a:pPr>
               <a:defRPr/>
             </a:pPr>
-            <a:r>
-              <a:rPr lang="de-DE" smtClean="0"/>
-              <a:t>Präsentationstitel</a:t>
-            </a:r>
-            <a:endParaRPr lang="de-DE"/>
+            <a:endParaRPr lang="de-DE" dirty="0" smtClean="0"/>
+          </a:p>
+          <a:p>
+            <a:pPr>
+              <a:defRPr/>
+            </a:pPr>
+            <a:r>
+              <a:rPr lang="de-DE" dirty="0" err="1" smtClean="0"/>
+              <a:t>Outlier</a:t>
+            </a:r>
+            <a:r>
+              <a:rPr lang="de-DE" dirty="0" smtClean="0"/>
+              <a:t> </a:t>
+            </a:r>
+            <a:r>
+              <a:rPr lang="de-DE" dirty="0" err="1"/>
+              <a:t>Detection</a:t>
+            </a:r>
+            <a:r>
+              <a:rPr lang="de-DE" dirty="0"/>
+              <a:t> in </a:t>
+            </a:r>
+            <a:r>
+              <a:rPr lang="de-DE" dirty="0" err="1"/>
+              <a:t>Condition</a:t>
+            </a:r>
+            <a:r>
+              <a:rPr lang="de-DE" dirty="0"/>
+              <a:t> Monitoring</a:t>
+            </a:r>
+          </a:p>
+          <a:p>
+            <a:pPr>
+              <a:defRPr/>
+            </a:pPr>
+            <a:endParaRPr lang="de-DE" dirty="0"/>
           </a:p>
         </p:txBody>
       </p:sp>
@@ -9823,7 +9912,7 @@
             <a:fld id="{03B44CDA-7D88-4264-B0E0-D9AD28CBE73B}" type="datetime1">
               <a:rPr lang="de-DE" smtClean="0"/>
               <a:pPr/>
-              <a:t>22.07.2013</a:t>
+              <a:t>23.07.2013</a:t>
             </a:fld>
             <a:endParaRPr lang="de-DE"/>
           </a:p>
@@ -9847,11 +9936,42 @@
             <a:pPr>
               <a:defRPr/>
             </a:pPr>
-            <a:r>
-              <a:rPr lang="de-DE" smtClean="0"/>
-              <a:t>Präsentationstitel</a:t>
-            </a:r>
-            <a:endParaRPr lang="de-DE"/>
+            <a:endParaRPr lang="de-DE" dirty="0" smtClean="0"/>
+          </a:p>
+          <a:p>
+            <a:pPr>
+              <a:defRPr/>
+            </a:pPr>
+            <a:r>
+              <a:rPr lang="de-DE" dirty="0" err="1" smtClean="0"/>
+              <a:t>Outlier</a:t>
+            </a:r>
+            <a:r>
+              <a:rPr lang="de-DE" dirty="0" smtClean="0"/>
+              <a:t> </a:t>
+            </a:r>
+            <a:r>
+              <a:rPr lang="de-DE" dirty="0" err="1"/>
+              <a:t>Detection</a:t>
+            </a:r>
+            <a:r>
+              <a:rPr lang="de-DE" dirty="0"/>
+              <a:t> in </a:t>
+            </a:r>
+            <a:r>
+              <a:rPr lang="de-DE" dirty="0" err="1"/>
+              <a:t>Condition</a:t>
+            </a:r>
+            <a:r>
+              <a:rPr lang="de-DE" dirty="0"/>
+              <a:t> Monitoring</a:t>
+            </a:r>
+          </a:p>
+          <a:p>
+            <a:pPr>
+              <a:defRPr/>
+            </a:pPr>
+            <a:endParaRPr lang="de-DE" dirty="0"/>
           </a:p>
         </p:txBody>
       </p:sp>
@@ -10051,8 +10171,8 @@
           </a:p>
         </p:txBody>
       </p:sp>
-      <mc:AlternateContent xmlns:mc="http://schemas.openxmlformats.org/markup-compatibility/2006" xmlns:a14="http://schemas.microsoft.com/office/drawing/2010/main">
-        <mc:Choice Requires="a14">
+      <mc:AlternateContent xmlns:mc="http://schemas.openxmlformats.org/markup-compatibility/2006">
+        <mc:Choice xmlns:a14="http://schemas.microsoft.com/office/drawing/2010/main" Requires="a14">
           <p:sp>
             <p:nvSpPr>
               <p:cNvPr id="3" name="Inhaltsplatzhalter 2"/>
@@ -10250,12 +10370,8 @@
                   <a:t>, </a:t>
                 </a:r>
                 <a:r>
-                  <a:rPr lang="de-DE" dirty="0" err="1" smtClean="0"/>
-                  <a:t>i.d</a:t>
-                </a:r>
-                <a:r>
                   <a:rPr lang="de-DE" dirty="0" smtClean="0"/>
-                  <a:t>. </a:t>
+                  <a:t>i.e. </a:t>
                 </a:r>
                 <a:r>
                   <a:rPr lang="de-DE" dirty="0" err="1" smtClean="0"/>
@@ -10417,7 +10533,7 @@
             </p:txBody>
           </p:sp>
         </mc:Choice>
-        <mc:Fallback xmlns="">
+        <mc:Fallback>
           <p:sp>
             <p:nvSpPr>
               <p:cNvPr id="3" name="Inhaltsplatzhalter 2"/>
@@ -10469,7 +10585,7 @@
             <a:fld id="{03B44CDA-7D88-4264-B0E0-D9AD28CBE73B}" type="datetime1">
               <a:rPr lang="de-DE" smtClean="0"/>
               <a:pPr/>
-              <a:t>22.07.2013</a:t>
+              <a:t>23.07.2013</a:t>
             </a:fld>
             <a:endParaRPr lang="de-DE"/>
           </a:p>
@@ -10493,11 +10609,42 @@
             <a:pPr>
               <a:defRPr/>
             </a:pPr>
-            <a:r>
-              <a:rPr lang="de-DE" smtClean="0"/>
-              <a:t>Präsentationstitel</a:t>
-            </a:r>
-            <a:endParaRPr lang="de-DE"/>
+            <a:endParaRPr lang="de-DE" dirty="0" smtClean="0"/>
+          </a:p>
+          <a:p>
+            <a:pPr>
+              <a:defRPr/>
+            </a:pPr>
+            <a:r>
+              <a:rPr lang="de-DE" dirty="0" err="1" smtClean="0"/>
+              <a:t>Outlier</a:t>
+            </a:r>
+            <a:r>
+              <a:rPr lang="de-DE" dirty="0" smtClean="0"/>
+              <a:t> </a:t>
+            </a:r>
+            <a:r>
+              <a:rPr lang="de-DE" dirty="0" err="1"/>
+              <a:t>Detection</a:t>
+            </a:r>
+            <a:r>
+              <a:rPr lang="de-DE" dirty="0"/>
+              <a:t> in </a:t>
+            </a:r>
+            <a:r>
+              <a:rPr lang="de-DE" dirty="0" err="1"/>
+              <a:t>Condition</a:t>
+            </a:r>
+            <a:r>
+              <a:rPr lang="de-DE" dirty="0"/>
+              <a:t> Monitoring</a:t>
+            </a:r>
+          </a:p>
+          <a:p>
+            <a:pPr>
+              <a:defRPr/>
+            </a:pPr>
+            <a:endParaRPr lang="de-DE" dirty="0"/>
           </a:p>
         </p:txBody>
       </p:sp>
@@ -10957,7 +11104,7 @@
             <a:fld id="{03B44CDA-7D88-4264-B0E0-D9AD28CBE73B}" type="datetime1">
               <a:rPr lang="de-DE" smtClean="0"/>
               <a:pPr/>
-              <a:t>22.07.2013</a:t>
+              <a:t>23.07.2013</a:t>
             </a:fld>
             <a:endParaRPr lang="de-DE"/>
           </a:p>
@@ -10978,14 +11125,31 @@
           <a:bodyPr/>
           <a:lstStyle/>
           <a:p>
-            <a:pPr>
-              <a:defRPr/>
-            </a:pPr>
-            <a:r>
-              <a:rPr lang="de-DE" smtClean="0"/>
-              <a:t>Präsentationstitel</a:t>
-            </a:r>
-            <a:endParaRPr lang="de-DE"/>
+            <a:pPr eaLnBrk="1" hangingPunct="1"/>
+            <a:r>
+              <a:rPr lang="de-DE" dirty="0" err="1"/>
+              <a:t>Outlier</a:t>
+            </a:r>
+            <a:r>
+              <a:rPr lang="de-DE" dirty="0"/>
+              <a:t> </a:t>
+            </a:r>
+            <a:r>
+              <a:rPr lang="de-DE" dirty="0" err="1"/>
+              <a:t>Detection</a:t>
+            </a:r>
+            <a:r>
+              <a:rPr lang="de-DE" dirty="0"/>
+              <a:t> in </a:t>
+            </a:r>
+            <a:r>
+              <a:rPr lang="de-DE" dirty="0" err="1"/>
+              <a:t>Condition</a:t>
+            </a:r>
+            <a:r>
+              <a:rPr lang="de-DE" dirty="0"/>
+              <a:t> Monitoring</a:t>
+            </a:r>
           </a:p>
         </p:txBody>
       </p:sp>
@@ -11099,7 +11263,7 @@
             <a:fld id="{1F1E0E69-EC8C-4B55-B000-A21B4F200C17}" type="datetime1">
               <a:rPr lang="de-DE" smtClean="0"/>
               <a:pPr/>
-              <a:t>22.07.2013</a:t>
+              <a:t>23.07.2013</a:t>
             </a:fld>
             <a:endParaRPr lang="de-DE"/>
           </a:p>
@@ -11123,11 +11287,42 @@
             <a:pPr>
               <a:defRPr/>
             </a:pPr>
-            <a:r>
-              <a:rPr lang="de-DE" smtClean="0"/>
-              <a:t>Präsentationstitel</a:t>
-            </a:r>
-            <a:endParaRPr lang="de-DE"/>
+            <a:endParaRPr lang="de-DE" dirty="0" smtClean="0"/>
+          </a:p>
+          <a:p>
+            <a:pPr>
+              <a:defRPr/>
+            </a:pPr>
+            <a:r>
+              <a:rPr lang="de-DE" dirty="0" err="1" smtClean="0"/>
+              <a:t>Outlier</a:t>
+            </a:r>
+            <a:r>
+              <a:rPr lang="de-DE" dirty="0" smtClean="0"/>
+              <a:t> </a:t>
+            </a:r>
+            <a:r>
+              <a:rPr lang="de-DE" dirty="0" err="1"/>
+              <a:t>Detection</a:t>
+            </a:r>
+            <a:r>
+              <a:rPr lang="de-DE" dirty="0"/>
+              <a:t> in </a:t>
+            </a:r>
+            <a:r>
+              <a:rPr lang="de-DE" dirty="0" err="1"/>
+              <a:t>Condition</a:t>
+            </a:r>
+            <a:r>
+              <a:rPr lang="de-DE" dirty="0"/>
+              <a:t> Monitoring</a:t>
+            </a:r>
+          </a:p>
+          <a:p>
+            <a:pPr>
+              <a:defRPr/>
+            </a:pPr>
+            <a:endParaRPr lang="de-DE" dirty="0"/>
           </a:p>
         </p:txBody>
       </p:sp>
@@ -11661,7 +11856,7 @@
             <a:fld id="{3445AF6D-F46D-415C-AD3E-77E0038AE70E}" type="datetime1">
               <a:rPr lang="de-DE" smtClean="0"/>
               <a:pPr/>
-              <a:t>22.07.2013</a:t>
+              <a:t>23.07.2013</a:t>
             </a:fld>
             <a:endParaRPr lang="de-DE"/>
           </a:p>
@@ -11685,10 +11880,41 @@
             <a:pPr>
               <a:defRPr/>
             </a:pPr>
+            <a:endParaRPr lang="de-DE" dirty="0" smtClean="0"/>
+          </a:p>
+          <a:p>
+            <a:pPr>
+              <a:defRPr/>
+            </a:pPr>
+            <a:r>
+              <a:rPr lang="de-DE" dirty="0" err="1" smtClean="0"/>
+              <a:t>Outlier</a:t>
+            </a:r>
             <a:r>
               <a:rPr lang="de-DE" dirty="0" smtClean="0"/>
-              <a:t>Präsentationstitel</a:t>
-            </a:r>
+              <a:t> </a:t>
+            </a:r>
+            <a:r>
+              <a:rPr lang="de-DE" dirty="0" err="1"/>
+              <a:t>Detection</a:t>
+            </a:r>
+            <a:r>
+              <a:rPr lang="de-DE" dirty="0"/>
+              <a:t> in </a:t>
+            </a:r>
+            <a:r>
+              <a:rPr lang="de-DE" dirty="0" err="1"/>
+              <a:t>Condition</a:t>
+            </a:r>
+            <a:r>
+              <a:rPr lang="de-DE" dirty="0"/>
+              <a:t> Monitoring</a:t>
+            </a:r>
+          </a:p>
+          <a:p>
+            <a:pPr>
+              <a:defRPr/>
+            </a:pPr>
             <a:endParaRPr lang="de-DE" dirty="0"/>
           </a:p>
         </p:txBody>
@@ -11862,7 +12088,7 @@
             <a:fld id="{3445AF6D-F46D-415C-AD3E-77E0038AE70E}" type="datetime1">
               <a:rPr lang="de-DE" smtClean="0"/>
               <a:pPr/>
-              <a:t>22.07.2013</a:t>
+              <a:t>23.07.2013</a:t>
             </a:fld>
             <a:endParaRPr lang="de-DE"/>
           </a:p>
@@ -11886,11 +12112,42 @@
             <a:pPr>
               <a:defRPr/>
             </a:pPr>
-            <a:r>
-              <a:rPr lang="de-DE" smtClean="0"/>
-              <a:t>Präsentationstitel</a:t>
-            </a:r>
-            <a:endParaRPr lang="de-DE"/>
+            <a:endParaRPr lang="de-DE" dirty="0" smtClean="0"/>
+          </a:p>
+          <a:p>
+            <a:pPr>
+              <a:defRPr/>
+            </a:pPr>
+            <a:r>
+              <a:rPr lang="de-DE" dirty="0" err="1" smtClean="0"/>
+              <a:t>Outlier</a:t>
+            </a:r>
+            <a:r>
+              <a:rPr lang="de-DE" dirty="0" smtClean="0"/>
+              <a:t> </a:t>
+            </a:r>
+            <a:r>
+              <a:rPr lang="de-DE" dirty="0" err="1"/>
+              <a:t>Detection</a:t>
+            </a:r>
+            <a:r>
+              <a:rPr lang="de-DE" dirty="0"/>
+              <a:t> in </a:t>
+            </a:r>
+            <a:r>
+              <a:rPr lang="de-DE" dirty="0" err="1"/>
+              <a:t>Condition</a:t>
+            </a:r>
+            <a:r>
+              <a:rPr lang="de-DE" dirty="0"/>
+              <a:t> Monitoring</a:t>
+            </a:r>
+          </a:p>
+          <a:p>
+            <a:pPr>
+              <a:defRPr/>
+            </a:pPr>
+            <a:endParaRPr lang="de-DE" dirty="0"/>
           </a:p>
         </p:txBody>
       </p:sp>
@@ -12349,6 +12606,15 @@
             <a:endParaRPr lang="de-DE" sz="2400" kern="0" dirty="0"/>
           </a:p>
           <a:p>
+            <a:endParaRPr lang="de-DE" kern="0" dirty="0" smtClean="0"/>
+          </a:p>
+          <a:p>
+            <a:endParaRPr lang="de-DE" kern="0" dirty="0" smtClean="0"/>
+          </a:p>
+          <a:p>
+            <a:endParaRPr lang="de-DE" kern="0" dirty="0" smtClean="0"/>
+          </a:p>
+          <a:p>
             <a:endParaRPr lang="de-DE" kern="0" dirty="0"/>
           </a:p>
         </p:txBody>
@@ -12793,8 +13059,8 @@
           </a:p>
         </p:txBody>
       </p:sp>
-      <mc:AlternateContent xmlns:mc="http://schemas.openxmlformats.org/markup-compatibility/2006" xmlns:a14="http://schemas.microsoft.com/office/drawing/2010/main">
-        <mc:Choice Requires="a14">
+      <mc:AlternateContent xmlns:mc="http://schemas.openxmlformats.org/markup-compatibility/2006">
+        <mc:Choice xmlns:a14="http://schemas.microsoft.com/office/drawing/2010/main" Requires="a14">
           <p:sp>
             <p:nvSpPr>
               <p:cNvPr id="3" name="Inhaltsplatzhalter 2"/>
@@ -12895,7 +13161,7 @@
                 </a:r>
                 <a:r>
                   <a:rPr lang="de-DE" sz="2400" dirty="0" err="1" smtClean="0"/>
-                  <a:t>data</a:t>
+                  <a:t>new</a:t>
                 </a:r>
                 <a:r>
                   <a:rPr lang="de-DE" sz="2400" dirty="0" smtClean="0"/>
@@ -12903,7 +13169,7 @@
                 </a:r>
                 <a:r>
                   <a:rPr lang="de-DE" sz="2400" dirty="0" err="1" smtClean="0"/>
-                  <a:t>objects</a:t>
+                  <a:t>data</a:t>
                 </a:r>
                 <a:r>
                   <a:rPr lang="de-DE" sz="2400" dirty="0" smtClean="0"/>
@@ -12911,12 +13177,34 @@
                 </a:r>
                 <a:r>
                   <a:rPr lang="de-DE" sz="2400" dirty="0" err="1" smtClean="0"/>
-                  <a:t>to</a:t>
+                  <a:t>objects</a:t>
                 </a:r>
                 <a:r>
                   <a:rPr lang="de-DE" sz="2400" dirty="0" smtClean="0"/>
                   <a:t> </a:t>
                 </a:r>
+                <a14:m>
+                  <m:oMath xmlns:m="http://schemas.openxmlformats.org/officeDocument/2006/math">
+                    <m:r>
+                      <a:rPr lang="en-US" sz="2400" b="1" i="1">
+                        <a:latin typeface="Cambria Math"/>
+                      </a:rPr>
+                      <m:t>𝒙</m:t>
+                    </m:r>
+                  </m:oMath>
+                </a14:m>
+                <a:r>
+                  <a:rPr lang="de-DE" sz="2400" dirty="0" smtClean="0"/>
+                  <a:t> </a:t>
+                </a:r>
+                <a:r>
+                  <a:rPr lang="de-DE" sz="2400" dirty="0" err="1" smtClean="0"/>
+                  <a:t>to</a:t>
+                </a:r>
+                <a:r>
+                  <a:rPr lang="de-DE" sz="2400" dirty="0" smtClean="0"/>
+                  <a:t> </a:t>
+                </a:r>
                 <a:r>
                   <a:rPr lang="de-DE" sz="2400" dirty="0" err="1" smtClean="0"/>
                   <a:t>the</a:t>
@@ -12927,7 +13215,7 @@
                 </a:r>
                 <a:r>
                   <a:rPr lang="de-DE" sz="2400" dirty="0" err="1" smtClean="0"/>
-                  <a:t>learned</a:t>
+                  <a:t>known</a:t>
                 </a:r>
                 <a:r>
                   <a:rPr lang="de-DE" sz="2400" dirty="0" smtClean="0"/>
@@ -12943,7 +13231,19 @@
                 </a:r>
                 <a:r>
                   <a:rPr lang="de-DE" sz="2400" dirty="0" err="1" smtClean="0"/>
-                  <a:t>class</a:t>
+                  <a:t>data</a:t>
+                </a:r>
+                <a:r>
+                  <a:rPr lang="de-DE" sz="2400" dirty="0" smtClean="0"/>
+                  <a:t> </a:t>
+                </a:r>
+                <a:r>
+                  <a:rPr lang="de-DE" sz="2400" dirty="0" err="1" smtClean="0"/>
+                  <a:t>description</a:t>
+                </a:r>
+                <a:r>
+                  <a:rPr lang="de-DE" sz="2400" dirty="0" smtClean="0"/>
+                  <a:t> </a:t>
                 </a:r>
                 <a:endParaRPr lang="de-DE" sz="2400" dirty="0" smtClean="0"/>
               </a:p>
@@ -13109,7 +13409,7 @@
             </p:txBody>
           </p:sp>
         </mc:Choice>
-        <mc:Fallback xmlns="">
+        <mc:Fallback>
           <p:sp>
             <p:nvSpPr>
               <p:cNvPr id="3" name="Inhaltsplatzhalter 2"/>
@@ -13124,7 +13424,7 @@
               <a:blipFill rotWithShape="1">
                 <a:blip r:embed="rId2"/>
                 <a:stretch>
-                  <a:fillRect l="-2247" t="-2179"/>
+                  <a:fillRect l="-2247" t="-2179" r="-1926"/>
                 </a:stretch>
               </a:blipFill>
             </p:spPr>
@@ -13161,7 +13461,7 @@
             <a:fld id="{03B44CDA-7D88-4264-B0E0-D9AD28CBE73B}" type="datetime1">
               <a:rPr lang="de-DE" smtClean="0"/>
               <a:pPr/>
-              <a:t>22.07.2013</a:t>
+              <a:t>23.07.2013</a:t>
             </a:fld>
             <a:endParaRPr lang="de-DE"/>
           </a:p>
@@ -13185,11 +13485,42 @@
             <a:pPr>
               <a:defRPr/>
             </a:pPr>
-            <a:r>
-              <a:rPr lang="de-DE" smtClean="0"/>
-              <a:t>Präsentationstitel</a:t>
-            </a:r>
-            <a:endParaRPr lang="de-DE"/>
+            <a:endParaRPr lang="de-DE" dirty="0" smtClean="0"/>
+          </a:p>
+          <a:p>
+            <a:pPr>
+              <a:defRPr/>
+            </a:pPr>
+            <a:r>
+              <a:rPr lang="de-DE" dirty="0" err="1" smtClean="0"/>
+              <a:t>Outlier</a:t>
+            </a:r>
+            <a:r>
+              <a:rPr lang="de-DE" dirty="0" smtClean="0"/>
+              <a:t> </a:t>
+            </a:r>
+            <a:r>
+              <a:rPr lang="de-DE" dirty="0" err="1"/>
+              <a:t>Detection</a:t>
+            </a:r>
+            <a:r>
+              <a:rPr lang="de-DE" dirty="0"/>
+              <a:t> in </a:t>
+            </a:r>
+            <a:r>
+              <a:rPr lang="de-DE" dirty="0" err="1"/>
+              <a:t>Condition</a:t>
+            </a:r>
+            <a:r>
+              <a:rPr lang="de-DE" dirty="0"/>
+              <a:t> Monitoring</a:t>
+            </a:r>
+          </a:p>
+          <a:p>
+            <a:pPr>
+              <a:defRPr/>
+            </a:pPr>
+            <a:endParaRPr lang="de-DE" dirty="0"/>
           </a:p>
         </p:txBody>
       </p:sp>
@@ -13385,7 +13716,7 @@
                 </a:solidFill>
               </a:rPr>
               <a:pPr eaLnBrk="1" hangingPunct="1"/>
-              <a:t>22.07.2013</a:t>
+              <a:t>23.07.2013</a:t>
             </a:fld>
             <a:endParaRPr lang="de-DE">
               <a:solidFill>
@@ -13524,12 +13855,20 @@
           <a:p>
             <a:pPr eaLnBrk="1" hangingPunct="1"/>
             <a:r>
+              <a:rPr lang="de-DE" dirty="0" err="1" smtClean="0">
+                <a:solidFill>
+                  <a:srgbClr val="898989"/>
+                </a:solidFill>
+              </a:rPr>
+              <a:t>Outlier</a:t>
+            </a:r>
+            <a:r>
               <a:rPr lang="de-DE" dirty="0" smtClean="0">
                 <a:solidFill>
                   <a:srgbClr val="898989"/>
                 </a:solidFill>
               </a:rPr>
-              <a:t>Semi-</a:t>
+              <a:t> </a:t>
             </a:r>
             <a:r>
               <a:rPr lang="de-DE" dirty="0" err="1" smtClean="0">
@@ -13537,23 +13876,7 @@
                   <a:srgbClr val="898989"/>
                 </a:solidFill>
               </a:rPr>
-              <a:t>Supervised</a:t>
-            </a:r>
-            <a:r>
-              <a:rPr lang="de-DE" dirty="0" smtClean="0">
-                <a:solidFill>
-                  <a:srgbClr val="898989"/>
-                </a:solidFill>
-              </a:rPr>
-              <a:t> </a:t>
-            </a:r>
-            <a:r>
-              <a:rPr lang="de-DE" dirty="0" err="1" smtClean="0">
-                <a:solidFill>
-                  <a:srgbClr val="898989"/>
-                </a:solidFill>
-              </a:rPr>
-              <a:t>Methods</a:t>
+              <a:t>Detection</a:t>
             </a:r>
             <a:r>
               <a:rPr lang="de-DE" dirty="0" smtClean="0">
@@ -13784,11 +14107,7 @@
             </a:r>
             <a:r>
               <a:rPr lang="de-DE" sz="2800" dirty="0" smtClean="0"/>
-              <a:t> </a:t>
-            </a:r>
-            <a:r>
-              <a:rPr lang="de-DE" sz="2800" dirty="0" smtClean="0"/>
-              <a:t>Monitoring </a:t>
+              <a:t> Monitoring </a:t>
             </a:r>
           </a:p>
           <a:p>
@@ -13825,11 +14144,7 @@
             </a:r>
             <a:r>
               <a:rPr lang="de-DE" sz="2800" dirty="0" smtClean="0"/>
-              <a:t> </a:t>
-            </a:r>
-            <a:r>
-              <a:rPr lang="de-DE" sz="2800" dirty="0" smtClean="0"/>
-              <a:t>Class </a:t>
+              <a:t> Class </a:t>
             </a:r>
             <a:r>
               <a:rPr lang="de-DE" sz="2800" dirty="0" err="1" smtClean="0"/>
@@ -14392,7 +14707,7 @@
             <a:fld id="{03B44CDA-7D88-4264-B0E0-D9AD28CBE73B}" type="datetime1">
               <a:rPr lang="de-DE" smtClean="0"/>
               <a:pPr/>
-              <a:t>22.07.2013</a:t>
+              <a:t>23.07.2013</a:t>
             </a:fld>
             <a:endParaRPr lang="de-DE"/>
           </a:p>
@@ -14416,11 +14731,42 @@
             <a:pPr>
               <a:defRPr/>
             </a:pPr>
-            <a:r>
-              <a:rPr lang="de-DE" smtClean="0"/>
-              <a:t>Präsentationstitel</a:t>
-            </a:r>
-            <a:endParaRPr lang="de-DE"/>
+            <a:endParaRPr lang="de-DE" dirty="0" smtClean="0"/>
+          </a:p>
+          <a:p>
+            <a:pPr>
+              <a:defRPr/>
+            </a:pPr>
+            <a:r>
+              <a:rPr lang="de-DE" dirty="0" err="1" smtClean="0"/>
+              <a:t>Outlier</a:t>
+            </a:r>
+            <a:r>
+              <a:rPr lang="de-DE" dirty="0" smtClean="0"/>
+              <a:t> </a:t>
+            </a:r>
+            <a:r>
+              <a:rPr lang="de-DE" dirty="0" err="1"/>
+              <a:t>Detection</a:t>
+            </a:r>
+            <a:r>
+              <a:rPr lang="de-DE" dirty="0"/>
+              <a:t> in </a:t>
+            </a:r>
+            <a:r>
+              <a:rPr lang="de-DE" dirty="0" err="1"/>
+              <a:t>Condition</a:t>
+            </a:r>
+            <a:r>
+              <a:rPr lang="de-DE" dirty="0"/>
+              <a:t> Monitoring</a:t>
+            </a:r>
+          </a:p>
+          <a:p>
+            <a:pPr>
+              <a:defRPr/>
+            </a:pPr>
+            <a:endParaRPr lang="de-DE" dirty="0"/>
           </a:p>
         </p:txBody>
       </p:sp>
@@ -14534,7 +14880,7 @@
             <a:fld id="{3445AF6D-F46D-415C-AD3E-77E0038AE70E}" type="datetime1">
               <a:rPr lang="de-DE" smtClean="0"/>
               <a:pPr/>
-              <a:t>22.07.2013</a:t>
+              <a:t>23.07.2013</a:t>
             </a:fld>
             <a:endParaRPr lang="de-DE"/>
           </a:p>
@@ -14558,11 +14904,42 @@
             <a:pPr>
               <a:defRPr/>
             </a:pPr>
-            <a:r>
-              <a:rPr lang="de-DE" smtClean="0"/>
-              <a:t>Präsentationstitel</a:t>
-            </a:r>
-            <a:endParaRPr lang="de-DE"/>
+            <a:endParaRPr lang="de-DE" dirty="0" smtClean="0"/>
+          </a:p>
+          <a:p>
+            <a:pPr>
+              <a:defRPr/>
+            </a:pPr>
+            <a:r>
+              <a:rPr lang="de-DE" dirty="0" err="1" smtClean="0"/>
+              <a:t>Outlier</a:t>
+            </a:r>
+            <a:r>
+              <a:rPr lang="de-DE" dirty="0" smtClean="0"/>
+              <a:t> </a:t>
+            </a:r>
+            <a:r>
+              <a:rPr lang="de-DE" dirty="0" err="1"/>
+              <a:t>Detection</a:t>
+            </a:r>
+            <a:r>
+              <a:rPr lang="de-DE" dirty="0"/>
+              <a:t> in </a:t>
+            </a:r>
+            <a:r>
+              <a:rPr lang="de-DE" dirty="0" err="1"/>
+              <a:t>Condition</a:t>
+            </a:r>
+            <a:r>
+              <a:rPr lang="de-DE" dirty="0"/>
+              <a:t> Monitoring</a:t>
+            </a:r>
+          </a:p>
+          <a:p>
+            <a:pPr>
+              <a:defRPr/>
+            </a:pPr>
+            <a:endParaRPr lang="de-DE" dirty="0"/>
           </a:p>
         </p:txBody>
       </p:sp>
@@ -14816,13 +15193,54 @@
               <a:buNone/>
             </a:pPr>
             <a:r>
-              <a:rPr lang="de-DE" sz="2000" b="1" kern="0" smtClean="0"/>
-              <a:t>Principle:	</a:t>
-            </a:r>
-            <a:r>
-              <a:rPr lang="de-DE" sz="2000" kern="0" smtClean="0"/>
-              <a:t>Support objects defining a hypersphere with radius</a:t>
-            </a:r>
+              <a:rPr lang="de-DE" sz="2000" b="1" kern="0" dirty="0" err="1" smtClean="0"/>
+              <a:t>Principle</a:t>
+            </a:r>
+            <a:r>
+              <a:rPr lang="de-DE" sz="2000" b="1" kern="0" dirty="0" smtClean="0"/>
+              <a:t>:	</a:t>
+            </a:r>
+            <a:r>
+              <a:rPr lang="de-DE" sz="2000" kern="0" dirty="0" smtClean="0"/>
+              <a:t>Support </a:t>
+            </a:r>
+            <a:r>
+              <a:rPr lang="de-DE" sz="2000" kern="0" dirty="0" err="1" smtClean="0"/>
+              <a:t>objects</a:t>
+            </a:r>
+            <a:r>
+              <a:rPr lang="de-DE" sz="2000" kern="0" dirty="0" smtClean="0"/>
+              <a:t> </a:t>
+            </a:r>
+            <a:r>
+              <a:rPr lang="de-DE" sz="2000" kern="0" dirty="0" err="1" smtClean="0"/>
+              <a:t>defining</a:t>
+            </a:r>
+            <a:r>
+              <a:rPr lang="de-DE" sz="2000" kern="0" dirty="0" smtClean="0"/>
+              <a:t> a </a:t>
+            </a:r>
+            <a:r>
+              <a:rPr lang="de-DE" sz="2000" kern="0" dirty="0" err="1" smtClean="0"/>
+              <a:t>hypersphere</a:t>
+            </a:r>
+            <a:r>
+              <a:rPr lang="de-DE" sz="2000" kern="0" dirty="0" smtClean="0"/>
+              <a:t> </a:t>
+            </a:r>
+            <a:r>
+              <a:rPr lang="de-DE" sz="2000" kern="0" dirty="0" err="1" smtClean="0"/>
+              <a:t>with</a:t>
+            </a:r>
+            <a:r>
+              <a:rPr lang="de-DE" sz="2000" kern="0" dirty="0" smtClean="0"/>
+              <a:t> </a:t>
+            </a:r>
+            <a:r>
+              <a:rPr lang="de-DE" sz="2000" kern="0" dirty="0" err="1" smtClean="0"/>
+              <a:t>radius</a:t>
+            </a:r>
+            <a:endParaRPr lang="de-DE" sz="2000" kern="0" dirty="0" smtClean="0"/>
           </a:p>
           <a:p>
             <a:pPr marL="0" indent="0">
@@ -14830,12 +15248,24 @@
               <a:buNone/>
             </a:pPr>
             <a:r>
-              <a:rPr lang="de-DE" sz="2000" i="1" kern="0" smtClean="0"/>
+              <a:rPr lang="de-DE" sz="2000" i="1" kern="0" dirty="0" smtClean="0"/>
               <a:t>		R </a:t>
             </a:r>
             <a:r>
-              <a:rPr lang="de-DE" sz="2000" kern="0" smtClean="0"/>
-              <a:t>and center a</a:t>
+              <a:rPr lang="de-DE" sz="2000" kern="0" dirty="0" err="1" smtClean="0"/>
+              <a:t>and</a:t>
+            </a:r>
+            <a:r>
+              <a:rPr lang="de-DE" sz="2000" kern="0" dirty="0" smtClean="0"/>
+              <a:t> </a:t>
+            </a:r>
+            <a:r>
+              <a:rPr lang="de-DE" sz="2000" kern="0" dirty="0" err="1" smtClean="0"/>
+              <a:t>center</a:t>
+            </a:r>
+            <a:r>
+              <a:rPr lang="de-DE" sz="2000" kern="0" dirty="0" smtClean="0"/>
+              <a:t> a</a:t>
             </a:r>
           </a:p>
           <a:p>
@@ -14844,21 +15274,94 @@
               <a:buNone/>
             </a:pPr>
             <a:r>
-              <a:rPr lang="de-DE" sz="2000" b="1" kern="0" smtClean="0"/>
+              <a:rPr lang="de-DE" sz="2000" b="1" kern="0" dirty="0" smtClean="0"/>
               <a:t>Training:	</a:t>
             </a:r>
             <a:r>
-              <a:rPr lang="de-DE" sz="2000" kern="0" smtClean="0"/>
-              <a:t>Minimization of </a:t>
-            </a:r>
-            <a:r>
-              <a:rPr lang="de-DE" sz="2000" i="1" kern="0" smtClean="0"/>
+              <a:rPr lang="de-DE" sz="2000" kern="0" dirty="0" err="1" smtClean="0"/>
+              <a:t>Minimization</a:t>
+            </a:r>
+            <a:r>
+              <a:rPr lang="de-DE" sz="2000" kern="0" dirty="0" smtClean="0"/>
+              <a:t> </a:t>
+            </a:r>
+            <a:r>
+              <a:rPr lang="de-DE" sz="2000" kern="0" dirty="0" err="1" smtClean="0"/>
+              <a:t>of</a:t>
+            </a:r>
+            <a:r>
+              <a:rPr lang="de-DE" sz="2000" kern="0" dirty="0" smtClean="0"/>
+              <a:t> </a:t>
+            </a:r>
+            <a:r>
+              <a:rPr lang="de-DE" sz="2000" i="1" kern="0" dirty="0" smtClean="0"/>
               <a:t>R </a:t>
             </a:r>
             <a:r>
-              <a:rPr lang="de-DE" sz="2000" kern="0" smtClean="0"/>
-              <a:t>such that most traning target     		objects are inside hypersphere</a:t>
-            </a:r>
+              <a:rPr lang="de-DE" sz="2000" kern="0" dirty="0" smtClean="0"/>
+              <a:t>such </a:t>
+            </a:r>
+            <a:r>
+              <a:rPr lang="de-DE" sz="2000" kern="0" dirty="0" err="1" smtClean="0"/>
+              <a:t>that</a:t>
+            </a:r>
+            <a:r>
+              <a:rPr lang="de-DE" sz="2000" kern="0" dirty="0" smtClean="0"/>
+              <a:t> </a:t>
+            </a:r>
+            <a:r>
+              <a:rPr lang="de-DE" sz="2000" kern="0" dirty="0" err="1" smtClean="0"/>
+              <a:t>most</a:t>
+            </a:r>
+            <a:r>
+              <a:rPr lang="de-DE" sz="2000" kern="0" dirty="0" smtClean="0"/>
+              <a:t> </a:t>
+            </a:r>
+            <a:r>
+              <a:rPr lang="de-DE" sz="2000" kern="0" dirty="0" err="1" smtClean="0"/>
+              <a:t>traning</a:t>
+            </a:r>
+            <a:r>
+              <a:rPr lang="de-DE" sz="2000" kern="0" dirty="0" smtClean="0"/>
+              <a:t> </a:t>
+            </a:r>
+            <a:r>
+              <a:rPr lang="de-DE" sz="2000" kern="0" dirty="0" err="1" smtClean="0"/>
+              <a:t>target</a:t>
+            </a:r>
+            <a:r>
+              <a:rPr lang="de-DE" sz="2000" kern="0" dirty="0" smtClean="0"/>
+              <a:t>     		</a:t>
+            </a:r>
+            <a:r>
+              <a:rPr lang="de-DE" sz="2000" kern="0" dirty="0" err="1" smtClean="0"/>
+              <a:t>objects</a:t>
+            </a:r>
+            <a:r>
+              <a:rPr lang="de-DE" sz="2000" kern="0" dirty="0" smtClean="0"/>
+              <a:t> </a:t>
+            </a:r>
+            <a:r>
+              <a:rPr lang="de-DE" sz="2000" kern="0" dirty="0" err="1" smtClean="0"/>
+              <a:t>are</a:t>
+            </a:r>
+            <a:r>
+              <a:rPr lang="de-DE" sz="2000" kern="0" dirty="0" smtClean="0"/>
+              <a:t> </a:t>
+            </a:r>
+            <a:r>
+              <a:rPr lang="de-DE" sz="2000" kern="0" dirty="0" err="1" smtClean="0"/>
+              <a:t>inside</a:t>
+            </a:r>
+            <a:r>
+              <a:rPr lang="de-DE" sz="2000" kern="0" dirty="0" smtClean="0"/>
+              <a:t> </a:t>
+            </a:r>
+            <a:r>
+              <a:rPr lang="de-DE" sz="2000" kern="0" dirty="0" err="1" smtClean="0"/>
+              <a:t>hypersphere</a:t>
+            </a:r>
+            <a:endParaRPr lang="de-DE" sz="2000" kern="0" dirty="0" smtClean="0"/>
           </a:p>
           <a:p>
             <a:pPr marL="0" indent="0">
@@ -14866,13 +15369,90 @@
               <a:buNone/>
             </a:pPr>
             <a:r>
-              <a:rPr lang="de-DE" sz="2000" b="1" kern="0" smtClean="0"/>
-              <a:t>Classification: 	</a:t>
-            </a:r>
-            <a:r>
-              <a:rPr lang="de-DE" sz="2000" kern="0" smtClean="0"/>
-              <a:t>new objects are target objects if they are inside the</a:t>
-            </a:r>
+              <a:rPr lang="de-DE" sz="2000" b="1" kern="0" dirty="0" err="1" smtClean="0"/>
+              <a:t>Classification</a:t>
+            </a:r>
+            <a:r>
+              <a:rPr lang="de-DE" sz="2000" b="1" kern="0" dirty="0" smtClean="0"/>
+              <a:t>: 	</a:t>
+            </a:r>
+            <a:r>
+              <a:rPr lang="de-DE" sz="2000" kern="0" dirty="0" err="1" smtClean="0"/>
+              <a:t>new</a:t>
+            </a:r>
+            <a:r>
+              <a:rPr lang="de-DE" sz="2000" kern="0" dirty="0" smtClean="0"/>
+              <a:t> </a:t>
+            </a:r>
+            <a:r>
+              <a:rPr lang="de-DE" sz="2000" kern="0" dirty="0" err="1" smtClean="0"/>
+              <a:t>objects</a:t>
+            </a:r>
+            <a:r>
+              <a:rPr lang="de-DE" sz="2000" kern="0" dirty="0" smtClean="0"/>
+              <a:t> </a:t>
+            </a:r>
+            <a:r>
+              <a:rPr lang="de-DE" sz="2000" kern="0" dirty="0" err="1" smtClean="0"/>
+              <a:t>are</a:t>
+            </a:r>
+            <a:r>
+              <a:rPr lang="de-DE" sz="2000" kern="0" dirty="0" smtClean="0"/>
+              <a:t> </a:t>
+            </a:r>
+            <a:r>
+              <a:rPr lang="de-DE" sz="2000" kern="0" dirty="0" err="1" smtClean="0"/>
+              <a:t>target</a:t>
+            </a:r>
+            <a:r>
+              <a:rPr lang="de-DE" sz="2000" kern="0" dirty="0" smtClean="0"/>
+              <a:t> </a:t>
+            </a:r>
+            <a:r>
+              <a:rPr lang="de-DE" sz="2000" kern="0" dirty="0" err="1" smtClean="0"/>
+              <a:t>objects</a:t>
+            </a:r>
+            <a:r>
+              <a:rPr lang="de-DE" sz="2000" kern="0" dirty="0" smtClean="0"/>
+              <a:t> </a:t>
+            </a:r>
+            <a:r>
+              <a:rPr lang="de-DE" sz="2000" kern="0" dirty="0" err="1" smtClean="0"/>
+              <a:t>if</a:t>
+            </a:r>
+            <a:r>
+              <a:rPr lang="de-DE" sz="2000" kern="0" dirty="0" smtClean="0"/>
+              <a:t> </a:t>
+            </a:r>
+            <a:r>
+              <a:rPr lang="de-DE" sz="2000" kern="0" dirty="0" err="1" smtClean="0"/>
+              <a:t>they</a:t>
+            </a:r>
+            <a:r>
+              <a:rPr lang="de-DE" sz="2000" kern="0" dirty="0" smtClean="0"/>
+              <a:t> </a:t>
+            </a:r>
+            <a:r>
+              <a:rPr lang="de-DE" sz="2000" kern="0" dirty="0" err="1" smtClean="0"/>
+              <a:t>are</a:t>
+            </a:r>
+            <a:r>
+              <a:rPr lang="de-DE" sz="2000" kern="0" dirty="0" smtClean="0"/>
+              <a:t> </a:t>
+            </a:r>
+            <a:r>
+              <a:rPr lang="de-DE" sz="2000" kern="0" dirty="0" err="1" smtClean="0"/>
+              <a:t>inside</a:t>
+            </a:r>
+            <a:r>
+              <a:rPr lang="de-DE" sz="2000" kern="0" dirty="0" smtClean="0"/>
+              <a:t> </a:t>
+            </a:r>
+            <a:r>
+              <a:rPr lang="de-DE" sz="2000" kern="0" dirty="0" err="1" smtClean="0"/>
+              <a:t>the</a:t>
+            </a:r>
+            <a:endParaRPr lang="de-DE" sz="2000" kern="0" dirty="0" smtClean="0"/>
           </a:p>
           <a:p>
             <a:pPr marL="0" indent="0">
@@ -14880,12 +15460,28 @@
               <a:buNone/>
             </a:pPr>
             <a:r>
-              <a:rPr lang="de-DE" sz="2000" b="1" kern="0" smtClean="0"/>
+              <a:rPr lang="de-DE" sz="2000" b="1" kern="0" dirty="0" smtClean="0"/>
               <a:t>		</a:t>
             </a:r>
             <a:r>
-              <a:rPr lang="de-DE" sz="2000" kern="0" smtClean="0"/>
-              <a:t>hypersphere, outliers otherwise</a:t>
+              <a:rPr lang="de-DE" sz="2000" kern="0" dirty="0" err="1" smtClean="0"/>
+              <a:t>boundary</a:t>
+            </a:r>
+            <a:r>
+              <a:rPr lang="de-DE" sz="2000" kern="0" dirty="0" smtClean="0"/>
+              <a:t>, </a:t>
+            </a:r>
+            <a:r>
+              <a:rPr lang="de-DE" sz="2000" kern="0" dirty="0" err="1" smtClean="0"/>
+              <a:t>outliers</a:t>
+            </a:r>
+            <a:r>
+              <a:rPr lang="de-DE" sz="2000" kern="0" dirty="0" smtClean="0"/>
+              <a:t> </a:t>
+            </a:r>
+            <a:r>
+              <a:rPr lang="de-DE" sz="2000" kern="0" dirty="0" err="1" smtClean="0"/>
+              <a:t>otherwise</a:t>
             </a:r>
             <a:endParaRPr lang="de-DE" sz="2000" b="1" kern="0" dirty="0"/>
           </a:p>
@@ -14972,7 +15568,7 @@
             <a:fld id="{3445AF6D-F46D-415C-AD3E-77E0038AE70E}" type="datetime1">
               <a:rPr lang="de-DE" smtClean="0"/>
               <a:pPr/>
-              <a:t>22.07.2013</a:t>
+              <a:t>23.07.2013</a:t>
             </a:fld>
             <a:endParaRPr lang="de-DE"/>
           </a:p>
@@ -14996,11 +15592,42 @@
             <a:pPr>
               <a:defRPr/>
             </a:pPr>
-            <a:r>
-              <a:rPr lang="de-DE" smtClean="0"/>
-              <a:t>Präsentationstitel</a:t>
-            </a:r>
-            <a:endParaRPr lang="de-DE"/>
+            <a:endParaRPr lang="de-DE" dirty="0" smtClean="0"/>
+          </a:p>
+          <a:p>
+            <a:pPr>
+              <a:defRPr/>
+            </a:pPr>
+            <a:r>
+              <a:rPr lang="de-DE" dirty="0" err="1" smtClean="0"/>
+              <a:t>Outlier</a:t>
+            </a:r>
+            <a:r>
+              <a:rPr lang="de-DE" dirty="0" smtClean="0"/>
+              <a:t> </a:t>
+            </a:r>
+            <a:r>
+              <a:rPr lang="de-DE" dirty="0" err="1"/>
+              <a:t>Detection</a:t>
+            </a:r>
+            <a:r>
+              <a:rPr lang="de-DE" dirty="0"/>
+              <a:t> in </a:t>
+            </a:r>
+            <a:r>
+              <a:rPr lang="de-DE" dirty="0" err="1"/>
+              <a:t>Condition</a:t>
+            </a:r>
+            <a:r>
+              <a:rPr lang="de-DE" dirty="0"/>
+              <a:t> Monitoring</a:t>
+            </a:r>
+          </a:p>
+          <a:p>
+            <a:pPr>
+              <a:defRPr/>
+            </a:pPr>
+            <a:endParaRPr lang="de-DE" dirty="0"/>
           </a:p>
         </p:txBody>
       </p:sp>
@@ -15124,20 +15751,28 @@
               <a:t> </a:t>
             </a:r>
             <a:r>
-              <a:rPr lang="de-DE" sz="2000" i="1" dirty="0" err="1" smtClean="0"/>
-              <a:t>receptive</a:t>
+              <a:rPr lang="de-DE" sz="2000" dirty="0" err="1"/>
+              <a:t>R</a:t>
+            </a:r>
+            <a:r>
+              <a:rPr lang="de-DE" sz="2000" dirty="0" err="1" smtClean="0"/>
+              <a:t>eceptive</a:t>
+            </a:r>
+            <a:r>
+              <a:rPr lang="de-DE" sz="2000" dirty="0" smtClean="0"/>
+              <a:t> </a:t>
+            </a:r>
+            <a:r>
+              <a:rPr lang="de-DE" sz="2000" dirty="0"/>
+              <a:t>F</a:t>
+            </a:r>
+            <a:r>
+              <a:rPr lang="de-DE" sz="2000" dirty="0" smtClean="0"/>
+              <a:t>ields</a:t>
             </a:r>
             <a:r>
               <a:rPr lang="de-DE" sz="2000" i="1" dirty="0" smtClean="0"/>
-              <a:t> </a:t>
-            </a:r>
-            <a:r>
-              <a:rPr lang="de-DE" sz="2000" i="1" dirty="0" err="1" smtClean="0"/>
-              <a:t>fields</a:t>
-            </a:r>
-            <a:r>
-              <a:rPr lang="de-DE" sz="2000" i="1" dirty="0" smtClean="0"/>
-              <a:t> </a:t>
+              <a:t> 		</a:t>
             </a:r>
             <a:r>
               <a:rPr lang="de-DE" sz="2000" dirty="0" err="1" smtClean="0"/>
@@ -15145,7 +15780,11 @@
             </a:r>
             <a:r>
               <a:rPr lang="de-DE" sz="2000" dirty="0" smtClean="0"/>
-              <a:t> 		</a:t>
+              <a:t> </a:t>
+            </a:r>
+            <a:r>
+              <a:rPr lang="de-DE" sz="2000" dirty="0"/>
+              <a:t> </a:t>
             </a:r>
             <a:r>
               <a:rPr lang="de-DE" sz="2000" dirty="0" err="1" smtClean="0"/>
@@ -15208,12 +15847,16 @@
               <a:t> </a:t>
             </a:r>
             <a:r>
+              <a:rPr lang="de-DE" sz="2000" dirty="0" smtClean="0"/>
+              <a:t>			</a:t>
+            </a:r>
+            <a:r>
               <a:rPr lang="de-DE" sz="2000" dirty="0" err="1" smtClean="0"/>
               <a:t>receptive</a:t>
             </a:r>
             <a:r>
               <a:rPr lang="de-DE" sz="2000" dirty="0" smtClean="0"/>
-              <a:t> 		</a:t>
+              <a:t> </a:t>
             </a:r>
             <a:r>
               <a:rPr lang="de-DE" sz="2000" dirty="0" err="1" smtClean="0"/>
@@ -15437,7 +16080,7 @@
             </a:r>
             <a:r>
               <a:rPr lang="de-DE" sz="2000" dirty="0" err="1" smtClean="0"/>
-              <a:t>they</a:t>
+              <a:t>their</a:t>
             </a:r>
             <a:r>
               <a:rPr lang="de-DE" sz="2000" dirty="0" smtClean="0"/>
@@ -15445,7 +16088,7 @@
             </a:r>
             <a:r>
               <a:rPr lang="de-DE" sz="2000" dirty="0" err="1" smtClean="0"/>
-              <a:t>are</a:t>
+              <a:t>distance</a:t>
             </a:r>
             <a:r>
               <a:rPr lang="de-DE" sz="2000" dirty="0" smtClean="0"/>
@@ -15453,7 +16096,7 @@
             </a:r>
             <a:r>
               <a:rPr lang="de-DE" sz="2000" dirty="0" err="1" smtClean="0"/>
-              <a:t>inside</a:t>
+              <a:t>to</a:t>
             </a:r>
             <a:r>
               <a:rPr lang="de-DE" sz="2000" dirty="0" smtClean="0"/>
@@ -15465,19 +16108,23 @@
             </a:r>
             <a:r>
               <a:rPr lang="de-DE" sz="2000" dirty="0" smtClean="0"/>
-              <a:t>     </a:t>
-            </a:r>
-            <a:r>
-              <a:rPr lang="de-DE" sz="2000" dirty="0"/>
-              <a:t>	</a:t>
+              <a:t> 		</a:t>
+            </a:r>
+            <a:r>
+              <a:rPr lang="de-DE" sz="2000" dirty="0" err="1" smtClean="0"/>
+              <a:t>neares</a:t>
+            </a:r>
+            <a:r>
+              <a:rPr lang="de-DE" sz="2000" dirty="0" err="1" smtClean="0"/>
+              <a:t>t</a:t>
             </a:r>
             <a:r>
               <a:rPr lang="de-DE" sz="2000" dirty="0" smtClean="0"/>
-              <a:t>	</a:t>
+              <a:t> </a:t>
             </a:r>
             <a:r>
               <a:rPr lang="de-DE" sz="2000" dirty="0" err="1" smtClean="0"/>
-              <a:t>receptive</a:t>
+              <a:t>support</a:t>
             </a:r>
             <a:r>
               <a:rPr lang="de-DE" sz="2000" dirty="0" smtClean="0"/>
@@ -15485,15 +16132,31 @@
             </a:r>
             <a:r>
               <a:rPr lang="de-DE" sz="2000" dirty="0" err="1" smtClean="0"/>
-              <a:t>field</a:t>
-            </a:r>
-            <a:r>
-              <a:rPr lang="de-DE" sz="2000" dirty="0"/>
+              <a:t>object</a:t>
+            </a:r>
+            <a:r>
+              <a:rPr lang="de-DE" sz="2000" dirty="0" smtClean="0"/>
               <a:t> </a:t>
             </a:r>
             <a:r>
               <a:rPr lang="de-DE" sz="2000" dirty="0" err="1" smtClean="0"/>
-              <a:t>of</a:t>
+              <a:t>is</a:t>
+            </a:r>
+            <a:r>
+              <a:rPr lang="de-DE" sz="2000" dirty="0" smtClean="0"/>
+              <a:t> </a:t>
+            </a:r>
+            <a:r>
+              <a:rPr lang="de-DE" sz="2000" dirty="0" err="1" smtClean="0"/>
+              <a:t>smaller</a:t>
+            </a:r>
+            <a:r>
+              <a:rPr lang="de-DE" sz="2000" dirty="0" smtClean="0"/>
+              <a:t> </a:t>
+            </a:r>
+            <a:r>
+              <a:rPr lang="de-DE" sz="2000" dirty="0" err="1" smtClean="0"/>
+              <a:t>than</a:t>
             </a:r>
             <a:r>
               <a:rPr lang="de-DE" sz="2000" dirty="0" smtClean="0"/>
@@ -15509,23 +16172,7 @@
             </a:r>
             <a:r>
               <a:rPr lang="de-DE" sz="2000" dirty="0" err="1" smtClean="0"/>
-              <a:t>nearest</a:t>
-            </a:r>
-            <a:r>
-              <a:rPr lang="de-DE" sz="2000" dirty="0" smtClean="0"/>
-              <a:t> </a:t>
-            </a:r>
-            <a:r>
-              <a:rPr lang="de-DE" sz="2000" dirty="0" err="1" smtClean="0"/>
-              <a:t>support</a:t>
-            </a:r>
-            <a:r>
-              <a:rPr lang="de-DE" sz="2000" dirty="0" smtClean="0"/>
-              <a:t> </a:t>
-            </a:r>
-            <a:r>
-              <a:rPr lang="de-DE" sz="2000" dirty="0" err="1" smtClean="0"/>
-              <a:t>object</a:t>
+              <a:t>threshold</a:t>
             </a:r>
             <a:endParaRPr lang="de-DE" sz="2000" b="1" dirty="0"/>
           </a:p>
@@ -15616,7 +16263,7 @@
             <a:fld id="{3445AF6D-F46D-415C-AD3E-77E0038AE70E}" type="datetime1">
               <a:rPr lang="de-DE" smtClean="0"/>
               <a:pPr/>
-              <a:t>22.07.2013</a:t>
+              <a:t>23.07.2013</a:t>
             </a:fld>
             <a:endParaRPr lang="de-DE"/>
           </a:p>
@@ -15640,11 +16287,42 @@
             <a:pPr>
               <a:defRPr/>
             </a:pPr>
-            <a:r>
-              <a:rPr lang="de-DE" smtClean="0"/>
-              <a:t>Präsentationstitel</a:t>
-            </a:r>
-            <a:endParaRPr lang="de-DE"/>
+            <a:endParaRPr lang="de-DE" dirty="0" smtClean="0"/>
+          </a:p>
+          <a:p>
+            <a:pPr>
+              <a:defRPr/>
+            </a:pPr>
+            <a:r>
+              <a:rPr lang="de-DE" dirty="0" err="1" smtClean="0"/>
+              <a:t>Outlier</a:t>
+            </a:r>
+            <a:r>
+              <a:rPr lang="de-DE" dirty="0" smtClean="0"/>
+              <a:t> </a:t>
+            </a:r>
+            <a:r>
+              <a:rPr lang="de-DE" dirty="0" err="1"/>
+              <a:t>Detection</a:t>
+            </a:r>
+            <a:r>
+              <a:rPr lang="de-DE" dirty="0"/>
+              <a:t> in </a:t>
+            </a:r>
+            <a:r>
+              <a:rPr lang="de-DE" dirty="0" err="1"/>
+              <a:t>Condition</a:t>
+            </a:r>
+            <a:r>
+              <a:rPr lang="de-DE" dirty="0"/>
+              <a:t> Monitoring</a:t>
+            </a:r>
+          </a:p>
+          <a:p>
+            <a:pPr>
+              <a:defRPr/>
+            </a:pPr>
+            <a:endParaRPr lang="de-DE" dirty="0"/>
           </a:p>
         </p:txBody>
       </p:sp>
@@ -16009,7 +16687,7 @@
             </a:r>
             <a:r>
               <a:rPr lang="de-DE" sz="2000" dirty="0" err="1" smtClean="0"/>
-              <a:t>they</a:t>
+              <a:t>their</a:t>
             </a:r>
             <a:r>
               <a:rPr lang="de-DE" sz="2000" dirty="0" smtClean="0"/>
@@ -16017,7 +16695,7 @@
             </a:r>
             <a:r>
               <a:rPr lang="de-DE" sz="2000" dirty="0" err="1" smtClean="0"/>
-              <a:t>are</a:t>
+              <a:t>distance</a:t>
             </a:r>
             <a:r>
               <a:rPr lang="de-DE" sz="2000" dirty="0" smtClean="0"/>
@@ -16025,7 +16703,7 @@
             </a:r>
             <a:r>
               <a:rPr lang="de-DE" sz="2000" dirty="0" err="1" smtClean="0"/>
-              <a:t>inside</a:t>
+              <a:t>to</a:t>
             </a:r>
             <a:r>
               <a:rPr lang="de-DE" sz="2000" dirty="0" smtClean="0"/>
@@ -16037,58 +16715,25 @@
             </a:r>
             <a:r>
               <a:rPr lang="de-DE" sz="2000" dirty="0" smtClean="0"/>
-              <a:t> </a:t>
-            </a:r>
-          </a:p>
-          <a:p>
-            <a:pPr marL="0" indent="0">
-              <a:buNone/>
-            </a:pPr>
-            <a:r>
-              <a:rPr lang="de-DE" sz="2000" b="1" dirty="0"/>
-              <a:t> 	</a:t>
-            </a:r>
-            <a:r>
-              <a:rPr lang="de-DE" sz="2000" b="1" dirty="0" smtClean="0"/>
-              <a:t>	</a:t>
+              <a:t> 		</a:t>
+            </a:r>
+            <a:r>
+              <a:rPr lang="de-DE" sz="2000" dirty="0" err="1" smtClean="0"/>
+              <a:t>neares</a:t>
+            </a:r>
+            <a:r>
+              <a:rPr lang="de-DE" sz="2000" dirty="0" err="1" smtClean="0"/>
+              <a:t>t</a:t>
+            </a:r>
+            <a:r>
+              <a:rPr lang="de-DE" sz="2000" dirty="0" smtClean="0"/>
+              <a:t> </a:t>
             </a:r>
             <a:r>
               <a:rPr lang="de-DE" sz="2000" dirty="0" err="1" smtClean="0"/>
               <a:t>cluster</a:t>
             </a:r>
             <a:r>
-              <a:rPr lang="de-DE" sz="2000" b="1" dirty="0" smtClean="0"/>
-              <a:t> </a:t>
-            </a:r>
-            <a:r>
-              <a:rPr lang="de-DE" sz="2000" dirty="0" err="1" smtClean="0"/>
-              <a:t>defined</a:t>
-            </a:r>
-            <a:r>
-              <a:rPr lang="de-DE" sz="2000" dirty="0" smtClean="0"/>
-              <a:t> </a:t>
-            </a:r>
-            <a:r>
-              <a:rPr lang="de-DE" sz="2000" dirty="0" err="1" smtClean="0"/>
-              <a:t>by</a:t>
-            </a:r>
-            <a:r>
-              <a:rPr lang="de-DE" sz="2000" dirty="0" smtClean="0"/>
-              <a:t> </a:t>
-            </a:r>
-            <a:r>
-              <a:rPr lang="de-DE" sz="2000" dirty="0" err="1" smtClean="0"/>
-              <a:t>nearest</a:t>
-            </a:r>
-            <a:r>
-              <a:rPr lang="de-DE" sz="2000" dirty="0" smtClean="0"/>
-              <a:t> </a:t>
-            </a:r>
-            <a:r>
-              <a:rPr lang="de-DE" sz="2000" dirty="0" err="1" smtClean="0"/>
-              <a:t>cluster</a:t>
-            </a:r>
-            <a:r>
               <a:rPr lang="de-DE" sz="2000" dirty="0" smtClean="0"/>
               <a:t> </a:t>
             </a:r>
@@ -16099,6 +16744,50 @@
             <a:r>
               <a:rPr lang="de-DE" sz="2000" dirty="0" smtClean="0"/>
               <a:t> </a:t>
+            </a:r>
+            <a:r>
+              <a:rPr lang="de-DE" sz="2000" dirty="0" err="1" smtClean="0"/>
+              <a:t>is</a:t>
+            </a:r>
+            <a:r>
+              <a:rPr lang="de-DE" sz="2000" dirty="0" smtClean="0"/>
+              <a:t> </a:t>
+            </a:r>
+            <a:r>
+              <a:rPr lang="de-DE" sz="2000" dirty="0" err="1" smtClean="0"/>
+              <a:t>smaller</a:t>
+            </a:r>
+            <a:r>
+              <a:rPr lang="de-DE" sz="2000" dirty="0" smtClean="0"/>
+              <a:t> </a:t>
+            </a:r>
+            <a:r>
+              <a:rPr lang="de-DE" sz="2000" dirty="0" err="1" smtClean="0"/>
+              <a:t>than</a:t>
+            </a:r>
+            <a:r>
+              <a:rPr lang="de-DE" sz="2000" dirty="0" smtClean="0"/>
+              <a:t> </a:t>
+            </a:r>
+            <a:r>
+              <a:rPr lang="de-DE" sz="2000" dirty="0" err="1" smtClean="0"/>
+              <a:t>the</a:t>
+            </a:r>
+            <a:r>
+              <a:rPr lang="de-DE" sz="2000" dirty="0" smtClean="0"/>
+              <a:t> </a:t>
+            </a:r>
+            <a:r>
+              <a:rPr lang="de-DE" sz="2000" dirty="0" err="1" smtClean="0"/>
+              <a:t>predefined</a:t>
+            </a:r>
+            <a:r>
+              <a:rPr lang="de-DE" sz="2000" dirty="0" smtClean="0"/>
+              <a:t> 		</a:t>
+            </a:r>
+            <a:r>
+              <a:rPr lang="de-DE" sz="2000" dirty="0" err="1" smtClean="0"/>
+              <a:t>threshold</a:t>
             </a:r>
             <a:endParaRPr lang="de-DE" sz="2000" b="1" dirty="0"/>
           </a:p>
@@ -16193,7 +16882,7 @@
             <a:fld id="{3445AF6D-F46D-415C-AD3E-77E0038AE70E}" type="datetime1">
               <a:rPr lang="de-DE" smtClean="0"/>
               <a:pPr/>
-              <a:t>22.07.2013</a:t>
+              <a:t>23.07.2013</a:t>
             </a:fld>
             <a:endParaRPr lang="de-DE"/>
           </a:p>
@@ -16217,11 +16906,42 @@
             <a:pPr>
               <a:defRPr/>
             </a:pPr>
-            <a:r>
-              <a:rPr lang="de-DE" smtClean="0"/>
-              <a:t>Präsentationstitel</a:t>
-            </a:r>
-            <a:endParaRPr lang="de-DE"/>
+            <a:endParaRPr lang="de-DE" dirty="0" smtClean="0"/>
+          </a:p>
+          <a:p>
+            <a:pPr>
+              <a:defRPr/>
+            </a:pPr>
+            <a:r>
+              <a:rPr lang="de-DE" dirty="0" err="1" smtClean="0"/>
+              <a:t>Outlier</a:t>
+            </a:r>
+            <a:r>
+              <a:rPr lang="de-DE" dirty="0" smtClean="0"/>
+              <a:t> </a:t>
+            </a:r>
+            <a:r>
+              <a:rPr lang="de-DE" dirty="0" err="1"/>
+              <a:t>Detection</a:t>
+            </a:r>
+            <a:r>
+              <a:rPr lang="de-DE" dirty="0"/>
+              <a:t> in </a:t>
+            </a:r>
+            <a:r>
+              <a:rPr lang="de-DE" dirty="0" err="1"/>
+              <a:t>Condition</a:t>
+            </a:r>
+            <a:r>
+              <a:rPr lang="de-DE" dirty="0"/>
+              <a:t> Monitoring</a:t>
+            </a:r>
+          </a:p>
+          <a:p>
+            <a:pPr>
+              <a:defRPr/>
+            </a:pPr>
+            <a:endParaRPr lang="de-DE" dirty="0"/>
           </a:p>
         </p:txBody>
       </p:sp>
@@ -16277,484 +16997,355 @@
           </a:xfrm>
         </p:spPr>
       </p:pic>
-      <mc:AlternateContent xmlns:mc="http://schemas.openxmlformats.org/markup-compatibility/2006" xmlns:a14="http://schemas.microsoft.com/office/drawing/2010/main">
-        <mc:Choice Requires="a14">
-          <p:sp>
-            <p:nvSpPr>
-              <p:cNvPr id="9" name="Inhaltsplatzhalter 2"/>
-              <p:cNvSpPr>
-                <a:spLocks noGrp="1"/>
-              </p:cNvSpPr>
-              <p:nvPr>
-                <p:ph sz="half" idx="1"/>
-              </p:nvPr>
-            </p:nvSpPr>
-            <p:spPr>
-              <a:xfrm>
-                <a:off x="366713" y="1544638"/>
-                <a:ext cx="7704137" cy="2376487"/>
-              </a:xfrm>
-            </p:spPr>
-            <p:txBody>
-              <a:bodyPr/>
-              <a:lstStyle/>
-              <a:p>
-                <a:pPr marL="0" indent="0">
-                  <a:buNone/>
-                </a:pPr>
-                <a:r>
-                  <a:rPr lang="de-DE" sz="2000" b="1" dirty="0" err="1" smtClean="0"/>
-                  <a:t>Principle</a:t>
-                </a:r>
-                <a:r>
-                  <a:rPr lang="de-DE" sz="2000" b="1" dirty="0" smtClean="0"/>
-                  <a:t>:	</a:t>
-                </a:r>
-                <a:r>
-                  <a:rPr lang="de-DE" sz="2000" dirty="0" err="1" smtClean="0"/>
-                  <a:t>Distances</a:t>
-                </a:r>
-                <a:r>
-                  <a:rPr lang="de-DE" sz="2000" dirty="0" smtClean="0"/>
-                  <a:t> </a:t>
-                </a:r>
-                <a:r>
-                  <a:rPr lang="de-DE" sz="2000" dirty="0" err="1" smtClean="0"/>
-                  <a:t>between</a:t>
-                </a:r>
-                <a:r>
-                  <a:rPr lang="de-DE" sz="2000" dirty="0" smtClean="0"/>
-                  <a:t> </a:t>
-                </a:r>
-                <a:r>
-                  <a:rPr lang="de-DE" sz="2000" dirty="0" err="1" smtClean="0"/>
-                  <a:t>nearest</a:t>
-                </a:r>
-                <a:r>
-                  <a:rPr lang="de-DE" sz="2000" dirty="0" smtClean="0"/>
-                  <a:t> </a:t>
-                </a:r>
-                <a:r>
-                  <a:rPr lang="de-DE" sz="2000" dirty="0" err="1" smtClean="0"/>
-                  <a:t>data</a:t>
-                </a:r>
-                <a:r>
-                  <a:rPr lang="de-DE" sz="2000" dirty="0" smtClean="0"/>
-                  <a:t> </a:t>
-                </a:r>
-                <a:r>
-                  <a:rPr lang="de-DE" sz="2000" dirty="0" err="1" smtClean="0"/>
-                  <a:t>objects</a:t>
-                </a:r>
-                <a:endParaRPr lang="de-DE" sz="2000" b="1" dirty="0" smtClean="0"/>
-              </a:p>
-              <a:p>
-                <a:pPr marL="0" indent="0">
-                  <a:buNone/>
-                </a:pPr>
-                <a:r>
-                  <a:rPr lang="de-DE" sz="2000" b="1" dirty="0" smtClean="0"/>
-                  <a:t>Training:	</a:t>
-                </a:r>
-                <a:r>
-                  <a:rPr lang="de-DE" sz="2000" dirty="0" err="1" smtClean="0"/>
-                  <a:t>No</a:t>
-                </a:r>
-                <a:r>
-                  <a:rPr lang="de-DE" sz="2000" dirty="0" smtClean="0"/>
-                  <a:t> </a:t>
-                </a:r>
-                <a:r>
-                  <a:rPr lang="de-DE" sz="2000" dirty="0" err="1" smtClean="0"/>
-                  <a:t>training</a:t>
-                </a:r>
-                <a:r>
-                  <a:rPr lang="de-DE" sz="2000" dirty="0" smtClean="0"/>
-                  <a:t>, just </a:t>
-                </a:r>
-                <a:r>
-                  <a:rPr lang="de-DE" sz="2000" dirty="0" err="1" smtClean="0"/>
-                  <a:t>calculation</a:t>
-                </a:r>
-                <a:r>
-                  <a:rPr lang="de-DE" sz="2000" dirty="0" smtClean="0"/>
-                  <a:t> </a:t>
-                </a:r>
-                <a:r>
-                  <a:rPr lang="de-DE" sz="2000" dirty="0" err="1" smtClean="0"/>
-                  <a:t>of</a:t>
-                </a:r>
-                <a:r>
-                  <a:rPr lang="de-DE" sz="2000" dirty="0" smtClean="0"/>
-                  <a:t> an </a:t>
-                </a:r>
-                <a14:m>
-                  <m:oMath xmlns:m="http://schemas.openxmlformats.org/officeDocument/2006/math">
-                    <m:r>
-                      <a:rPr lang="de-DE" sz="2000" b="0" i="1" smtClean="0">
-                        <a:latin typeface="Cambria Math"/>
-                      </a:rPr>
-                      <m:t>𝑁</m:t>
-                    </m:r>
-                    <m:r>
-                      <a:rPr lang="de-DE" sz="2000" b="0" i="1" smtClean="0">
-                        <a:latin typeface="Cambria Math"/>
-                        <a:ea typeface="Cambria Math"/>
-                      </a:rPr>
-                      <m:t>×</m:t>
-                    </m:r>
-                    <m:r>
-                      <a:rPr lang="de-DE" sz="2000" b="0" i="1" smtClean="0">
-                        <a:latin typeface="Cambria Math"/>
-                        <a:ea typeface="Cambria Math"/>
-                      </a:rPr>
-                      <m:t>𝑁</m:t>
-                    </m:r>
-                  </m:oMath>
-                </a14:m>
-                <a:r>
-                  <a:rPr lang="de-DE" sz="2000" b="1" dirty="0" smtClean="0"/>
-                  <a:t> </a:t>
-                </a:r>
-                <a:r>
-                  <a:rPr lang="de-DE" sz="2000" dirty="0" err="1" smtClean="0"/>
-                  <a:t>distance</a:t>
-                </a:r>
-                <a:r>
-                  <a:rPr lang="de-DE" sz="2000" dirty="0"/>
-                  <a:t> 	</a:t>
-                </a:r>
-                <a:r>
-                  <a:rPr lang="de-DE" sz="2000" dirty="0" smtClean="0"/>
-                  <a:t>	</a:t>
-                </a:r>
-                <a:r>
-                  <a:rPr lang="de-DE" sz="2000" dirty="0" err="1" smtClean="0"/>
-                  <a:t>matrix</a:t>
-                </a:r>
-                <a:r>
-                  <a:rPr lang="de-DE" sz="2000" dirty="0" smtClean="0"/>
-                  <a:t> </a:t>
-                </a:r>
-                <a:r>
-                  <a:rPr lang="de-DE" sz="2000" dirty="0" err="1" smtClean="0"/>
-                  <a:t>for</a:t>
-                </a:r>
-                <a:r>
-                  <a:rPr lang="de-DE" sz="2000" dirty="0" smtClean="0"/>
-                  <a:t> </a:t>
-                </a:r>
-                <a:r>
-                  <a:rPr lang="de-DE" sz="2000" i="1" dirty="0" smtClean="0"/>
-                  <a:t>N </a:t>
-                </a:r>
-                <a:r>
-                  <a:rPr lang="de-DE" sz="2000" dirty="0" smtClean="0"/>
-                  <a:t>sample </a:t>
-                </a:r>
-                <a:r>
-                  <a:rPr lang="de-DE" sz="2000" dirty="0" err="1" smtClean="0"/>
-                  <a:t>target</a:t>
-                </a:r>
-                <a:r>
-                  <a:rPr lang="de-DE" sz="2000" dirty="0" smtClean="0"/>
-                  <a:t> </a:t>
-                </a:r>
-                <a:r>
-                  <a:rPr lang="de-DE" sz="2000" dirty="0" err="1" smtClean="0"/>
-                  <a:t>objects</a:t>
-                </a:r>
-                <a:endParaRPr lang="de-DE" sz="2000" b="1" dirty="0" smtClean="0"/>
-              </a:p>
-              <a:p>
-                <a:pPr marL="0" indent="0">
-                  <a:buNone/>
-                </a:pPr>
-                <a:r>
-                  <a:rPr lang="de-DE" sz="2000" b="1" dirty="0" err="1" smtClean="0"/>
-                  <a:t>Classification</a:t>
-                </a:r>
-                <a:r>
-                  <a:rPr lang="de-DE" sz="2000" b="1" dirty="0" smtClean="0"/>
-                  <a:t>:	</a:t>
-                </a:r>
-                <a:r>
-                  <a:rPr lang="de-DE" sz="2000" dirty="0" err="1" smtClean="0"/>
-                  <a:t>new</a:t>
-                </a:r>
-                <a:r>
-                  <a:rPr lang="de-DE" sz="2000" dirty="0" smtClean="0"/>
-                  <a:t> </a:t>
-                </a:r>
-                <a:r>
-                  <a:rPr lang="de-DE" sz="2000" dirty="0" err="1" smtClean="0"/>
-                  <a:t>objects</a:t>
-                </a:r>
-                <a:r>
-                  <a:rPr lang="de-DE" sz="2000" dirty="0" smtClean="0"/>
-                  <a:t> </a:t>
-                </a:r>
-                <a:r>
-                  <a:rPr lang="de-DE" sz="2000" dirty="0" err="1" smtClean="0"/>
-                  <a:t>are</a:t>
-                </a:r>
-                <a:r>
-                  <a:rPr lang="de-DE" sz="2000" dirty="0" smtClean="0"/>
-                  <a:t> </a:t>
-                </a:r>
-                <a:r>
-                  <a:rPr lang="de-DE" sz="2000" dirty="0" err="1" smtClean="0"/>
-                  <a:t>target</a:t>
-                </a:r>
-                <a:r>
-                  <a:rPr lang="de-DE" sz="2000" dirty="0" smtClean="0"/>
-                  <a:t> </a:t>
-                </a:r>
-                <a:r>
-                  <a:rPr lang="de-DE" sz="2000" dirty="0" err="1" smtClean="0"/>
-                  <a:t>objects</a:t>
-                </a:r>
-                <a:r>
-                  <a:rPr lang="de-DE" sz="2000" dirty="0" smtClean="0"/>
-                  <a:t> </a:t>
-                </a:r>
-                <a:r>
-                  <a:rPr lang="de-DE" sz="2000" dirty="0" err="1" smtClean="0"/>
-                  <a:t>if</a:t>
-                </a:r>
-                <a:r>
-                  <a:rPr lang="de-DE" sz="2000" dirty="0" smtClean="0"/>
-                  <a:t> </a:t>
-                </a:r>
-                <a:r>
-                  <a:rPr lang="de-DE" sz="2000" dirty="0" err="1" smtClean="0"/>
-                  <a:t>their</a:t>
-                </a:r>
-                <a:r>
-                  <a:rPr lang="de-DE" sz="2000" dirty="0" smtClean="0"/>
-                  <a:t> </a:t>
-                </a:r>
-                <a:r>
-                  <a:rPr lang="de-DE" sz="2000" dirty="0" err="1" smtClean="0"/>
-                  <a:t>distance</a:t>
-                </a:r>
-                <a:r>
-                  <a:rPr lang="de-DE" sz="2000" dirty="0" smtClean="0"/>
-                  <a:t> </a:t>
-                </a:r>
-                <a:r>
-                  <a:rPr lang="de-DE" sz="2000" dirty="0" err="1" smtClean="0"/>
-                  <a:t>to</a:t>
-                </a:r>
-                <a:r>
-                  <a:rPr lang="de-DE" sz="2000" dirty="0" smtClean="0"/>
-                  <a:t>  </a:t>
-                </a:r>
-                <a:r>
-                  <a:rPr lang="de-DE" sz="2000" dirty="0"/>
-                  <a:t>	</a:t>
-                </a:r>
-                <a:r>
-                  <a:rPr lang="de-DE" sz="2000" dirty="0" smtClean="0"/>
-                  <a:t>	</a:t>
-                </a:r>
-                <a:r>
-                  <a:rPr lang="de-DE" sz="2000" dirty="0" err="1" smtClean="0"/>
-                  <a:t>the</a:t>
-                </a:r>
-                <a:r>
-                  <a:rPr lang="de-DE" sz="2000" dirty="0" smtClean="0"/>
-                  <a:t> </a:t>
-                </a:r>
-                <a:r>
-                  <a:rPr lang="de-DE" sz="2000" dirty="0" err="1" smtClean="0"/>
-                  <a:t>nearest</a:t>
-                </a:r>
-                <a:r>
-                  <a:rPr lang="de-DE" sz="2000" dirty="0" smtClean="0"/>
-                  <a:t> sample </a:t>
-                </a:r>
-                <a:r>
-                  <a:rPr lang="de-DE" sz="2000" dirty="0" err="1" smtClean="0"/>
-                  <a:t>target</a:t>
-                </a:r>
-                <a:r>
-                  <a:rPr lang="de-DE" sz="2000" dirty="0" smtClean="0"/>
-                  <a:t> </a:t>
-                </a:r>
-                <a:r>
-                  <a:rPr lang="de-DE" sz="2000" dirty="0" err="1" smtClean="0"/>
-                  <a:t>object</a:t>
-                </a:r>
-                <a:r>
-                  <a:rPr lang="de-DE" sz="2000" dirty="0" smtClean="0"/>
-                  <a:t> </a:t>
-                </a:r>
-                <a:r>
-                  <a:rPr lang="de-DE" sz="2000" dirty="0" err="1" smtClean="0"/>
-                  <a:t>is</a:t>
-                </a:r>
-                <a:r>
-                  <a:rPr lang="de-DE" sz="2000" dirty="0" smtClean="0"/>
-                  <a:t> </a:t>
-                </a:r>
-                <a:r>
-                  <a:rPr lang="de-DE" sz="2000" dirty="0" err="1" smtClean="0"/>
-                  <a:t>smaller</a:t>
-                </a:r>
-                <a:r>
-                  <a:rPr lang="de-DE" sz="2000" dirty="0" smtClean="0"/>
-                  <a:t> </a:t>
-                </a:r>
-                <a:r>
-                  <a:rPr lang="de-DE" sz="2000" dirty="0" err="1" smtClean="0"/>
-                  <a:t>than</a:t>
-                </a:r>
-                <a:r>
-                  <a:rPr lang="de-DE" sz="2000" dirty="0" smtClean="0"/>
-                  <a:t> </a:t>
-                </a:r>
-                <a:r>
-                  <a:rPr lang="de-DE" sz="2000" dirty="0" err="1" smtClean="0"/>
-                  <a:t>the</a:t>
-                </a:r>
-                <a:endParaRPr lang="de-DE" sz="2000" dirty="0" smtClean="0"/>
-              </a:p>
-              <a:p>
-                <a:pPr marL="0" indent="0">
-                  <a:buNone/>
-                </a:pPr>
-                <a:r>
-                  <a:rPr lang="de-DE" sz="2000" b="1" dirty="0"/>
-                  <a:t>	</a:t>
-                </a:r>
-                <a:r>
-                  <a:rPr lang="de-DE" sz="2000" b="1" dirty="0" smtClean="0"/>
-                  <a:t>	</a:t>
-                </a:r>
-                <a:r>
-                  <a:rPr lang="de-DE" sz="2000" dirty="0" err="1" smtClean="0"/>
-                  <a:t>distance</a:t>
-                </a:r>
-                <a:r>
-                  <a:rPr lang="de-DE" sz="2000" dirty="0" smtClean="0"/>
-                  <a:t> </a:t>
-                </a:r>
-                <a:r>
-                  <a:rPr lang="de-DE" sz="2000" dirty="0" err="1" smtClean="0"/>
-                  <a:t>of</a:t>
-                </a:r>
-                <a:r>
-                  <a:rPr lang="de-DE" sz="2000" dirty="0" smtClean="0"/>
-                  <a:t> </a:t>
-                </a:r>
-                <a:r>
-                  <a:rPr lang="de-DE" sz="2000" dirty="0" err="1" smtClean="0"/>
-                  <a:t>the</a:t>
-                </a:r>
-                <a:r>
-                  <a:rPr lang="de-DE" sz="2000" dirty="0" smtClean="0"/>
-                  <a:t> </a:t>
-                </a:r>
-                <a:r>
-                  <a:rPr lang="de-DE" sz="2000" dirty="0" err="1" smtClean="0"/>
-                  <a:t>nearest</a:t>
-                </a:r>
-                <a:r>
-                  <a:rPr lang="de-DE" sz="2000" dirty="0"/>
-                  <a:t> </a:t>
-                </a:r>
-                <a:r>
-                  <a:rPr lang="de-DE" sz="2000" dirty="0" err="1"/>
-                  <a:t>target</a:t>
-                </a:r>
-                <a:r>
-                  <a:rPr lang="de-DE" sz="2000" dirty="0"/>
-                  <a:t> </a:t>
-                </a:r>
-                <a:r>
-                  <a:rPr lang="de-DE" sz="2000" dirty="0" err="1" smtClean="0"/>
-                  <a:t>object</a:t>
-                </a:r>
-                <a:r>
-                  <a:rPr lang="de-DE" sz="2000" dirty="0" smtClean="0"/>
-                  <a:t> </a:t>
-                </a:r>
-                <a:r>
-                  <a:rPr lang="de-DE" sz="2000" dirty="0" err="1" smtClean="0"/>
-                  <a:t>to</a:t>
-                </a:r>
-                <a:r>
-                  <a:rPr lang="de-DE" sz="2000" dirty="0" smtClean="0"/>
-                  <a:t> </a:t>
-                </a:r>
-                <a:r>
-                  <a:rPr lang="de-DE" sz="2000" dirty="0" err="1" smtClean="0"/>
-                  <a:t>its</a:t>
-                </a:r>
-                <a:r>
-                  <a:rPr lang="de-DE" sz="2000" dirty="0" smtClean="0"/>
-                  <a:t> </a:t>
-                </a:r>
-                <a:r>
-                  <a:rPr lang="de-DE" sz="2000" dirty="0" err="1" smtClean="0"/>
-                  <a:t>nearest</a:t>
-                </a:r>
-                <a:r>
-                  <a:rPr lang="de-DE" sz="2000" b="1" dirty="0"/>
-                  <a:t> 	</a:t>
-                </a:r>
-                <a:r>
-                  <a:rPr lang="de-DE" sz="2000" b="1" dirty="0" smtClean="0"/>
-                  <a:t>	</a:t>
-                </a:r>
-                <a:r>
-                  <a:rPr lang="de-DE" sz="2000" dirty="0" err="1" smtClean="0"/>
-                  <a:t>neighbor</a:t>
-                </a:r>
-                <a:endParaRPr lang="de-DE" sz="2000" dirty="0" smtClean="0"/>
-              </a:p>
-            </p:txBody>
-          </p:sp>
-        </mc:Choice>
-        <mc:Fallback xmlns="">
-          <p:sp>
-            <p:nvSpPr>
-              <p:cNvPr id="9" name="Inhaltsplatzhalter 2"/>
-              <p:cNvSpPr>
-                <a:spLocks noGrp="1" noRot="1" noChangeAspect="1" noMove="1" noResize="1" noEditPoints="1" noAdjustHandles="1" noChangeArrowheads="1" noChangeShapeType="1" noTextEdit="1"/>
-              </p:cNvSpPr>
-              <p:nvPr>
-                <p:ph sz="half" idx="1"/>
-              </p:nvPr>
-            </p:nvSpPr>
-            <p:spPr>
-              <a:xfrm>
-                <a:off x="366713" y="1544638"/>
-                <a:ext cx="7704137" cy="2376487"/>
-              </a:xfrm>
-              <a:blipFill rotWithShape="1">
-                <a:blip r:embed="rId3"/>
-                <a:stretch>
-                  <a:fillRect l="-1978" t="-2821" r="-475" b="-4359"/>
-                </a:stretch>
-              </a:blipFill>
-            </p:spPr>
-            <p:txBody>
-              <a:bodyPr/>
-              <a:lstStyle/>
-              <a:p>
-                <a:r>
-                  <a:rPr lang="de-DE">
-                    <a:noFill/>
-                  </a:rPr>
-                  <a:t> </a:t>
-                </a:r>
-              </a:p>
-            </p:txBody>
-          </p:sp>
-        </mc:Fallback>
-      </mc:AlternateContent>
+      <p:sp>
+        <p:nvSpPr>
+          <p:cNvPr id="9" name="Inhaltsplatzhalter 2"/>
+          <p:cNvSpPr>
+            <a:spLocks noGrp="1"/>
+          </p:cNvSpPr>
+          <p:nvPr>
+            <p:ph sz="half" idx="1"/>
+          </p:nvPr>
+        </p:nvSpPr>
+        <p:spPr>
+          <a:xfrm>
+            <a:off x="366713" y="1544638"/>
+            <a:ext cx="7704137" cy="2376487"/>
+          </a:xfrm>
+        </p:spPr>
+        <p:txBody>
+          <a:bodyPr/>
+          <a:lstStyle/>
+          <a:p>
+            <a:pPr marL="0" indent="0">
+              <a:buNone/>
+            </a:pPr>
+            <a:r>
+              <a:rPr lang="de-DE" sz="2000" b="1" dirty="0" err="1" smtClean="0"/>
+              <a:t>Principle</a:t>
+            </a:r>
+            <a:r>
+              <a:rPr lang="de-DE" sz="2000" b="1" dirty="0" smtClean="0"/>
+              <a:t>:	</a:t>
+            </a:r>
+            <a:r>
+              <a:rPr lang="de-DE" sz="2000" dirty="0" err="1" smtClean="0"/>
+              <a:t>Distances</a:t>
+            </a:r>
+            <a:r>
+              <a:rPr lang="de-DE" sz="2000" dirty="0" smtClean="0"/>
+              <a:t> </a:t>
+            </a:r>
+            <a:r>
+              <a:rPr lang="de-DE" sz="2000" dirty="0" err="1" smtClean="0"/>
+              <a:t>between</a:t>
+            </a:r>
+            <a:r>
+              <a:rPr lang="de-DE" sz="2000" dirty="0" smtClean="0"/>
+              <a:t> </a:t>
+            </a:r>
+            <a:r>
+              <a:rPr lang="de-DE" sz="2000" dirty="0" err="1" smtClean="0"/>
+              <a:t>nearest</a:t>
+            </a:r>
+            <a:r>
+              <a:rPr lang="de-DE" sz="2000" dirty="0" smtClean="0"/>
+              <a:t> </a:t>
+            </a:r>
+            <a:r>
+              <a:rPr lang="de-DE" sz="2000" dirty="0" err="1" smtClean="0"/>
+              <a:t>data</a:t>
+            </a:r>
+            <a:r>
+              <a:rPr lang="de-DE" sz="2000" dirty="0" smtClean="0"/>
+              <a:t> </a:t>
+            </a:r>
+            <a:r>
+              <a:rPr lang="de-DE" sz="2000" dirty="0" err="1" smtClean="0"/>
+              <a:t>objects</a:t>
+            </a:r>
+            <a:endParaRPr lang="de-DE" sz="2000" b="1" dirty="0" smtClean="0"/>
+          </a:p>
+          <a:p>
+            <a:pPr marL="0" indent="0">
+              <a:buNone/>
+            </a:pPr>
+            <a:r>
+              <a:rPr lang="de-DE" sz="2000" b="1" dirty="0" smtClean="0"/>
+              <a:t>Training:	</a:t>
+            </a:r>
+            <a:r>
+              <a:rPr lang="de-DE" sz="2000" dirty="0" err="1" smtClean="0"/>
+              <a:t>No</a:t>
+            </a:r>
+            <a:r>
+              <a:rPr lang="de-DE" sz="2000" dirty="0" smtClean="0"/>
+              <a:t> </a:t>
+            </a:r>
+            <a:r>
+              <a:rPr lang="de-DE" sz="2000" dirty="0" err="1" smtClean="0"/>
+              <a:t>training</a:t>
+            </a:r>
+            <a:r>
+              <a:rPr lang="de-DE" sz="2000" dirty="0" smtClean="0"/>
+              <a:t> </a:t>
+            </a:r>
+            <a:r>
+              <a:rPr lang="de-DE" sz="2000" dirty="0" err="1" smtClean="0"/>
+              <a:t>required</a:t>
+            </a:r>
+            <a:endParaRPr lang="de-DE" sz="2000" dirty="0" smtClean="0"/>
+          </a:p>
+          <a:p>
+            <a:pPr marL="0" indent="0">
+              <a:buNone/>
+            </a:pPr>
+            <a:r>
+              <a:rPr lang="de-DE" sz="2000" b="1" dirty="0" err="1" smtClean="0"/>
+              <a:t>Classification</a:t>
+            </a:r>
+            <a:r>
+              <a:rPr lang="de-DE" sz="2000" b="1" dirty="0" smtClean="0"/>
+              <a:t>:	</a:t>
+            </a:r>
+            <a:r>
+              <a:rPr lang="de-DE" sz="2000" dirty="0" err="1" smtClean="0"/>
+              <a:t>new</a:t>
+            </a:r>
+            <a:r>
+              <a:rPr lang="de-DE" sz="2000" dirty="0" smtClean="0"/>
+              <a:t> </a:t>
+            </a:r>
+            <a:r>
+              <a:rPr lang="de-DE" sz="2000" dirty="0" err="1" smtClean="0"/>
+              <a:t>objects</a:t>
+            </a:r>
+            <a:r>
+              <a:rPr lang="de-DE" sz="2000" dirty="0" smtClean="0"/>
+              <a:t> </a:t>
+            </a:r>
+            <a:r>
+              <a:rPr lang="de-DE" sz="2000" dirty="0" err="1" smtClean="0"/>
+              <a:t>are</a:t>
+            </a:r>
+            <a:r>
+              <a:rPr lang="de-DE" sz="2000" dirty="0" smtClean="0"/>
+              <a:t> </a:t>
+            </a:r>
+            <a:r>
+              <a:rPr lang="de-DE" sz="2000" dirty="0" err="1" smtClean="0"/>
+              <a:t>target</a:t>
+            </a:r>
+            <a:r>
+              <a:rPr lang="de-DE" sz="2000" dirty="0" smtClean="0"/>
+              <a:t> </a:t>
+            </a:r>
+            <a:r>
+              <a:rPr lang="de-DE" sz="2000" dirty="0" err="1" smtClean="0"/>
+              <a:t>objects</a:t>
+            </a:r>
+            <a:r>
+              <a:rPr lang="de-DE" sz="2000" dirty="0" smtClean="0"/>
+              <a:t> </a:t>
+            </a:r>
+            <a:r>
+              <a:rPr lang="de-DE" sz="2000" dirty="0" err="1" smtClean="0"/>
+              <a:t>if</a:t>
+            </a:r>
+            <a:r>
+              <a:rPr lang="de-DE" sz="2000" dirty="0" smtClean="0"/>
+              <a:t> </a:t>
+            </a:r>
+            <a:r>
+              <a:rPr lang="de-DE" sz="2000" dirty="0" err="1" smtClean="0"/>
+              <a:t>their</a:t>
+            </a:r>
+            <a:r>
+              <a:rPr lang="de-DE" sz="2000" dirty="0" smtClean="0"/>
+              <a:t> </a:t>
+            </a:r>
+            <a:r>
+              <a:rPr lang="de-DE" sz="2000" dirty="0" err="1" smtClean="0"/>
+              <a:t>distance</a:t>
+            </a:r>
+            <a:r>
+              <a:rPr lang="de-DE" sz="2000" dirty="0" smtClean="0"/>
+              <a:t> </a:t>
+            </a:r>
+            <a:r>
+              <a:rPr lang="de-DE" sz="2000" dirty="0" err="1" smtClean="0"/>
+              <a:t>to</a:t>
+            </a:r>
+            <a:r>
+              <a:rPr lang="de-DE" sz="2000" dirty="0" smtClean="0"/>
+              <a:t>  </a:t>
+            </a:r>
+            <a:r>
+              <a:rPr lang="de-DE" sz="2000" dirty="0"/>
+              <a:t>	</a:t>
+            </a:r>
+            <a:r>
+              <a:rPr lang="de-DE" sz="2000" dirty="0" smtClean="0"/>
+              <a:t>	</a:t>
+            </a:r>
+            <a:r>
+              <a:rPr lang="de-DE" sz="2000" dirty="0" err="1" smtClean="0"/>
+              <a:t>the</a:t>
+            </a:r>
+            <a:r>
+              <a:rPr lang="de-DE" sz="2000" dirty="0" smtClean="0"/>
+              <a:t> </a:t>
+            </a:r>
+            <a:r>
+              <a:rPr lang="de-DE" sz="2000" dirty="0" err="1" smtClean="0"/>
+              <a:t>nearest</a:t>
+            </a:r>
+            <a:r>
+              <a:rPr lang="de-DE" sz="2000" dirty="0" smtClean="0"/>
+              <a:t> sample </a:t>
+            </a:r>
+            <a:r>
+              <a:rPr lang="de-DE" sz="2000" dirty="0" err="1" smtClean="0"/>
+              <a:t>target</a:t>
+            </a:r>
+            <a:r>
+              <a:rPr lang="de-DE" sz="2000" dirty="0" smtClean="0"/>
+              <a:t> </a:t>
+            </a:r>
+            <a:r>
+              <a:rPr lang="de-DE" sz="2000" dirty="0" err="1" smtClean="0"/>
+              <a:t>object</a:t>
+            </a:r>
+            <a:r>
+              <a:rPr lang="de-DE" sz="2000" dirty="0" smtClean="0"/>
+              <a:t> </a:t>
+            </a:r>
+            <a:r>
+              <a:rPr lang="de-DE" sz="2000" dirty="0" err="1" smtClean="0"/>
+              <a:t>is</a:t>
+            </a:r>
+            <a:r>
+              <a:rPr lang="de-DE" sz="2000" dirty="0" smtClean="0"/>
+              <a:t> </a:t>
+            </a:r>
+            <a:r>
+              <a:rPr lang="de-DE" sz="2000" dirty="0" err="1" smtClean="0"/>
+              <a:t>smaller</a:t>
+            </a:r>
+            <a:r>
+              <a:rPr lang="de-DE" sz="2000" dirty="0" smtClean="0"/>
+              <a:t> </a:t>
+            </a:r>
+            <a:r>
+              <a:rPr lang="de-DE" sz="2000" dirty="0" err="1" smtClean="0"/>
+              <a:t>than</a:t>
+            </a:r>
+            <a:r>
+              <a:rPr lang="de-DE" sz="2000" dirty="0" smtClean="0"/>
+              <a:t> </a:t>
+            </a:r>
+            <a:r>
+              <a:rPr lang="de-DE" sz="2000" dirty="0" err="1" smtClean="0"/>
+              <a:t>the</a:t>
+            </a:r>
+            <a:endParaRPr lang="de-DE" sz="2000" dirty="0" smtClean="0"/>
+          </a:p>
+          <a:p>
+            <a:pPr marL="0" indent="0">
+              <a:buNone/>
+            </a:pPr>
+            <a:r>
+              <a:rPr lang="de-DE" sz="2000" b="1" dirty="0"/>
+              <a:t>	</a:t>
+            </a:r>
+            <a:r>
+              <a:rPr lang="de-DE" sz="2000" b="1" dirty="0" smtClean="0"/>
+              <a:t>	</a:t>
+            </a:r>
+            <a:r>
+              <a:rPr lang="de-DE" sz="2000" dirty="0" err="1" smtClean="0"/>
+              <a:t>distance</a:t>
+            </a:r>
+            <a:r>
+              <a:rPr lang="de-DE" sz="2000" dirty="0" smtClean="0"/>
+              <a:t> </a:t>
+            </a:r>
+            <a:r>
+              <a:rPr lang="de-DE" sz="2000" dirty="0" err="1" smtClean="0"/>
+              <a:t>of</a:t>
+            </a:r>
+            <a:r>
+              <a:rPr lang="de-DE" sz="2000" dirty="0" smtClean="0"/>
+              <a:t> </a:t>
+            </a:r>
+            <a:r>
+              <a:rPr lang="de-DE" sz="2000" dirty="0" err="1" smtClean="0"/>
+              <a:t>the</a:t>
+            </a:r>
+            <a:r>
+              <a:rPr lang="de-DE" sz="2000" dirty="0" smtClean="0"/>
+              <a:t> </a:t>
+            </a:r>
+            <a:r>
+              <a:rPr lang="de-DE" sz="2000" dirty="0" err="1" smtClean="0"/>
+              <a:t>nearest</a:t>
+            </a:r>
+            <a:r>
+              <a:rPr lang="de-DE" sz="2000" dirty="0"/>
+              <a:t> </a:t>
+            </a:r>
+            <a:r>
+              <a:rPr lang="de-DE" sz="2000" dirty="0" err="1"/>
+              <a:t>target</a:t>
+            </a:r>
+            <a:r>
+              <a:rPr lang="de-DE" sz="2000" dirty="0"/>
+              <a:t> </a:t>
+            </a:r>
+            <a:r>
+              <a:rPr lang="de-DE" sz="2000" dirty="0" err="1" smtClean="0"/>
+              <a:t>object</a:t>
+            </a:r>
+            <a:r>
+              <a:rPr lang="de-DE" sz="2000" dirty="0" smtClean="0"/>
+              <a:t> </a:t>
+            </a:r>
+            <a:r>
+              <a:rPr lang="de-DE" sz="2000" dirty="0" err="1" smtClean="0"/>
+              <a:t>to</a:t>
+            </a:r>
+            <a:r>
+              <a:rPr lang="de-DE" sz="2000" dirty="0" smtClean="0"/>
+              <a:t> </a:t>
+            </a:r>
+            <a:r>
+              <a:rPr lang="de-DE" sz="2000" dirty="0" err="1" smtClean="0"/>
+              <a:t>its</a:t>
+            </a:r>
+            <a:r>
+              <a:rPr lang="de-DE" sz="2000" dirty="0" smtClean="0"/>
+              <a:t> </a:t>
+            </a:r>
+            <a:r>
+              <a:rPr lang="de-DE" sz="2000" dirty="0" err="1" smtClean="0"/>
+              <a:t>nearest</a:t>
+            </a:r>
+            <a:r>
+              <a:rPr lang="de-DE" sz="2000" b="1" dirty="0"/>
+              <a:t> 	</a:t>
+            </a:r>
+            <a:r>
+              <a:rPr lang="de-DE" sz="2000" b="1" dirty="0" smtClean="0"/>
+              <a:t>	</a:t>
+            </a:r>
+            <a:r>
+              <a:rPr lang="de-DE" sz="2000" dirty="0" err="1" smtClean="0"/>
+              <a:t>neighbor</a:t>
+            </a:r>
+            <a:endParaRPr lang="de-DE" sz="2000" dirty="0" smtClean="0"/>
+          </a:p>
+        </p:txBody>
+      </p:sp>
     </p:spTree>
     <p:extLst>
       <p:ext uri="{BB962C8B-B14F-4D97-AF65-F5344CB8AC3E}">
@@ -16840,7 +17431,7 @@
             <a:fld id="{3445AF6D-F46D-415C-AD3E-77E0038AE70E}" type="datetime1">
               <a:rPr lang="de-DE" smtClean="0"/>
               <a:pPr/>
-              <a:t>22.07.2013</a:t>
+              <a:t>23.07.2013</a:t>
             </a:fld>
             <a:endParaRPr lang="de-DE"/>
           </a:p>
@@ -16864,11 +17455,54 @@
             <a:pPr>
               <a:defRPr/>
             </a:pPr>
-            <a:r>
-              <a:rPr lang="de-DE" smtClean="0"/>
-              <a:t>Präsentationstitel</a:t>
-            </a:r>
-            <a:endParaRPr lang="de-DE"/>
+            <a:endParaRPr lang="de-DE" dirty="0" smtClean="0"/>
+          </a:p>
+          <a:p>
+            <a:pPr>
+              <a:defRPr/>
+            </a:pPr>
+            <a:endParaRPr lang="de-DE" dirty="0"/>
+          </a:p>
+          <a:p>
+            <a:pPr>
+              <a:defRPr/>
+            </a:pPr>
+            <a:r>
+              <a:rPr lang="de-DE" dirty="0" err="1" smtClean="0"/>
+              <a:t>Outlier</a:t>
+            </a:r>
+            <a:r>
+              <a:rPr lang="de-DE" dirty="0" smtClean="0"/>
+              <a:t> </a:t>
+            </a:r>
+            <a:r>
+              <a:rPr lang="de-DE" dirty="0" err="1"/>
+              <a:t>Detection</a:t>
+            </a:r>
+            <a:r>
+              <a:rPr lang="de-DE" dirty="0"/>
+              <a:t> in </a:t>
+            </a:r>
+            <a:r>
+              <a:rPr lang="de-DE" dirty="0" err="1"/>
+              <a:t>Condition</a:t>
+            </a:r>
+            <a:r>
+              <a:rPr lang="de-DE" dirty="0"/>
+              <a:t> Monitoring</a:t>
+            </a:r>
+          </a:p>
+          <a:p>
+            <a:pPr>
+              <a:defRPr/>
+            </a:pPr>
+            <a:endParaRPr lang="de-DE" dirty="0" smtClean="0"/>
+          </a:p>
+          <a:p>
+            <a:pPr>
+              <a:defRPr/>
+            </a:pPr>
+            <a:endParaRPr lang="de-DE" dirty="0"/>
           </a:p>
         </p:txBody>
       </p:sp>
@@ -17417,7 +18051,7 @@
             <a:fld id="{3445AF6D-F46D-415C-AD3E-77E0038AE70E}" type="datetime1">
               <a:rPr lang="de-DE" smtClean="0"/>
               <a:pPr/>
-              <a:t>22.07.2013</a:t>
+              <a:t>23.07.2013</a:t>
             </a:fld>
             <a:endParaRPr lang="de-DE"/>
           </a:p>
@@ -17441,11 +18075,42 @@
             <a:pPr>
               <a:defRPr/>
             </a:pPr>
-            <a:r>
-              <a:rPr lang="de-DE" smtClean="0"/>
-              <a:t>Präsentationstitel</a:t>
-            </a:r>
-            <a:endParaRPr lang="de-DE"/>
+            <a:endParaRPr lang="de-DE" dirty="0" smtClean="0"/>
+          </a:p>
+          <a:p>
+            <a:pPr>
+              <a:defRPr/>
+            </a:pPr>
+            <a:r>
+              <a:rPr lang="de-DE" dirty="0" err="1" smtClean="0"/>
+              <a:t>Outlier</a:t>
+            </a:r>
+            <a:r>
+              <a:rPr lang="de-DE" dirty="0" smtClean="0"/>
+              <a:t> </a:t>
+            </a:r>
+            <a:r>
+              <a:rPr lang="de-DE" dirty="0" err="1"/>
+              <a:t>Detection</a:t>
+            </a:r>
+            <a:r>
+              <a:rPr lang="de-DE" dirty="0"/>
+              <a:t> in </a:t>
+            </a:r>
+            <a:r>
+              <a:rPr lang="de-DE" dirty="0" err="1"/>
+              <a:t>Condition</a:t>
+            </a:r>
+            <a:r>
+              <a:rPr lang="de-DE" dirty="0"/>
+              <a:t> Monitoring</a:t>
+            </a:r>
+          </a:p>
+          <a:p>
+            <a:pPr>
+              <a:defRPr/>
+            </a:pPr>
+            <a:endParaRPr lang="de-DE" dirty="0"/>
           </a:p>
         </p:txBody>
       </p:sp>
@@ -17844,11 +18509,19 @@
             </a:r>
             <a:r>
               <a:rPr lang="de-DE" sz="2000" dirty="0" smtClean="0"/>
-              <a:t> a </a:t>
+              <a:t> </a:t>
             </a:r>
             <a:r>
               <a:rPr lang="de-DE" sz="2000" dirty="0" err="1" smtClean="0"/>
-              <a:t>certain</a:t>
+              <a:t>the</a:t>
+            </a:r>
+            <a:r>
+              <a:rPr lang="de-DE" sz="2000" dirty="0" smtClean="0"/>
+              <a:t> </a:t>
+            </a:r>
+            <a:r>
+              <a:rPr lang="de-DE" sz="2000" dirty="0" err="1" smtClean="0"/>
+              <a:t>predefined</a:t>
             </a:r>
             <a:r>
               <a:rPr lang="de-DE" sz="2000" dirty="0" smtClean="0"/>
@@ -17860,7 +18533,7 @@
             </a:r>
             <a:r>
               <a:rPr lang="de-DE" sz="2000" dirty="0" smtClean="0"/>
-              <a:t>,  	           		</a:t>
+              <a:t>,  	           	</a:t>
             </a:r>
             <a:r>
               <a:rPr lang="de-DE" sz="2000" dirty="0" err="1" smtClean="0"/>
@@ -17960,7 +18633,7 @@
             <a:fld id="{03B44CDA-7D88-4264-B0E0-D9AD28CBE73B}" type="datetime1">
               <a:rPr lang="de-DE" smtClean="0"/>
               <a:pPr/>
-              <a:t>22.07.2013</a:t>
+              <a:t>23.07.2013</a:t>
             </a:fld>
             <a:endParaRPr lang="de-DE"/>
           </a:p>
@@ -17984,11 +18657,42 @@
             <a:pPr>
               <a:defRPr/>
             </a:pPr>
-            <a:r>
-              <a:rPr lang="de-DE" smtClean="0"/>
-              <a:t>Präsentationstitel</a:t>
-            </a:r>
-            <a:endParaRPr lang="de-DE"/>
+            <a:endParaRPr lang="de-DE" dirty="0" smtClean="0"/>
+          </a:p>
+          <a:p>
+            <a:pPr>
+              <a:defRPr/>
+            </a:pPr>
+            <a:r>
+              <a:rPr lang="de-DE" dirty="0" err="1" smtClean="0"/>
+              <a:t>Outlier</a:t>
+            </a:r>
+            <a:r>
+              <a:rPr lang="de-DE" dirty="0" smtClean="0"/>
+              <a:t> </a:t>
+            </a:r>
+            <a:r>
+              <a:rPr lang="de-DE" dirty="0" err="1"/>
+              <a:t>Detection</a:t>
+            </a:r>
+            <a:r>
+              <a:rPr lang="de-DE" dirty="0"/>
+              <a:t> in </a:t>
+            </a:r>
+            <a:r>
+              <a:rPr lang="de-DE" dirty="0" err="1"/>
+              <a:t>Condition</a:t>
+            </a:r>
+            <a:r>
+              <a:rPr lang="de-DE" dirty="0"/>
+              <a:t> Monitoring</a:t>
+            </a:r>
+          </a:p>
+          <a:p>
+            <a:pPr>
+              <a:defRPr/>
+            </a:pPr>
+            <a:endParaRPr lang="de-DE" dirty="0"/>
           </a:p>
         </p:txBody>
       </p:sp>
@@ -18561,7 +19265,7 @@
             <a:fld id="{03B44CDA-7D88-4264-B0E0-D9AD28CBE73B}" type="datetime1">
               <a:rPr lang="de-DE" smtClean="0"/>
               <a:pPr/>
-              <a:t>22.07.2013</a:t>
+              <a:t>23.07.2013</a:t>
             </a:fld>
             <a:endParaRPr lang="de-DE"/>
           </a:p>
@@ -18585,11 +19289,42 @@
             <a:pPr>
               <a:defRPr/>
             </a:pPr>
-            <a:r>
-              <a:rPr lang="de-DE" smtClean="0"/>
-              <a:t>Präsentationstitel</a:t>
-            </a:r>
-            <a:endParaRPr lang="de-DE"/>
+            <a:endParaRPr lang="de-DE" dirty="0" smtClean="0"/>
+          </a:p>
+          <a:p>
+            <a:pPr>
+              <a:defRPr/>
+            </a:pPr>
+            <a:r>
+              <a:rPr lang="de-DE" dirty="0" err="1" smtClean="0"/>
+              <a:t>Outlier</a:t>
+            </a:r>
+            <a:r>
+              <a:rPr lang="de-DE" dirty="0" smtClean="0"/>
+              <a:t> </a:t>
+            </a:r>
+            <a:r>
+              <a:rPr lang="de-DE" dirty="0" err="1"/>
+              <a:t>Detection</a:t>
+            </a:r>
+            <a:r>
+              <a:rPr lang="de-DE" dirty="0"/>
+              <a:t> in </a:t>
+            </a:r>
+            <a:r>
+              <a:rPr lang="de-DE" dirty="0" err="1"/>
+              <a:t>Condition</a:t>
+            </a:r>
+            <a:r>
+              <a:rPr lang="de-DE" dirty="0"/>
+              <a:t> Monitoring</a:t>
+            </a:r>
+          </a:p>
+          <a:p>
+            <a:pPr>
+              <a:defRPr/>
+            </a:pPr>
+            <a:endParaRPr lang="de-DE" dirty="0"/>
           </a:p>
         </p:txBody>
       </p:sp>
@@ -19121,7 +19856,7 @@
             <a:fld id="{1F1E0E69-EC8C-4B55-B000-A21B4F200C17}" type="datetime1">
               <a:rPr lang="de-DE" smtClean="0"/>
               <a:pPr/>
-              <a:t>22.07.2013</a:t>
+              <a:t>23.07.2013</a:t>
             </a:fld>
             <a:endParaRPr lang="de-DE"/>
           </a:p>
@@ -19145,11 +19880,42 @@
             <a:pPr>
               <a:defRPr/>
             </a:pPr>
-            <a:r>
-              <a:rPr lang="de-DE" smtClean="0"/>
-              <a:t>Präsentationstitel</a:t>
-            </a:r>
-            <a:endParaRPr lang="de-DE"/>
+            <a:endParaRPr lang="de-DE" dirty="0" smtClean="0"/>
+          </a:p>
+          <a:p>
+            <a:pPr>
+              <a:defRPr/>
+            </a:pPr>
+            <a:r>
+              <a:rPr lang="de-DE" dirty="0" err="1" smtClean="0"/>
+              <a:t>Outlier</a:t>
+            </a:r>
+            <a:r>
+              <a:rPr lang="de-DE" dirty="0" smtClean="0"/>
+              <a:t> </a:t>
+            </a:r>
+            <a:r>
+              <a:rPr lang="de-DE" dirty="0" err="1"/>
+              <a:t>Detection</a:t>
+            </a:r>
+            <a:r>
+              <a:rPr lang="de-DE" dirty="0"/>
+              <a:t> in </a:t>
+            </a:r>
+            <a:r>
+              <a:rPr lang="de-DE" dirty="0" err="1"/>
+              <a:t>Condition</a:t>
+            </a:r>
+            <a:r>
+              <a:rPr lang="de-DE" dirty="0"/>
+              <a:t> Monitoring</a:t>
+            </a:r>
+          </a:p>
+          <a:p>
+            <a:pPr>
+              <a:defRPr/>
+            </a:pPr>
+            <a:endParaRPr lang="de-DE" dirty="0"/>
           </a:p>
         </p:txBody>
       </p:sp>
@@ -19252,7 +20018,7 @@
             <a:fld id="{1F1E0E69-EC8C-4B55-B000-A21B4F200C17}" type="datetime1">
               <a:rPr lang="de-DE" smtClean="0"/>
               <a:pPr/>
-              <a:t>22.07.2013</a:t>
+              <a:t>23.07.2013</a:t>
             </a:fld>
             <a:endParaRPr lang="de-DE"/>
           </a:p>
@@ -19276,11 +20042,42 @@
             <a:pPr>
               <a:defRPr/>
             </a:pPr>
-            <a:r>
-              <a:rPr lang="de-DE" smtClean="0"/>
-              <a:t>Präsentationstitel</a:t>
-            </a:r>
-            <a:endParaRPr lang="de-DE"/>
+            <a:endParaRPr lang="de-DE" dirty="0" smtClean="0"/>
+          </a:p>
+          <a:p>
+            <a:pPr>
+              <a:defRPr/>
+            </a:pPr>
+            <a:r>
+              <a:rPr lang="de-DE" dirty="0" err="1" smtClean="0"/>
+              <a:t>Outlier</a:t>
+            </a:r>
+            <a:r>
+              <a:rPr lang="de-DE" dirty="0" smtClean="0"/>
+              <a:t> </a:t>
+            </a:r>
+            <a:r>
+              <a:rPr lang="de-DE" dirty="0" err="1"/>
+              <a:t>Detection</a:t>
+            </a:r>
+            <a:r>
+              <a:rPr lang="de-DE" dirty="0"/>
+              <a:t> in </a:t>
+            </a:r>
+            <a:r>
+              <a:rPr lang="de-DE" dirty="0" err="1"/>
+              <a:t>Condition</a:t>
+            </a:r>
+            <a:r>
+              <a:rPr lang="de-DE" dirty="0"/>
+              <a:t> Monitoring</a:t>
+            </a:r>
+          </a:p>
+          <a:p>
+            <a:pPr>
+              <a:defRPr/>
+            </a:pPr>
+            <a:endParaRPr lang="de-DE" dirty="0"/>
           </a:p>
         </p:txBody>
       </p:sp>
@@ -19451,8 +20248,12 @@
               <a:t>(</a:t>
             </a:r>
             <a:r>
+              <a:rPr lang="de-DE" sz="2400" dirty="0" err="1"/>
+              <a:t>a</a:t>
+            </a:r>
+            <a:r>
               <a:rPr lang="de-DE" sz="2400" dirty="0" err="1" smtClean="0"/>
-              <a:t>Accelerometers</a:t>
+              <a:t>ccelerometers</a:t>
             </a:r>
             <a:r>
               <a:rPr lang="de-DE" sz="2400" dirty="0" smtClean="0"/>
@@ -19480,7 +20281,7 @@
             <a:fld id="{3445AF6D-F46D-415C-AD3E-77E0038AE70E}" type="datetime1">
               <a:rPr lang="de-DE" smtClean="0"/>
               <a:pPr/>
-              <a:t>22.07.2013</a:t>
+              <a:t>23.07.2013</a:t>
             </a:fld>
             <a:endParaRPr lang="de-DE"/>
           </a:p>
@@ -19504,11 +20305,42 @@
             <a:pPr>
               <a:defRPr/>
             </a:pPr>
-            <a:r>
-              <a:rPr lang="de-DE" smtClean="0"/>
-              <a:t>Präsentationstitel</a:t>
-            </a:r>
-            <a:endParaRPr lang="de-DE"/>
+            <a:endParaRPr lang="de-DE" dirty="0" smtClean="0"/>
+          </a:p>
+          <a:p>
+            <a:pPr>
+              <a:defRPr/>
+            </a:pPr>
+            <a:r>
+              <a:rPr lang="de-DE" dirty="0" err="1" smtClean="0"/>
+              <a:t>Outlier</a:t>
+            </a:r>
+            <a:r>
+              <a:rPr lang="de-DE" dirty="0" smtClean="0"/>
+              <a:t> </a:t>
+            </a:r>
+            <a:r>
+              <a:rPr lang="de-DE" dirty="0" err="1"/>
+              <a:t>Detection</a:t>
+            </a:r>
+            <a:r>
+              <a:rPr lang="de-DE" dirty="0"/>
+              <a:t> in </a:t>
+            </a:r>
+            <a:r>
+              <a:rPr lang="de-DE" dirty="0" err="1"/>
+              <a:t>Condition</a:t>
+            </a:r>
+            <a:r>
+              <a:rPr lang="de-DE" dirty="0"/>
+              <a:t> Monitoring</a:t>
+            </a:r>
+          </a:p>
+          <a:p>
+            <a:pPr>
+              <a:defRPr/>
+            </a:pPr>
+            <a:endParaRPr lang="de-DE" dirty="0"/>
           </a:p>
         </p:txBody>
       </p:sp>
@@ -19658,7 +20490,7 @@
             <a:fld id="{3445AF6D-F46D-415C-AD3E-77E0038AE70E}" type="datetime1">
               <a:rPr lang="de-DE" smtClean="0"/>
               <a:pPr/>
-              <a:t>22.07.2013</a:t>
+              <a:t>23.07.2013</a:t>
             </a:fld>
             <a:endParaRPr lang="de-DE"/>
           </a:p>
@@ -19682,11 +20514,42 @@
             <a:pPr>
               <a:defRPr/>
             </a:pPr>
-            <a:r>
-              <a:rPr lang="de-DE" smtClean="0"/>
-              <a:t>Präsentationstitel</a:t>
-            </a:r>
-            <a:endParaRPr lang="de-DE"/>
+            <a:endParaRPr lang="de-DE" dirty="0" smtClean="0"/>
+          </a:p>
+          <a:p>
+            <a:pPr>
+              <a:defRPr/>
+            </a:pPr>
+            <a:r>
+              <a:rPr lang="de-DE" dirty="0" err="1" smtClean="0"/>
+              <a:t>Outlier</a:t>
+            </a:r>
+            <a:r>
+              <a:rPr lang="de-DE" dirty="0" smtClean="0"/>
+              <a:t> </a:t>
+            </a:r>
+            <a:r>
+              <a:rPr lang="de-DE" dirty="0" err="1"/>
+              <a:t>Detection</a:t>
+            </a:r>
+            <a:r>
+              <a:rPr lang="de-DE" dirty="0"/>
+              <a:t> in </a:t>
+            </a:r>
+            <a:r>
+              <a:rPr lang="de-DE" dirty="0" err="1"/>
+              <a:t>Condition</a:t>
+            </a:r>
+            <a:r>
+              <a:rPr lang="de-DE" dirty="0"/>
+              <a:t> Monitoring</a:t>
+            </a:r>
+          </a:p>
+          <a:p>
+            <a:pPr>
+              <a:defRPr/>
+            </a:pPr>
+            <a:endParaRPr lang="de-DE" dirty="0"/>
           </a:p>
         </p:txBody>
       </p:sp>
@@ -19935,15 +20798,17 @@
               <a:rPr lang="de-DE" sz="2400" kern="0" dirty="0" err="1" smtClean="0"/>
               <a:t>conditions</a:t>
             </a:r>
-            <a:endParaRPr lang="de-DE" sz="2400" kern="0" dirty="0" smtClean="0"/>
-          </a:p>
-          <a:p>
-            <a:pPr marL="0" indent="0">
-              <a:buNone/>
-            </a:pPr>
             <a:r>
               <a:rPr lang="de-DE" sz="2400" kern="0" dirty="0" smtClean="0"/>
-              <a:t>					2.ball fault </a:t>
+              <a:t>					</a:t>
+            </a:r>
+            <a:r>
+              <a:rPr lang="de-DE" sz="2400" kern="0" dirty="0" smtClean="0"/>
+              <a:t>	2.ball </a:t>
+            </a:r>
+            <a:r>
+              <a:rPr lang="de-DE" sz="2400" kern="0" dirty="0" smtClean="0"/>
+              <a:t>fault </a:t>
             </a:r>
             <a:r>
               <a:rPr lang="de-DE" sz="2400" kern="0" dirty="0" err="1" smtClean="0"/>
@@ -20313,7 +21178,7 @@
             <a:fld id="{03B44CDA-7D88-4264-B0E0-D9AD28CBE73B}" type="datetime1">
               <a:rPr lang="de-DE" smtClean="0"/>
               <a:pPr/>
-              <a:t>22.07.2013</a:t>
+              <a:t>23.07.2013</a:t>
             </a:fld>
             <a:endParaRPr lang="de-DE"/>
           </a:p>
@@ -20337,11 +21202,42 @@
             <a:pPr>
               <a:defRPr/>
             </a:pPr>
-            <a:r>
-              <a:rPr lang="de-DE" smtClean="0"/>
-              <a:t>Präsentationstitel</a:t>
-            </a:r>
-            <a:endParaRPr lang="de-DE"/>
+            <a:endParaRPr lang="de-DE" dirty="0" smtClean="0"/>
+          </a:p>
+          <a:p>
+            <a:pPr>
+              <a:defRPr/>
+            </a:pPr>
+            <a:r>
+              <a:rPr lang="de-DE" dirty="0" err="1" smtClean="0"/>
+              <a:t>Outlier</a:t>
+            </a:r>
+            <a:r>
+              <a:rPr lang="de-DE" dirty="0" smtClean="0"/>
+              <a:t> </a:t>
+            </a:r>
+            <a:r>
+              <a:rPr lang="de-DE" dirty="0" err="1"/>
+              <a:t>Detection</a:t>
+            </a:r>
+            <a:r>
+              <a:rPr lang="de-DE" dirty="0"/>
+              <a:t> in </a:t>
+            </a:r>
+            <a:r>
+              <a:rPr lang="de-DE" dirty="0" err="1"/>
+              <a:t>Condition</a:t>
+            </a:r>
+            <a:r>
+              <a:rPr lang="de-DE" dirty="0"/>
+              <a:t> Monitoring</a:t>
+            </a:r>
+          </a:p>
+          <a:p>
+            <a:pPr>
+              <a:defRPr/>
+            </a:pPr>
+            <a:endParaRPr lang="de-DE" dirty="0"/>
           </a:p>
         </p:txBody>
       </p:sp>
@@ -20737,7 +21633,7 @@
             <a:fld id="{3445AF6D-F46D-415C-AD3E-77E0038AE70E}" type="datetime1">
               <a:rPr lang="de-DE" smtClean="0"/>
               <a:pPr/>
-              <a:t>22.07.2013</a:t>
+              <a:t>23.07.2013</a:t>
             </a:fld>
             <a:endParaRPr lang="de-DE"/>
           </a:p>
@@ -20761,11 +21657,42 @@
             <a:pPr>
               <a:defRPr/>
             </a:pPr>
-            <a:r>
-              <a:rPr lang="de-DE" smtClean="0"/>
-              <a:t>Präsentationstitel</a:t>
-            </a:r>
-            <a:endParaRPr lang="de-DE"/>
+            <a:endParaRPr lang="de-DE" dirty="0" smtClean="0"/>
+          </a:p>
+          <a:p>
+            <a:pPr>
+              <a:defRPr/>
+            </a:pPr>
+            <a:r>
+              <a:rPr lang="de-DE" dirty="0" err="1" smtClean="0"/>
+              <a:t>Outlier</a:t>
+            </a:r>
+            <a:r>
+              <a:rPr lang="de-DE" dirty="0" smtClean="0"/>
+              <a:t> </a:t>
+            </a:r>
+            <a:r>
+              <a:rPr lang="de-DE" dirty="0" err="1"/>
+              <a:t>Detection</a:t>
+            </a:r>
+            <a:r>
+              <a:rPr lang="de-DE" dirty="0"/>
+              <a:t> in </a:t>
+            </a:r>
+            <a:r>
+              <a:rPr lang="de-DE" dirty="0" err="1"/>
+              <a:t>Condition</a:t>
+            </a:r>
+            <a:r>
+              <a:rPr lang="de-DE" dirty="0"/>
+              <a:t> Monitoring</a:t>
+            </a:r>
+          </a:p>
+          <a:p>
+            <a:pPr>
+              <a:defRPr/>
+            </a:pPr>
+            <a:endParaRPr lang="de-DE" dirty="0"/>
           </a:p>
         </p:txBody>
       </p:sp>
@@ -21013,6 +21940,33 @@
               <a:buFont typeface="Wingdings" pitchFamily="2" charset="2"/>
               <a:buNone/>
             </a:pPr>
+            <a:r>
+              <a:rPr lang="de-DE" sz="2400" kern="0" dirty="0"/>
+              <a:t>	</a:t>
+            </a:r>
+            <a:r>
+              <a:rPr lang="de-DE" sz="2400" kern="0" dirty="0" smtClean="0"/>
+              <a:t>				per </a:t>
+            </a:r>
+            <a:r>
+              <a:rPr lang="de-DE" sz="2400" kern="0" dirty="0" err="1" smtClean="0"/>
+              <a:t>condition</a:t>
+            </a:r>
+            <a:r>
+              <a:rPr lang="de-DE" sz="2400" kern="0" dirty="0" smtClean="0"/>
+              <a:t> </a:t>
+            </a:r>
+            <a:r>
+              <a:rPr lang="de-DE" sz="2400" kern="0" dirty="0" err="1" smtClean="0"/>
+              <a:t>signal</a:t>
+            </a:r>
+            <a:endParaRPr lang="de-DE" sz="2400" kern="0" dirty="0" smtClean="0"/>
+          </a:p>
+          <a:p>
+            <a:pPr marL="0" indent="0">
+              <a:buFont typeface="Wingdings" pitchFamily="2" charset="2"/>
+              <a:buNone/>
+            </a:pPr>
             <a:endParaRPr lang="de-DE" sz="2400" kern="0" dirty="0"/>
           </a:p>
           <a:p>
@@ -21388,7 +22342,7 @@
             <a:fld id="{3445AF6D-F46D-415C-AD3E-77E0038AE70E}" type="datetime1">
               <a:rPr lang="de-DE" smtClean="0"/>
               <a:pPr/>
-              <a:t>22.07.2013</a:t>
+              <a:t>23.07.2013</a:t>
             </a:fld>
             <a:endParaRPr lang="de-DE"/>
           </a:p>
@@ -21412,11 +22366,42 @@
             <a:pPr>
               <a:defRPr/>
             </a:pPr>
-            <a:r>
-              <a:rPr lang="de-DE" smtClean="0"/>
-              <a:t>Präsentationstitel</a:t>
-            </a:r>
-            <a:endParaRPr lang="de-DE"/>
+            <a:endParaRPr lang="de-DE" dirty="0" smtClean="0"/>
+          </a:p>
+          <a:p>
+            <a:pPr>
+              <a:defRPr/>
+            </a:pPr>
+            <a:r>
+              <a:rPr lang="de-DE" dirty="0" err="1" smtClean="0"/>
+              <a:t>Outlier</a:t>
+            </a:r>
+            <a:r>
+              <a:rPr lang="de-DE" dirty="0" smtClean="0"/>
+              <a:t> </a:t>
+            </a:r>
+            <a:r>
+              <a:rPr lang="de-DE" dirty="0" err="1"/>
+              <a:t>Detection</a:t>
+            </a:r>
+            <a:r>
+              <a:rPr lang="de-DE" dirty="0"/>
+              <a:t> in </a:t>
+            </a:r>
+            <a:r>
+              <a:rPr lang="de-DE" dirty="0" err="1"/>
+              <a:t>Condition</a:t>
+            </a:r>
+            <a:r>
+              <a:rPr lang="de-DE" dirty="0"/>
+              <a:t> Monitoring</a:t>
+            </a:r>
+          </a:p>
+          <a:p>
+            <a:pPr>
+              <a:defRPr/>
+            </a:pPr>
+            <a:endParaRPr lang="de-DE" dirty="0"/>
           </a:p>
         </p:txBody>
       </p:sp>
@@ -21539,12 +22524,20 @@
               <a:t> </a:t>
             </a:r>
             <a:r>
+              <a:rPr lang="de-DE" dirty="0" err="1"/>
+              <a:t>r</a:t>
+            </a:r>
+            <a:r>
               <a:rPr lang="de-DE" dirty="0" err="1" smtClean="0"/>
-              <a:t>Raceway</a:t>
+              <a:t>aceway</a:t>
             </a:r>
             <a:r>
               <a:rPr lang="de-DE" dirty="0" smtClean="0"/>
-              <a:t> fault</a:t>
+              <a:t> </a:t>
+            </a:r>
+            <a:r>
+              <a:rPr lang="de-DE" dirty="0" smtClean="0"/>
+              <a:t>fault</a:t>
             </a:r>
             <a:endParaRPr lang="de-DE" dirty="0"/>
           </a:p>
@@ -21581,12 +22574,20 @@
               <a:t> </a:t>
             </a:r>
             <a:r>
+              <a:rPr lang="de-DE" dirty="0" err="1"/>
+              <a:t>r</a:t>
+            </a:r>
+            <a:r>
               <a:rPr lang="de-DE" dirty="0" err="1" smtClean="0"/>
-              <a:t>Raceway</a:t>
+              <a:t>aceway</a:t>
             </a:r>
             <a:r>
               <a:rPr lang="de-DE" dirty="0" smtClean="0"/>
-              <a:t> fault</a:t>
+              <a:t> </a:t>
+            </a:r>
+            <a:r>
+              <a:rPr lang="de-DE" dirty="0" smtClean="0"/>
+              <a:t>fault</a:t>
             </a:r>
             <a:endParaRPr lang="de-DE" dirty="0"/>
           </a:p>
@@ -21755,7 +22756,7 @@
             <a:fld id="{3445AF6D-F46D-415C-AD3E-77E0038AE70E}" type="datetime1">
               <a:rPr lang="de-DE" smtClean="0"/>
               <a:pPr/>
-              <a:t>22.07.2013</a:t>
+              <a:t>23.07.2013</a:t>
             </a:fld>
             <a:endParaRPr lang="de-DE"/>
           </a:p>
@@ -21779,11 +22780,42 @@
             <a:pPr>
               <a:defRPr/>
             </a:pPr>
-            <a:r>
-              <a:rPr lang="de-DE" smtClean="0"/>
-              <a:t>Präsentationstitel</a:t>
-            </a:r>
-            <a:endParaRPr lang="de-DE"/>
+            <a:endParaRPr lang="de-DE" dirty="0" smtClean="0"/>
+          </a:p>
+          <a:p>
+            <a:pPr>
+              <a:defRPr/>
+            </a:pPr>
+            <a:r>
+              <a:rPr lang="de-DE" dirty="0" err="1" smtClean="0"/>
+              <a:t>Outlier</a:t>
+            </a:r>
+            <a:r>
+              <a:rPr lang="de-DE" dirty="0" smtClean="0"/>
+              <a:t> </a:t>
+            </a:r>
+            <a:r>
+              <a:rPr lang="de-DE" dirty="0" err="1"/>
+              <a:t>Detection</a:t>
+            </a:r>
+            <a:r>
+              <a:rPr lang="de-DE" dirty="0"/>
+              <a:t> in </a:t>
+            </a:r>
+            <a:r>
+              <a:rPr lang="de-DE" dirty="0" err="1"/>
+              <a:t>Condition</a:t>
+            </a:r>
+            <a:r>
+              <a:rPr lang="de-DE" dirty="0"/>
+              <a:t> Monitoring</a:t>
+            </a:r>
+          </a:p>
+          <a:p>
+            <a:pPr>
+              <a:defRPr/>
+            </a:pPr>
+            <a:endParaRPr lang="de-DE" dirty="0"/>
           </a:p>
         </p:txBody>
       </p:sp>
@@ -24849,7 +25881,7 @@
             <a:fld id="{3445AF6D-F46D-415C-AD3E-77E0038AE70E}" type="datetime1">
               <a:rPr lang="de-DE" smtClean="0"/>
               <a:pPr/>
-              <a:t>22.07.2013</a:t>
+              <a:t>23.07.2013</a:t>
             </a:fld>
             <a:endParaRPr lang="de-DE"/>
           </a:p>
@@ -24873,11 +25905,42 @@
             <a:pPr>
               <a:defRPr/>
             </a:pPr>
-            <a:r>
-              <a:rPr lang="de-DE" smtClean="0"/>
-              <a:t>Präsentationstitel</a:t>
-            </a:r>
-            <a:endParaRPr lang="de-DE"/>
+            <a:endParaRPr lang="de-DE" dirty="0" smtClean="0"/>
+          </a:p>
+          <a:p>
+            <a:pPr>
+              <a:defRPr/>
+            </a:pPr>
+            <a:r>
+              <a:rPr lang="de-DE" dirty="0" err="1" smtClean="0"/>
+              <a:t>Outlier</a:t>
+            </a:r>
+            <a:r>
+              <a:rPr lang="de-DE" dirty="0" smtClean="0"/>
+              <a:t> </a:t>
+            </a:r>
+            <a:r>
+              <a:rPr lang="de-DE" dirty="0" err="1"/>
+              <a:t>Detection</a:t>
+            </a:r>
+            <a:r>
+              <a:rPr lang="de-DE" dirty="0"/>
+              <a:t> in </a:t>
+            </a:r>
+            <a:r>
+              <a:rPr lang="de-DE" dirty="0" err="1"/>
+              <a:t>Condition</a:t>
+            </a:r>
+            <a:r>
+              <a:rPr lang="de-DE" dirty="0"/>
+              <a:t> Monitoring</a:t>
+            </a:r>
+          </a:p>
+          <a:p>
+            <a:pPr>
+              <a:defRPr/>
+            </a:pPr>
+            <a:endParaRPr lang="de-DE" dirty="0"/>
           </a:p>
         </p:txBody>
       </p:sp>
@@ -25183,7 +26246,7 @@
             <a:fld id="{3445AF6D-F46D-415C-AD3E-77E0038AE70E}" type="datetime1">
               <a:rPr lang="de-DE" smtClean="0"/>
               <a:pPr/>
-              <a:t>22.07.2013</a:t>
+              <a:t>23.07.2013</a:t>
             </a:fld>
             <a:endParaRPr lang="de-DE"/>
           </a:p>
@@ -25207,11 +26270,42 @@
             <a:pPr>
               <a:defRPr/>
             </a:pPr>
-            <a:r>
-              <a:rPr lang="de-DE" smtClean="0"/>
-              <a:t>Präsentationstitel</a:t>
-            </a:r>
-            <a:endParaRPr lang="de-DE"/>
+            <a:endParaRPr lang="de-DE" dirty="0" smtClean="0"/>
+          </a:p>
+          <a:p>
+            <a:pPr>
+              <a:defRPr/>
+            </a:pPr>
+            <a:r>
+              <a:rPr lang="de-DE" dirty="0" err="1" smtClean="0"/>
+              <a:t>Outlier</a:t>
+            </a:r>
+            <a:r>
+              <a:rPr lang="de-DE" dirty="0" smtClean="0"/>
+              <a:t> </a:t>
+            </a:r>
+            <a:r>
+              <a:rPr lang="de-DE" dirty="0" err="1"/>
+              <a:t>Detection</a:t>
+            </a:r>
+            <a:r>
+              <a:rPr lang="de-DE" dirty="0"/>
+              <a:t> in </a:t>
+            </a:r>
+            <a:r>
+              <a:rPr lang="de-DE" dirty="0" err="1"/>
+              <a:t>Condition</a:t>
+            </a:r>
+            <a:r>
+              <a:rPr lang="de-DE" dirty="0"/>
+              <a:t> Monitoring</a:t>
+            </a:r>
+          </a:p>
+          <a:p>
+            <a:pPr>
+              <a:defRPr/>
+            </a:pPr>
+            <a:endParaRPr lang="de-DE" dirty="0"/>
           </a:p>
         </p:txBody>
       </p:sp>
@@ -25465,7 +26559,7 @@
             <a:fld id="{3445AF6D-F46D-415C-AD3E-77E0038AE70E}" type="datetime1">
               <a:rPr lang="de-DE" smtClean="0"/>
               <a:pPr/>
-              <a:t>22.07.2013</a:t>
+              <a:t>23.07.2013</a:t>
             </a:fld>
             <a:endParaRPr lang="de-DE"/>
           </a:p>
@@ -25489,11 +26583,42 @@
             <a:pPr>
               <a:defRPr/>
             </a:pPr>
-            <a:r>
-              <a:rPr lang="de-DE" smtClean="0"/>
-              <a:t>Präsentationstitel</a:t>
-            </a:r>
-            <a:endParaRPr lang="de-DE"/>
+            <a:endParaRPr lang="de-DE" dirty="0" smtClean="0"/>
+          </a:p>
+          <a:p>
+            <a:pPr>
+              <a:defRPr/>
+            </a:pPr>
+            <a:r>
+              <a:rPr lang="de-DE" dirty="0" err="1" smtClean="0"/>
+              <a:t>Outlier</a:t>
+            </a:r>
+            <a:r>
+              <a:rPr lang="de-DE" dirty="0" smtClean="0"/>
+              <a:t> </a:t>
+            </a:r>
+            <a:r>
+              <a:rPr lang="de-DE" dirty="0" err="1"/>
+              <a:t>Detection</a:t>
+            </a:r>
+            <a:r>
+              <a:rPr lang="de-DE" dirty="0"/>
+              <a:t> in </a:t>
+            </a:r>
+            <a:r>
+              <a:rPr lang="de-DE" dirty="0" err="1"/>
+              <a:t>Condition</a:t>
+            </a:r>
+            <a:r>
+              <a:rPr lang="de-DE" dirty="0"/>
+              <a:t> Monitoring</a:t>
+            </a:r>
+          </a:p>
+          <a:p>
+            <a:pPr>
+              <a:defRPr/>
+            </a:pPr>
+            <a:endParaRPr lang="de-DE" dirty="0"/>
           </a:p>
         </p:txBody>
       </p:sp>
@@ -25577,8 +26702,20 @@
           <a:p>
             <a:pPr algn="ctr"/>
             <a:r>
+              <a:rPr lang="de-DE" sz="2800" dirty="0" err="1"/>
+              <a:t>t</a:t>
+            </a:r>
+            <a:r>
               <a:rPr lang="de-DE" sz="2800" dirty="0" err="1" smtClean="0"/>
-              <a:t>features</a:t>
+              <a:t>est</a:t>
+            </a:r>
+            <a:r>
+              <a:rPr lang="de-DE" sz="2800" dirty="0" smtClean="0"/>
+              <a:t> </a:t>
+            </a:r>
+            <a:r>
+              <a:rPr lang="de-DE" sz="2800" dirty="0" err="1" smtClean="0"/>
+              <a:t>data</a:t>
             </a:r>
             <a:endParaRPr lang="de-DE" sz="2800" dirty="0"/>
           </a:p>
@@ -25703,7 +26840,7 @@
             <a:fld id="{3445AF6D-F46D-415C-AD3E-77E0038AE70E}" type="datetime1">
               <a:rPr lang="de-DE" smtClean="0"/>
               <a:pPr/>
-              <a:t>22.07.2013</a:t>
+              <a:t>23.07.2013</a:t>
             </a:fld>
             <a:endParaRPr lang="de-DE"/>
           </a:p>
@@ -25727,11 +26864,42 @@
             <a:pPr>
               <a:defRPr/>
             </a:pPr>
-            <a:r>
-              <a:rPr lang="de-DE" smtClean="0"/>
-              <a:t>Präsentationstitel</a:t>
-            </a:r>
-            <a:endParaRPr lang="de-DE"/>
+            <a:endParaRPr lang="de-DE" dirty="0" smtClean="0"/>
+          </a:p>
+          <a:p>
+            <a:pPr>
+              <a:defRPr/>
+            </a:pPr>
+            <a:r>
+              <a:rPr lang="de-DE" dirty="0" err="1" smtClean="0"/>
+              <a:t>Outlier</a:t>
+            </a:r>
+            <a:r>
+              <a:rPr lang="de-DE" dirty="0" smtClean="0"/>
+              <a:t> </a:t>
+            </a:r>
+            <a:r>
+              <a:rPr lang="de-DE" dirty="0" err="1"/>
+              <a:t>Detection</a:t>
+            </a:r>
+            <a:r>
+              <a:rPr lang="de-DE" dirty="0"/>
+              <a:t> in </a:t>
+            </a:r>
+            <a:r>
+              <a:rPr lang="de-DE" dirty="0" err="1"/>
+              <a:t>Condition</a:t>
+            </a:r>
+            <a:r>
+              <a:rPr lang="de-DE" dirty="0"/>
+              <a:t> Monitoring</a:t>
+            </a:r>
+          </a:p>
+          <a:p>
+            <a:pPr>
+              <a:defRPr/>
+            </a:pPr>
+            <a:endParaRPr lang="de-DE" dirty="0"/>
           </a:p>
         </p:txBody>
       </p:sp>
@@ -25925,33 +27093,57 @@
             <a:pPr marL="0" indent="0" algn="ctr">
               <a:buNone/>
             </a:pPr>
-            <a:endParaRPr lang="de-DE" i="1" dirty="0" smtClean="0"/>
+            <a:endParaRPr lang="de-DE" i="1" dirty="0"/>
           </a:p>
           <a:p>
             <a:pPr marL="0" indent="0" algn="ctr">
               <a:buNone/>
             </a:pPr>
-            <a:endParaRPr lang="de-DE" i="1" dirty="0"/>
+            <a:r>
+              <a:rPr lang="de-DE" i="1" dirty="0" smtClean="0"/>
+              <a:t>„</a:t>
+            </a:r>
+            <a:r>
+              <a:rPr lang="de-DE" i="1" dirty="0" err="1" smtClean="0"/>
+              <a:t>Condition</a:t>
+            </a:r>
+            <a:r>
+              <a:rPr lang="de-DE" i="1" dirty="0" smtClean="0"/>
+              <a:t> Monitoring </a:t>
+            </a:r>
+            <a:r>
+              <a:rPr lang="de-DE" i="1" dirty="0" err="1" smtClean="0"/>
+              <a:t>is</a:t>
+            </a:r>
+            <a:r>
+              <a:rPr lang="de-DE" i="1" dirty="0" smtClean="0"/>
+              <a:t> a </a:t>
+            </a:r>
+            <a:r>
+              <a:rPr lang="de-DE" i="1" dirty="0" err="1" smtClean="0"/>
+              <a:t>process</a:t>
+            </a:r>
+            <a:r>
+              <a:rPr lang="de-DE" i="1" dirty="0" smtClean="0"/>
+              <a:t> </a:t>
+            </a:r>
+            <a:endParaRPr lang="de-DE" i="1" dirty="0" smtClean="0"/>
           </a:p>
           <a:p>
             <a:pPr marL="0" indent="0" algn="ctr">
               <a:buNone/>
             </a:pPr>
             <a:r>
+              <a:rPr lang="de-DE" i="1" dirty="0" err="1" smtClean="0"/>
+              <a:t>of</a:t>
+            </a:r>
+            <a:r>
               <a:rPr lang="de-DE" i="1" dirty="0" smtClean="0"/>
-              <a:t>„</a:t>
+              <a:t> </a:t>
             </a:r>
             <a:r>
               <a:rPr lang="de-DE" i="1" dirty="0" err="1" smtClean="0"/>
-              <a:t>Condition</a:t>
-            </a:r>
-            <a:r>
-              <a:rPr lang="de-DE" i="1" dirty="0" smtClean="0"/>
-              <a:t> Monitoring </a:t>
-            </a:r>
-            <a:r>
-              <a:rPr lang="de-DE" i="1" dirty="0" err="1" smtClean="0"/>
-              <a:t>is</a:t>
+              <a:t>monitoring</a:t>
             </a:r>
             <a:r>
               <a:rPr lang="de-DE" i="1" dirty="0" smtClean="0"/>
@@ -25959,7 +27151,7 @@
             </a:r>
             <a:r>
               <a:rPr lang="de-DE" i="1" dirty="0" err="1" smtClean="0"/>
-              <a:t>process</a:t>
+              <a:t>system</a:t>
             </a:r>
             <a:r>
               <a:rPr lang="de-DE" i="1" dirty="0" smtClean="0"/>
@@ -25972,11 +27164,11 @@
             </a:pPr>
             <a:r>
               <a:rPr lang="de-DE" i="1" dirty="0" err="1"/>
-              <a:t>o</a:t>
+              <a:t>b</a:t>
             </a:r>
             <a:r>
               <a:rPr lang="de-DE" i="1" dirty="0" err="1" smtClean="0"/>
-              <a:t>f</a:t>
+              <a:t>y</a:t>
             </a:r>
             <a:r>
               <a:rPr lang="de-DE" i="1" dirty="0" smtClean="0"/>
@@ -25984,60 +27176,49 @@
             </a:r>
             <a:r>
               <a:rPr lang="de-DE" i="1" dirty="0" err="1" smtClean="0"/>
-              <a:t>monitoring</a:t>
+              <a:t>studying</a:t>
             </a:r>
             <a:r>
               <a:rPr lang="de-DE" i="1" dirty="0" smtClean="0"/>
-              <a:t> a </a:t>
+              <a:t> </a:t>
             </a:r>
             <a:r>
               <a:rPr lang="de-DE" i="1" dirty="0" err="1" smtClean="0"/>
-              <a:t>system</a:t>
+              <a:t>certain</a:t>
             </a:r>
             <a:r>
               <a:rPr lang="de-DE" i="1" dirty="0" smtClean="0"/>
               <a:t> </a:t>
             </a:r>
+            <a:r>
+              <a:rPr lang="de-DE" i="1" dirty="0" err="1" smtClean="0"/>
+              <a:t>selected</a:t>
+            </a:r>
+            <a:r>
+              <a:rPr lang="de-DE" i="1" dirty="0" smtClean="0"/>
+              <a:t> </a:t>
+            </a:r>
+            <a:r>
+              <a:rPr lang="de-DE" i="1" dirty="0" err="1" smtClean="0"/>
+              <a:t>parameters</a:t>
+            </a:r>
+            <a:r>
+              <a:rPr lang="de-DE" i="1" dirty="0" smtClean="0"/>
+              <a:t> </a:t>
+            </a:r>
+            <a:endParaRPr lang="de-DE" i="1" dirty="0" smtClean="0"/>
           </a:p>
           <a:p>
             <a:pPr marL="0" indent="0" algn="ctr">
               <a:buNone/>
             </a:pPr>
             <a:r>
-              <a:rPr lang="de-DE" i="1" dirty="0" err="1"/>
-              <a:t>b</a:t>
-            </a:r>
-            <a:r>
-              <a:rPr lang="de-DE" i="1" dirty="0" err="1" smtClean="0"/>
-              <a:t>y</a:t>
-            </a:r>
-            <a:r>
               <a:rPr lang="de-DE" i="1" dirty="0" smtClean="0"/>
-              <a:t> </a:t>
-            </a:r>
-            <a:r>
-              <a:rPr lang="de-DE" i="1" dirty="0" err="1" smtClean="0"/>
-              <a:t>studying</a:t>
+              <a:t>in </a:t>
             </a:r>
             <a:r>
               <a:rPr lang="de-DE" i="1" dirty="0" smtClean="0"/>
-              <a:t> </a:t>
-            </a:r>
-            <a:r>
-              <a:rPr lang="de-DE" i="1" dirty="0" err="1" smtClean="0"/>
-              <a:t>selected</a:t>
-            </a:r>
-            <a:r>
-              <a:rPr lang="de-DE" i="1" dirty="0" smtClean="0"/>
-              <a:t> </a:t>
-            </a:r>
-            <a:r>
-              <a:rPr lang="de-DE" i="1" dirty="0" err="1" smtClean="0"/>
-              <a:t>parameters</a:t>
-            </a:r>
-            <a:r>
-              <a:rPr lang="de-DE" i="1" dirty="0" smtClean="0"/>
-              <a:t> in such a </a:t>
+              <a:t>such a </a:t>
             </a:r>
             <a:r>
               <a:rPr lang="de-DE" i="1" dirty="0" err="1" smtClean="0"/>
@@ -26096,10 +27277,12 @@
               <a:rPr lang="de-DE" i="1" dirty="0" err="1" smtClean="0"/>
               <a:t>parameters</a:t>
             </a:r>
-            <a:r>
-              <a:rPr lang="de-DE" i="1" dirty="0" smtClean="0"/>
-              <a:t> </a:t>
-            </a:r>
+            <a:endParaRPr lang="de-DE" i="1" dirty="0" smtClean="0"/>
+          </a:p>
+          <a:p>
+            <a:pPr marL="0" indent="0" algn="ctr">
+              <a:buNone/>
+            </a:pPr>
             <a:r>
               <a:rPr lang="de-DE" i="1" dirty="0" err="1" smtClean="0"/>
               <a:t>are</a:t>
@@ -26138,8 +27321,18 @@
             </a:r>
             <a:r>
               <a:rPr lang="de-DE" i="1" dirty="0" smtClean="0"/>
-              <a:t>“ </a:t>
-            </a:r>
+              <a:t>“</a:t>
+            </a:r>
+          </a:p>
+          <a:p>
+            <a:pPr marL="0" indent="0" algn="ctr">
+              <a:buNone/>
+            </a:pPr>
+            <a:r>
+              <a:rPr lang="de-DE" i="1" dirty="0" smtClean="0"/>
+              <a:t> </a:t>
+            </a:r>
+            <a:endParaRPr lang="de-DE" i="1" dirty="0" smtClean="0"/>
           </a:p>
           <a:p>
             <a:pPr marL="0" indent="0" algn="ctr">
@@ -26184,7 +27377,7 @@
             <a:fld id="{03B44CDA-7D88-4264-B0E0-D9AD28CBE73B}" type="datetime1">
               <a:rPr lang="de-DE" smtClean="0"/>
               <a:pPr/>
-              <a:t>22.07.2013</a:t>
+              <a:t>23.07.2013</a:t>
             </a:fld>
             <a:endParaRPr lang="de-DE"/>
           </a:p>
@@ -26208,11 +27401,42 @@
             <a:pPr>
               <a:defRPr/>
             </a:pPr>
-            <a:r>
-              <a:rPr lang="de-DE" smtClean="0"/>
-              <a:t>Präsentationstitel</a:t>
-            </a:r>
-            <a:endParaRPr lang="de-DE"/>
+            <a:endParaRPr lang="de-DE" dirty="0" smtClean="0"/>
+          </a:p>
+          <a:p>
+            <a:pPr>
+              <a:defRPr/>
+            </a:pPr>
+            <a:r>
+              <a:rPr lang="de-DE" dirty="0" err="1" smtClean="0"/>
+              <a:t>Outlier</a:t>
+            </a:r>
+            <a:r>
+              <a:rPr lang="de-DE" dirty="0" smtClean="0"/>
+              <a:t> </a:t>
+            </a:r>
+            <a:r>
+              <a:rPr lang="de-DE" dirty="0" err="1"/>
+              <a:t>Detection</a:t>
+            </a:r>
+            <a:r>
+              <a:rPr lang="de-DE" dirty="0"/>
+              <a:t> in </a:t>
+            </a:r>
+            <a:r>
+              <a:rPr lang="de-DE" dirty="0" err="1"/>
+              <a:t>Condition</a:t>
+            </a:r>
+            <a:r>
+              <a:rPr lang="de-DE" dirty="0"/>
+              <a:t> Monitoring</a:t>
+            </a:r>
+          </a:p>
+          <a:p>
+            <a:pPr>
+              <a:defRPr/>
+            </a:pPr>
+            <a:endParaRPr lang="de-DE" dirty="0"/>
           </a:p>
         </p:txBody>
       </p:sp>
@@ -26405,7 +27629,7 @@
             <a:fld id="{3445AF6D-F46D-415C-AD3E-77E0038AE70E}" type="datetime1">
               <a:rPr lang="de-DE" smtClean="0"/>
               <a:pPr/>
-              <a:t>22.07.2013</a:t>
+              <a:t>23.07.2013</a:t>
             </a:fld>
             <a:endParaRPr lang="de-DE"/>
           </a:p>
@@ -26429,11 +27653,42 @@
             <a:pPr>
               <a:defRPr/>
             </a:pPr>
-            <a:r>
-              <a:rPr lang="de-DE" smtClean="0"/>
-              <a:t>Präsentationstitel</a:t>
-            </a:r>
-            <a:endParaRPr lang="de-DE"/>
+            <a:endParaRPr lang="de-DE" dirty="0" smtClean="0"/>
+          </a:p>
+          <a:p>
+            <a:pPr>
+              <a:defRPr/>
+            </a:pPr>
+            <a:r>
+              <a:rPr lang="de-DE" dirty="0" err="1" smtClean="0"/>
+              <a:t>Outlier</a:t>
+            </a:r>
+            <a:r>
+              <a:rPr lang="de-DE" dirty="0" smtClean="0"/>
+              <a:t> </a:t>
+            </a:r>
+            <a:r>
+              <a:rPr lang="de-DE" dirty="0" err="1"/>
+              <a:t>Detection</a:t>
+            </a:r>
+            <a:r>
+              <a:rPr lang="de-DE" dirty="0"/>
+              <a:t> in </a:t>
+            </a:r>
+            <a:r>
+              <a:rPr lang="de-DE" dirty="0" err="1"/>
+              <a:t>Condition</a:t>
+            </a:r>
+            <a:r>
+              <a:rPr lang="de-DE" dirty="0"/>
+              <a:t> Monitoring</a:t>
+            </a:r>
+          </a:p>
+          <a:p>
+            <a:pPr>
+              <a:defRPr/>
+            </a:pPr>
+            <a:endParaRPr lang="de-DE" dirty="0"/>
           </a:p>
         </p:txBody>
       </p:sp>
@@ -26657,8 +27912,8 @@
               <a:t>one</a:t>
             </a:r>
             <a:r>
-              <a:rPr lang="de-DE" dirty="0" smtClean="0"/>
-              <a:t> </a:t>
+              <a:rPr lang="de-DE" dirty="0" err="1" smtClean="0"/>
+              <a:t>-</a:t>
             </a:r>
             <a:r>
               <a:rPr lang="de-DE" dirty="0" err="1" smtClean="0"/>
@@ -26666,7 +27921,7 @@
             </a:r>
             <a:r>
               <a:rPr lang="de-DE" dirty="0" smtClean="0"/>
-              <a:t> </a:t>
+              <a:t>- </a:t>
             </a:r>
             <a:r>
               <a:rPr lang="de-DE" dirty="0" err="1" smtClean="0"/>
@@ -26868,6 +28123,10 @@
             <a:r>
               <a:rPr lang="de-DE" dirty="0" err="1" smtClean="0"/>
               <a:t>applications</a:t>
+            </a:r>
+            <a:r>
+              <a:rPr lang="de-DE" dirty="0" smtClean="0"/>
+              <a:t>)</a:t>
             </a:r>
             <a:endParaRPr lang="de-DE" dirty="0" smtClean="0"/>
           </a:p>
@@ -26946,7 +28205,7 @@
             <a:fld id="{03B44CDA-7D88-4264-B0E0-D9AD28CBE73B}" type="datetime1">
               <a:rPr lang="de-DE" smtClean="0"/>
               <a:pPr/>
-              <a:t>22.07.2013</a:t>
+              <a:t>23.07.2013</a:t>
             </a:fld>
             <a:endParaRPr lang="de-DE"/>
           </a:p>
@@ -26970,11 +28229,42 @@
             <a:pPr>
               <a:defRPr/>
             </a:pPr>
-            <a:r>
-              <a:rPr lang="de-DE" smtClean="0"/>
-              <a:t>Präsentationstitel</a:t>
-            </a:r>
-            <a:endParaRPr lang="de-DE"/>
+            <a:endParaRPr lang="de-DE" dirty="0" smtClean="0"/>
+          </a:p>
+          <a:p>
+            <a:pPr>
+              <a:defRPr/>
+            </a:pPr>
+            <a:r>
+              <a:rPr lang="de-DE" dirty="0" err="1" smtClean="0"/>
+              <a:t>Outlier</a:t>
+            </a:r>
+            <a:r>
+              <a:rPr lang="de-DE" dirty="0" smtClean="0"/>
+              <a:t> </a:t>
+            </a:r>
+            <a:r>
+              <a:rPr lang="de-DE" dirty="0" err="1"/>
+              <a:t>Detection</a:t>
+            </a:r>
+            <a:r>
+              <a:rPr lang="de-DE" dirty="0"/>
+              <a:t> in </a:t>
+            </a:r>
+            <a:r>
+              <a:rPr lang="de-DE" dirty="0" err="1"/>
+              <a:t>Condition</a:t>
+            </a:r>
+            <a:r>
+              <a:rPr lang="de-DE" dirty="0"/>
+              <a:t> Monitoring</a:t>
+            </a:r>
+          </a:p>
+          <a:p>
+            <a:pPr>
+              <a:defRPr/>
+            </a:pPr>
+            <a:endParaRPr lang="de-DE" dirty="0"/>
           </a:p>
         </p:txBody>
       </p:sp>
@@ -27257,6 +28547,10 @@
               <a:rPr lang="de-DE" dirty="0" err="1" smtClean="0"/>
               <a:t>matrix</a:t>
             </a:r>
+            <a:r>
+              <a:rPr lang="de-DE" dirty="0" smtClean="0"/>
+              <a:t>)</a:t>
+            </a:r>
             <a:endParaRPr lang="de-DE" dirty="0" smtClean="0"/>
           </a:p>
           <a:p>
@@ -27337,7 +28631,7 @@
             <a:fld id="{03B44CDA-7D88-4264-B0E0-D9AD28CBE73B}" type="datetime1">
               <a:rPr lang="de-DE" smtClean="0"/>
               <a:pPr/>
-              <a:t>22.07.2013</a:t>
+              <a:t>23.07.2013</a:t>
             </a:fld>
             <a:endParaRPr lang="de-DE"/>
           </a:p>
@@ -27361,11 +28655,42 @@
             <a:pPr>
               <a:defRPr/>
             </a:pPr>
-            <a:r>
-              <a:rPr lang="de-DE" smtClean="0"/>
-              <a:t>Präsentationstitel</a:t>
-            </a:r>
-            <a:endParaRPr lang="de-DE"/>
+            <a:endParaRPr lang="de-DE" dirty="0" smtClean="0"/>
+          </a:p>
+          <a:p>
+            <a:pPr>
+              <a:defRPr/>
+            </a:pPr>
+            <a:r>
+              <a:rPr lang="de-DE" dirty="0" err="1" smtClean="0"/>
+              <a:t>Outlier</a:t>
+            </a:r>
+            <a:r>
+              <a:rPr lang="de-DE" dirty="0" smtClean="0"/>
+              <a:t> </a:t>
+            </a:r>
+            <a:r>
+              <a:rPr lang="de-DE" dirty="0" err="1"/>
+              <a:t>Detection</a:t>
+            </a:r>
+            <a:r>
+              <a:rPr lang="de-DE" dirty="0"/>
+              <a:t> in </a:t>
+            </a:r>
+            <a:r>
+              <a:rPr lang="de-DE" dirty="0" err="1"/>
+              <a:t>Condition</a:t>
+            </a:r>
+            <a:r>
+              <a:rPr lang="de-DE" dirty="0"/>
+              <a:t> Monitoring</a:t>
+            </a:r>
+          </a:p>
+          <a:p>
+            <a:pPr>
+              <a:defRPr/>
+            </a:pPr>
+            <a:endParaRPr lang="de-DE" dirty="0"/>
           </a:p>
         </p:txBody>
       </p:sp>
@@ -27524,7 +28849,7 @@
             <a:fld id="{03B44CDA-7D88-4264-B0E0-D9AD28CBE73B}" type="datetime1">
               <a:rPr lang="de-DE" smtClean="0"/>
               <a:pPr/>
-              <a:t>22.07.2013</a:t>
+              <a:t>23.07.2013</a:t>
             </a:fld>
             <a:endParaRPr lang="de-DE"/>
           </a:p>
@@ -27548,11 +28873,42 @@
             <a:pPr>
               <a:defRPr/>
             </a:pPr>
+            <a:endParaRPr lang="de-DE" smtClean="0"/>
+          </a:p>
+          <a:p>
+            <a:pPr>
+              <a:defRPr/>
+            </a:pPr>
             <a:r>
               <a:rPr lang="de-DE" smtClean="0"/>
-              <a:t>Präsentationstitel</a:t>
-            </a:r>
-            <a:endParaRPr lang="de-DE"/>
+              <a:t>Outlier</a:t>
+            </a:r>
+            <a:r>
+              <a:rPr lang="de-DE" dirty="0" smtClean="0"/>
+              <a:t> </a:t>
+            </a:r>
+            <a:r>
+              <a:rPr lang="de-DE" dirty="0" err="1"/>
+              <a:t>Detection</a:t>
+            </a:r>
+            <a:r>
+              <a:rPr lang="de-DE" dirty="0"/>
+              <a:t> in </a:t>
+            </a:r>
+            <a:r>
+              <a:rPr lang="de-DE" dirty="0" err="1"/>
+              <a:t>Condition</a:t>
+            </a:r>
+            <a:r>
+              <a:rPr lang="de-DE" dirty="0"/>
+              <a:t> Monitoring</a:t>
+            </a:r>
+          </a:p>
+          <a:p>
+            <a:pPr>
+              <a:defRPr/>
+            </a:pPr>
+            <a:endParaRPr lang="de-DE" dirty="0"/>
           </a:p>
         </p:txBody>
       </p:sp>
@@ -27662,6 +29018,12 @@
             <a:pPr marL="0" indent="0" algn="ctr">
               <a:buNone/>
             </a:pPr>
+            <a:endParaRPr lang="de-DE" dirty="0" smtClean="0"/>
+          </a:p>
+          <a:p>
+            <a:pPr marL="0" indent="0" algn="ctr">
+              <a:buNone/>
+            </a:pPr>
             <a:r>
               <a:rPr lang="de-DE" dirty="0" err="1" smtClean="0"/>
               <a:t>Benefits</a:t>
@@ -27679,12 +29041,16 @@
               <a:t> </a:t>
             </a:r>
             <a:r>
+              <a:rPr lang="de-DE" dirty="0" smtClean="0"/>
+              <a:t>(</a:t>
+            </a:r>
+            <a:r>
               <a:rPr lang="de-DE" dirty="0" err="1" smtClean="0"/>
               <a:t>computerized</a:t>
             </a:r>
             <a:r>
               <a:rPr lang="de-DE" dirty="0" smtClean="0"/>
-              <a:t> </a:t>
+              <a:t>) </a:t>
             </a:r>
             <a:r>
               <a:rPr lang="de-DE" dirty="0" err="1" smtClean="0"/>
@@ -27853,7 +29219,7 @@
             <a:fld id="{03B44CDA-7D88-4264-B0E0-D9AD28CBE73B}" type="datetime1">
               <a:rPr lang="de-DE" smtClean="0"/>
               <a:pPr/>
-              <a:t>22.07.2013</a:t>
+              <a:t>23.07.2013</a:t>
             </a:fld>
             <a:endParaRPr lang="de-DE"/>
           </a:p>
@@ -27877,11 +29243,42 @@
             <a:pPr>
               <a:defRPr/>
             </a:pPr>
-            <a:r>
-              <a:rPr lang="de-DE" smtClean="0"/>
-              <a:t>Präsentationstitel</a:t>
-            </a:r>
-            <a:endParaRPr lang="de-DE"/>
+            <a:endParaRPr lang="de-DE" dirty="0" smtClean="0"/>
+          </a:p>
+          <a:p>
+            <a:pPr>
+              <a:defRPr/>
+            </a:pPr>
+            <a:r>
+              <a:rPr lang="de-DE" dirty="0" err="1" smtClean="0"/>
+              <a:t>Outlier</a:t>
+            </a:r>
+            <a:r>
+              <a:rPr lang="de-DE" dirty="0" smtClean="0"/>
+              <a:t> </a:t>
+            </a:r>
+            <a:r>
+              <a:rPr lang="de-DE" dirty="0" err="1"/>
+              <a:t>Detection</a:t>
+            </a:r>
+            <a:r>
+              <a:rPr lang="de-DE" dirty="0"/>
+              <a:t> in </a:t>
+            </a:r>
+            <a:r>
+              <a:rPr lang="de-DE" dirty="0" err="1"/>
+              <a:t>Condition</a:t>
+            </a:r>
+            <a:r>
+              <a:rPr lang="de-DE" dirty="0"/>
+              <a:t> Monitoring</a:t>
+            </a:r>
+          </a:p>
+          <a:p>
+            <a:pPr>
+              <a:defRPr/>
+            </a:pPr>
+            <a:endParaRPr lang="de-DE" dirty="0"/>
           </a:p>
         </p:txBody>
       </p:sp>
@@ -27991,7 +29388,7 @@
             <a:fld id="{3445AF6D-F46D-415C-AD3E-77E0038AE70E}" type="datetime1">
               <a:rPr lang="de-DE" smtClean="0"/>
               <a:pPr/>
-              <a:t>22.07.2013</a:t>
+              <a:t>23.07.2013</a:t>
             </a:fld>
             <a:endParaRPr lang="de-DE"/>
           </a:p>
@@ -28015,11 +29412,42 @@
             <a:pPr>
               <a:defRPr/>
             </a:pPr>
-            <a:r>
-              <a:rPr lang="de-DE" smtClean="0"/>
-              <a:t>Präsentationstitel</a:t>
-            </a:r>
-            <a:endParaRPr lang="de-DE"/>
+            <a:endParaRPr lang="de-DE" dirty="0" smtClean="0"/>
+          </a:p>
+          <a:p>
+            <a:pPr>
+              <a:defRPr/>
+            </a:pPr>
+            <a:r>
+              <a:rPr lang="de-DE" dirty="0" err="1" smtClean="0"/>
+              <a:t>Outlier</a:t>
+            </a:r>
+            <a:r>
+              <a:rPr lang="de-DE" dirty="0" smtClean="0"/>
+              <a:t> </a:t>
+            </a:r>
+            <a:r>
+              <a:rPr lang="de-DE" dirty="0" err="1"/>
+              <a:t>Detection</a:t>
+            </a:r>
+            <a:r>
+              <a:rPr lang="de-DE" dirty="0"/>
+              <a:t> in </a:t>
+            </a:r>
+            <a:r>
+              <a:rPr lang="de-DE" dirty="0" err="1"/>
+              <a:t>Condition</a:t>
+            </a:r>
+            <a:r>
+              <a:rPr lang="de-DE" dirty="0"/>
+              <a:t> Monitoring</a:t>
+            </a:r>
+          </a:p>
+          <a:p>
+            <a:pPr>
+              <a:defRPr/>
+            </a:pPr>
+            <a:endParaRPr lang="de-DE" dirty="0"/>
           </a:p>
         </p:txBody>
       </p:sp>
@@ -28400,12 +29828,12 @@
               <a:buNone/>
             </a:pPr>
             <a:r>
-              <a:rPr lang="de-DE" dirty="0" err="1" smtClean="0"/>
-              <a:t>sensors</a:t>
+              <a:rPr lang="de-DE" dirty="0"/>
+              <a:t>S</a:t>
             </a:r>
             <a:r>
               <a:rPr lang="de-DE" dirty="0" smtClean="0"/>
-              <a:t> </a:t>
+              <a:t>ensors </a:t>
             </a:r>
             <a:r>
               <a:rPr lang="de-DE" dirty="0" err="1" smtClean="0"/>
@@ -28585,7 +30013,7 @@
             <a:fld id="{3445AF6D-F46D-415C-AD3E-77E0038AE70E}" type="datetime1">
               <a:rPr lang="de-DE" smtClean="0"/>
               <a:pPr/>
-              <a:t>22.07.2013</a:t>
+              <a:t>23.07.2013</a:t>
             </a:fld>
             <a:endParaRPr lang="de-DE"/>
           </a:p>
@@ -28609,11 +30037,42 @@
             <a:pPr>
               <a:defRPr/>
             </a:pPr>
-            <a:r>
-              <a:rPr lang="de-DE" smtClean="0"/>
-              <a:t>Präsentationstitel</a:t>
-            </a:r>
-            <a:endParaRPr lang="de-DE"/>
+            <a:endParaRPr lang="de-DE" dirty="0" smtClean="0"/>
+          </a:p>
+          <a:p>
+            <a:pPr>
+              <a:defRPr/>
+            </a:pPr>
+            <a:r>
+              <a:rPr lang="de-DE" dirty="0" err="1" smtClean="0"/>
+              <a:t>Outlier</a:t>
+            </a:r>
+            <a:r>
+              <a:rPr lang="de-DE" dirty="0" smtClean="0"/>
+              <a:t> </a:t>
+            </a:r>
+            <a:r>
+              <a:rPr lang="de-DE" dirty="0" err="1"/>
+              <a:t>Detection</a:t>
+            </a:r>
+            <a:r>
+              <a:rPr lang="de-DE" dirty="0"/>
+              <a:t> in </a:t>
+            </a:r>
+            <a:r>
+              <a:rPr lang="de-DE" dirty="0" err="1"/>
+              <a:t>Condition</a:t>
+            </a:r>
+            <a:r>
+              <a:rPr lang="de-DE" dirty="0"/>
+              <a:t> Monitoring</a:t>
+            </a:r>
+          </a:p>
+          <a:p>
+            <a:pPr>
+              <a:defRPr/>
+            </a:pPr>
+            <a:endParaRPr lang="de-DE" dirty="0"/>
           </a:p>
         </p:txBody>
       </p:sp>
@@ -29005,7 +30464,7 @@
             <a:fld id="{1F1E0E69-EC8C-4B55-B000-A21B4F200C17}" type="datetime1">
               <a:rPr lang="de-DE" smtClean="0"/>
               <a:pPr/>
-              <a:t>22.07.2013</a:t>
+              <a:t>23.07.2013</a:t>
             </a:fld>
             <a:endParaRPr lang="de-DE"/>
           </a:p>
@@ -29029,11 +30488,42 @@
             <a:pPr>
               <a:defRPr/>
             </a:pPr>
-            <a:r>
-              <a:rPr lang="de-DE" smtClean="0"/>
-              <a:t>Präsentationstitel</a:t>
-            </a:r>
-            <a:endParaRPr lang="de-DE"/>
+            <a:endParaRPr lang="de-DE" dirty="0" smtClean="0"/>
+          </a:p>
+          <a:p>
+            <a:pPr>
+              <a:defRPr/>
+            </a:pPr>
+            <a:r>
+              <a:rPr lang="de-DE" dirty="0" err="1" smtClean="0"/>
+              <a:t>Outlier</a:t>
+            </a:r>
+            <a:r>
+              <a:rPr lang="de-DE" dirty="0" smtClean="0"/>
+              <a:t> </a:t>
+            </a:r>
+            <a:r>
+              <a:rPr lang="de-DE" dirty="0" err="1"/>
+              <a:t>Detection</a:t>
+            </a:r>
+            <a:r>
+              <a:rPr lang="de-DE" dirty="0"/>
+              <a:t> in </a:t>
+            </a:r>
+            <a:r>
+              <a:rPr lang="de-DE" dirty="0" err="1"/>
+              <a:t>Condition</a:t>
+            </a:r>
+            <a:r>
+              <a:rPr lang="de-DE" dirty="0"/>
+              <a:t> Monitoring</a:t>
+            </a:r>
+          </a:p>
+          <a:p>
+            <a:pPr>
+              <a:defRPr/>
+            </a:pPr>
+            <a:endParaRPr lang="de-DE" dirty="0"/>
           </a:p>
         </p:txBody>
       </p:sp>
@@ -29258,7 +30748,7 @@
             <a:fld id="{03B44CDA-7D88-4264-B0E0-D9AD28CBE73B}" type="datetime1">
               <a:rPr lang="de-DE" smtClean="0"/>
               <a:pPr/>
-              <a:t>22.07.2013</a:t>
+              <a:t>23.07.2013</a:t>
             </a:fld>
             <a:endParaRPr lang="de-DE"/>
           </a:p>
@@ -29282,11 +30772,42 @@
             <a:pPr>
               <a:defRPr/>
             </a:pPr>
-            <a:r>
-              <a:rPr lang="de-DE" smtClean="0"/>
-              <a:t>Präsentationstitel</a:t>
-            </a:r>
-            <a:endParaRPr lang="de-DE"/>
+            <a:endParaRPr lang="de-DE" dirty="0" smtClean="0"/>
+          </a:p>
+          <a:p>
+            <a:pPr>
+              <a:defRPr/>
+            </a:pPr>
+            <a:r>
+              <a:rPr lang="de-DE" dirty="0" err="1" smtClean="0"/>
+              <a:t>Outlier</a:t>
+            </a:r>
+            <a:r>
+              <a:rPr lang="de-DE" dirty="0" smtClean="0"/>
+              <a:t> </a:t>
+            </a:r>
+            <a:r>
+              <a:rPr lang="de-DE" dirty="0" err="1"/>
+              <a:t>Detection</a:t>
+            </a:r>
+            <a:r>
+              <a:rPr lang="de-DE" dirty="0"/>
+              <a:t> in </a:t>
+            </a:r>
+            <a:r>
+              <a:rPr lang="de-DE" dirty="0" err="1"/>
+              <a:t>Condition</a:t>
+            </a:r>
+            <a:r>
+              <a:rPr lang="de-DE" dirty="0"/>
+              <a:t> Monitoring</a:t>
+            </a:r>
+          </a:p>
+          <a:p>
+            <a:pPr>
+              <a:defRPr/>
+            </a:pPr>
+            <a:endParaRPr lang="de-DE" dirty="0"/>
           </a:p>
         </p:txBody>
       </p:sp>

</xml_diff>

<commit_message>
Outlier Detection in Condition Monitoring Documentation
</commit_message>
<xml_diff>
--- a/Documentation/SemiSupervisedMethodsInConditionMonitoring2.pptx
+++ b/Documentation/SemiSupervisedMethodsInConditionMonitoring2.pptx
@@ -3330,7 +3330,7 @@
             <a:fld id="{0BAA8257-9383-4363-9C79-3E8643B51DA6}" type="datetime1">
               <a:rPr lang="de-DE"/>
               <a:pPr/>
-              <a:t>23.07.2013</a:t>
+              <a:t>24.07.2013</a:t>
             </a:fld>
             <a:endParaRPr lang="de-DE"/>
           </a:p>
@@ -3609,7 +3609,7 @@
             <a:fld id="{2B2690EF-7428-44E3-8C6D-0DF4E66EF3AB}" type="datetime1">
               <a:rPr lang="de-DE"/>
               <a:pPr/>
-              <a:t>23.07.2013</a:t>
+              <a:t>24.07.2013</a:t>
             </a:fld>
             <a:endParaRPr lang="de-DE"/>
           </a:p>
@@ -4494,7 +4494,7 @@
             <a:fld id="{80C9CFB2-C2A2-466F-9A9D-55207007DCAA}" type="datetime1">
               <a:rPr lang="de-DE"/>
               <a:pPr/>
-              <a:t>23.07.2013</a:t>
+              <a:t>24.07.2013</a:t>
             </a:fld>
             <a:endParaRPr lang="de-DE"/>
           </a:p>
@@ -4707,7 +4707,7 @@
             <a:fld id="{70843FFB-B759-40E5-BDA0-DA7E379EA0FE}" type="datetime1">
               <a:rPr lang="de-DE"/>
               <a:pPr/>
-              <a:t>23.07.2013</a:t>
+              <a:t>24.07.2013</a:t>
             </a:fld>
             <a:endParaRPr lang="de-DE"/>
           </a:p>
@@ -4914,7 +4914,7 @@
             <a:fld id="{03B44CDA-7D88-4264-B0E0-D9AD28CBE73B}" type="datetime1">
               <a:rPr lang="de-DE"/>
               <a:pPr/>
-              <a:t>23.07.2013</a:t>
+              <a:t>24.07.2013</a:t>
             </a:fld>
             <a:endParaRPr lang="de-DE"/>
           </a:p>
@@ -5139,7 +5139,7 @@
             <a:fld id="{1F1E0E69-EC8C-4B55-B000-A21B4F200C17}" type="datetime1">
               <a:rPr lang="de-DE"/>
               <a:pPr/>
-              <a:t>23.07.2013</a:t>
+              <a:t>24.07.2013</a:t>
             </a:fld>
             <a:endParaRPr lang="de-DE"/>
           </a:p>
@@ -5460,7 +5460,7 @@
             <a:fld id="{3445AF6D-F46D-415C-AD3E-77E0038AE70E}" type="datetime1">
               <a:rPr lang="de-DE"/>
               <a:pPr/>
-              <a:t>23.07.2013</a:t>
+              <a:t>24.07.2013</a:t>
             </a:fld>
             <a:endParaRPr lang="de-DE"/>
           </a:p>
@@ -5920,7 +5920,7 @@
             <a:fld id="{B73EFD57-F3EC-46D7-99C5-D27763E7C6E7}" type="datetime1">
               <a:rPr lang="de-DE"/>
               <a:pPr/>
-              <a:t>23.07.2013</a:t>
+              <a:t>24.07.2013</a:t>
             </a:fld>
             <a:endParaRPr lang="de-DE"/>
           </a:p>
@@ -6071,7 +6071,7 @@
             <a:fld id="{D10A3354-FE10-4AE5-BC69-7D7B7DD72453}" type="datetime1">
               <a:rPr lang="de-DE"/>
               <a:pPr/>
-              <a:t>23.07.2013</a:t>
+              <a:t>24.07.2013</a:t>
             </a:fld>
             <a:endParaRPr lang="de-DE"/>
           </a:p>
@@ -6199,7 +6199,7 @@
             <a:fld id="{15AA6C8F-EBA3-4DD5-BD96-4D9492A5DAA3}" type="datetime1">
               <a:rPr lang="de-DE"/>
               <a:pPr/>
-              <a:t>23.07.2013</a:t>
+              <a:t>24.07.2013</a:t>
             </a:fld>
             <a:endParaRPr lang="de-DE"/>
           </a:p>
@@ -6509,7 +6509,7 @@
             <a:fld id="{A0AEE9D6-2597-4638-9A15-688030BA3E82}" type="datetime1">
               <a:rPr lang="de-DE"/>
               <a:pPr/>
-              <a:t>23.07.2013</a:t>
+              <a:t>24.07.2013</a:t>
             </a:fld>
             <a:endParaRPr lang="de-DE"/>
           </a:p>
@@ -6799,7 +6799,7 @@
             <a:fld id="{B1851BDD-97EF-496F-A69C-E8C566C1C58A}" type="datetime1">
               <a:rPr lang="de-DE"/>
               <a:pPr/>
-              <a:t>23.07.2013</a:t>
+              <a:t>24.07.2013</a:t>
             </a:fld>
             <a:endParaRPr lang="de-DE"/>
           </a:p>
@@ -7165,7 +7165,7 @@
             <a:fld id="{7FDAFA23-E311-4378-990F-5FCA161EBB96}" type="datetime1">
               <a:rPr lang="de-DE"/>
               <a:pPr/>
-              <a:t>23.07.2013</a:t>
+              <a:t>24.07.2013</a:t>
             </a:fld>
             <a:endParaRPr lang="de-DE"/>
           </a:p>
@@ -7958,8 +7958,8 @@
           </a:p>
         </p:txBody>
       </p:sp>
-      <mc:AlternateContent xmlns:mc="http://schemas.openxmlformats.org/markup-compatibility/2006" xmlns:a14="http://schemas.microsoft.com/office/drawing/2010/main">
-        <mc:Choice Requires="a14">
+      <mc:AlternateContent xmlns:mc="http://schemas.openxmlformats.org/markup-compatibility/2006">
+        <mc:Choice xmlns:a14="http://schemas.microsoft.com/office/drawing/2010/main" Requires="a14">
           <p:sp>
             <p:nvSpPr>
               <p:cNvPr id="3" name="Inhaltsplatzhalter 2"/>
@@ -8487,7 +8487,7 @@
                 </a:r>
                 <a:r>
                   <a:rPr lang="de-DE" dirty="0" err="1" smtClean="0"/>
-                  <a:t>machine</a:t>
+                  <a:t>transmission</a:t>
                 </a:r>
                 <a:r>
                   <a:rPr lang="de-DE" dirty="0" smtClean="0"/>
@@ -8495,11 +8495,23 @@
                 </a:r>
                 <a:r>
                   <a:rPr lang="de-DE" dirty="0" err="1" smtClean="0"/>
-                  <a:t>characteristics</a:t>
+                  <a:t>path</a:t>
                 </a:r>
                 <a:r>
                   <a:rPr lang="de-DE" dirty="0" smtClean="0"/>
                   <a:t> </a:t>
+                </a:r>
+                <a:r>
+                  <a:rPr lang="de-DE" dirty="0" err="1" smtClean="0"/>
+                  <a:t>characteristics</a:t>
+                </a:r>
+                <a:r>
+                  <a:rPr lang="de-DE" dirty="0"/>
+                  <a:t>	</a:t>
+                </a:r>
+                <a:r>
+                  <a:rPr lang="de-DE" dirty="0" smtClean="0"/>
+                  <a:t>   	  </a:t>
                 </a:r>
                 <a14:m>
                   <m:oMath xmlns:m="http://schemas.openxmlformats.org/officeDocument/2006/math">
@@ -8553,18 +8565,12 @@
                 <a:pPr marL="0" indent="0">
                   <a:buNone/>
                 </a:pPr>
-                <a:endParaRPr lang="de-DE" dirty="0" smtClean="0"/>
-              </a:p>
-              <a:p>
-                <a:pPr marL="0" indent="0">
-                  <a:buNone/>
-                </a:pPr>
                 <a:endParaRPr lang="de-DE" dirty="0"/>
               </a:p>
             </p:txBody>
           </p:sp>
         </mc:Choice>
-        <mc:Fallback xmlns="">
+        <mc:Fallback>
           <p:sp>
             <p:nvSpPr>
               <p:cNvPr id="3" name="Inhaltsplatzhalter 2"/>
@@ -8616,7 +8622,7 @@
             <a:fld id="{03B44CDA-7D88-4264-B0E0-D9AD28CBE73B}" type="datetime1">
               <a:rPr lang="de-DE" smtClean="0"/>
               <a:pPr/>
-              <a:t>23.07.2013</a:t>
+              <a:t>24.07.2013</a:t>
             </a:fld>
             <a:endParaRPr lang="de-DE"/>
           </a:p>
@@ -8753,6 +8759,14 @@
   <p:clrMapOvr>
     <a:masterClrMapping/>
   </p:clrMapOvr>
+  <mc:AlternateContent xmlns:mc="http://schemas.openxmlformats.org/markup-compatibility/2006">
+    <mc:Choice xmlns:p14="http://schemas.microsoft.com/office/powerpoint/2010/main" Requires="p14">
+      <p:transition p14:dur="0"/>
+    </mc:Choice>
+    <mc:Fallback>
+      <p:transition/>
+    </mc:Fallback>
+  </mc:AlternateContent>
   <p:timing>
     <p:tnLst>
       <p:par>
@@ -9129,7 +9143,6 @@
               <a:rPr lang="de-DE" dirty="0" smtClean="0"/>
               <a:t> Transform</a:t>
             </a:r>
-            <a:endParaRPr lang="de-DE" dirty="0" smtClean="0"/>
           </a:p>
           <a:p>
             <a:endParaRPr lang="de-DE" dirty="0" smtClean="0"/>
@@ -9154,7 +9167,7 @@
             <a:fld id="{03B44CDA-7D88-4264-B0E0-D9AD28CBE73B}" type="datetime1">
               <a:rPr lang="de-DE" smtClean="0"/>
               <a:pPr/>
-              <a:t>23.07.2013</a:t>
+              <a:t>24.07.2013</a:t>
             </a:fld>
             <a:endParaRPr lang="de-DE"/>
           </a:p>
@@ -9714,7 +9727,7 @@
             <a:fld id="{03B44CDA-7D88-4264-B0E0-D9AD28CBE73B}" type="datetime1">
               <a:rPr lang="de-DE" smtClean="0"/>
               <a:pPr/>
-              <a:t>23.07.2013</a:t>
+              <a:t>24.07.2013</a:t>
             </a:fld>
             <a:endParaRPr lang="de-DE"/>
           </a:p>
@@ -9912,7 +9925,7 @@
             <a:fld id="{03B44CDA-7D88-4264-B0E0-D9AD28CBE73B}" type="datetime1">
               <a:rPr lang="de-DE" smtClean="0"/>
               <a:pPr/>
-              <a:t>23.07.2013</a:t>
+              <a:t>24.07.2013</a:t>
             </a:fld>
             <a:endParaRPr lang="de-DE"/>
           </a:p>
@@ -10116,6 +10129,13 @@
   <p:clrMapOvr>
     <a:masterClrMapping/>
   </p:clrMapOvr>
+  <p:timing>
+    <p:tnLst>
+      <p:par>
+        <p:cTn id="1" dur="indefinite" restart="never" nodeType="tmRoot"/>
+      </p:par>
+    </p:tnLst>
+  </p:timing>
 </p:sld>
 </file>
 
@@ -10171,8 +10191,8 @@
           </a:p>
         </p:txBody>
       </p:sp>
-      <mc:AlternateContent xmlns:mc="http://schemas.openxmlformats.org/markup-compatibility/2006">
-        <mc:Choice xmlns:a14="http://schemas.microsoft.com/office/drawing/2010/main" Requires="a14">
+      <mc:AlternateContent xmlns:mc="http://schemas.openxmlformats.org/markup-compatibility/2006" xmlns:a14="http://schemas.microsoft.com/office/drawing/2010/main">
+        <mc:Choice Requires="a14">
           <p:sp>
             <p:nvSpPr>
               <p:cNvPr id="3" name="Inhaltsplatzhalter 2"/>
@@ -10367,11 +10387,7 @@
                 </a:r>
                 <a:r>
                   <a:rPr lang="de-DE" dirty="0" smtClean="0"/>
-                  <a:t>, </a:t>
-                </a:r>
-                <a:r>
-                  <a:rPr lang="de-DE" dirty="0" smtClean="0"/>
-                  <a:t>i.e. </a:t>
+                  <a:t>, i.e. </a:t>
                 </a:r>
                 <a:r>
                   <a:rPr lang="de-DE" dirty="0" err="1" smtClean="0"/>
@@ -10533,7 +10549,7 @@
             </p:txBody>
           </p:sp>
         </mc:Choice>
-        <mc:Fallback>
+        <mc:Fallback xmlns="">
           <p:sp>
             <p:nvSpPr>
               <p:cNvPr id="3" name="Inhaltsplatzhalter 2"/>
@@ -10585,7 +10601,7 @@
             <a:fld id="{03B44CDA-7D88-4264-B0E0-D9AD28CBE73B}" type="datetime1">
               <a:rPr lang="de-DE" smtClean="0"/>
               <a:pPr/>
-              <a:t>23.07.2013</a:t>
+              <a:t>24.07.2013</a:t>
             </a:fld>
             <a:endParaRPr lang="de-DE"/>
           </a:p>
@@ -11104,7 +11120,7 @@
             <a:fld id="{03B44CDA-7D88-4264-B0E0-D9AD28CBE73B}" type="datetime1">
               <a:rPr lang="de-DE" smtClean="0"/>
               <a:pPr/>
-              <a:t>23.07.2013</a:t>
+              <a:t>24.07.2013</a:t>
             </a:fld>
             <a:endParaRPr lang="de-DE"/>
           </a:p>
@@ -11263,7 +11279,7 @@
             <a:fld id="{1F1E0E69-EC8C-4B55-B000-A21B4F200C17}" type="datetime1">
               <a:rPr lang="de-DE" smtClean="0"/>
               <a:pPr/>
-              <a:t>23.07.2013</a:t>
+              <a:t>24.07.2013</a:t>
             </a:fld>
             <a:endParaRPr lang="de-DE"/>
           </a:p>
@@ -11360,6 +11376,13 @@
   <p:clrMapOvr>
     <a:masterClrMapping/>
   </p:clrMapOvr>
+  <p:timing>
+    <p:tnLst>
+      <p:par>
+        <p:cTn id="1" dur="indefinite" restart="never" nodeType="tmRoot"/>
+      </p:par>
+    </p:tnLst>
+  </p:timing>
 </p:sld>
 </file>
 
@@ -11856,7 +11879,7 @@
             <a:fld id="{3445AF6D-F46D-415C-AD3E-77E0038AE70E}" type="datetime1">
               <a:rPr lang="de-DE" smtClean="0"/>
               <a:pPr/>
-              <a:t>23.07.2013</a:t>
+              <a:t>24.07.2013</a:t>
             </a:fld>
             <a:endParaRPr lang="de-DE"/>
           </a:p>
@@ -12088,7 +12111,7 @@
             <a:fld id="{3445AF6D-F46D-415C-AD3E-77E0038AE70E}" type="datetime1">
               <a:rPr lang="de-DE" smtClean="0"/>
               <a:pPr/>
-              <a:t>23.07.2013</a:t>
+              <a:t>24.07.2013</a:t>
             </a:fld>
             <a:endParaRPr lang="de-DE"/>
           </a:p>
@@ -13059,8 +13082,8 @@
           </a:p>
         </p:txBody>
       </p:sp>
-      <mc:AlternateContent xmlns:mc="http://schemas.openxmlformats.org/markup-compatibility/2006">
-        <mc:Choice xmlns:a14="http://schemas.microsoft.com/office/drawing/2010/main" Requires="a14">
+      <mc:AlternateContent xmlns:mc="http://schemas.openxmlformats.org/markup-compatibility/2006" xmlns:a14="http://schemas.microsoft.com/office/drawing/2010/main">
+        <mc:Choice Requires="a14">
           <p:sp>
             <p:nvSpPr>
               <p:cNvPr id="3" name="Inhaltsplatzhalter 2"/>
@@ -13245,7 +13268,6 @@
                   <a:rPr lang="de-DE" sz="2400" dirty="0" smtClean="0"/>
                   <a:t> </a:t>
                 </a:r>
-                <a:endParaRPr lang="de-DE" sz="2400" dirty="0" smtClean="0"/>
               </a:p>
               <a:p>
                 <a:pPr marL="514350" indent="-514350">
@@ -13409,7 +13431,7 @@
             </p:txBody>
           </p:sp>
         </mc:Choice>
-        <mc:Fallback>
+        <mc:Fallback xmlns="">
           <p:sp>
             <p:nvSpPr>
               <p:cNvPr id="3" name="Inhaltsplatzhalter 2"/>
@@ -13461,7 +13483,7 @@
             <a:fld id="{03B44CDA-7D88-4264-B0E0-D9AD28CBE73B}" type="datetime1">
               <a:rPr lang="de-DE" smtClean="0"/>
               <a:pPr/>
-              <a:t>23.07.2013</a:t>
+              <a:t>24.07.2013</a:t>
             </a:fld>
             <a:endParaRPr lang="de-DE"/>
           </a:p>
@@ -13716,7 +13738,7 @@
                 </a:solidFill>
               </a:rPr>
               <a:pPr eaLnBrk="1" hangingPunct="1"/>
-              <a:t>23.07.2013</a:t>
+              <a:t>24.07.2013</a:t>
             </a:fld>
             <a:endParaRPr lang="de-DE">
               <a:solidFill>
@@ -14707,7 +14729,7 @@
             <a:fld id="{03B44CDA-7D88-4264-B0E0-D9AD28CBE73B}" type="datetime1">
               <a:rPr lang="de-DE" smtClean="0"/>
               <a:pPr/>
-              <a:t>23.07.2013</a:t>
+              <a:t>24.07.2013</a:t>
             </a:fld>
             <a:endParaRPr lang="de-DE"/>
           </a:p>
@@ -14880,7 +14902,7 @@
             <a:fld id="{3445AF6D-F46D-415C-AD3E-77E0038AE70E}" type="datetime1">
               <a:rPr lang="de-DE" smtClean="0"/>
               <a:pPr/>
-              <a:t>23.07.2013</a:t>
+              <a:t>24.07.2013</a:t>
             </a:fld>
             <a:endParaRPr lang="de-DE"/>
           </a:p>
@@ -15568,7 +15590,7 @@
             <a:fld id="{3445AF6D-F46D-415C-AD3E-77E0038AE70E}" type="datetime1">
               <a:rPr lang="de-DE" smtClean="0"/>
               <a:pPr/>
-              <a:t>23.07.2013</a:t>
+              <a:t>24.07.2013</a:t>
             </a:fld>
             <a:endParaRPr lang="de-DE"/>
           </a:p>
@@ -15844,11 +15866,7 @@
             </a:r>
             <a:r>
               <a:rPr lang="de-DE" sz="2000" dirty="0" smtClean="0"/>
-              <a:t> </a:t>
-            </a:r>
-            <a:r>
-              <a:rPr lang="de-DE" sz="2000" dirty="0" smtClean="0"/>
-              <a:t>			</a:t>
+              <a:t> 			</a:t>
             </a:r>
             <a:r>
               <a:rPr lang="de-DE" sz="2000" dirty="0" err="1" smtClean="0"/>
@@ -16112,11 +16130,7 @@
             </a:r>
             <a:r>
               <a:rPr lang="de-DE" sz="2000" dirty="0" err="1" smtClean="0"/>
-              <a:t>neares</a:t>
-            </a:r>
-            <a:r>
-              <a:rPr lang="de-DE" sz="2000" dirty="0" err="1" smtClean="0"/>
-              <a:t>t</a:t>
+              <a:t>nearest</a:t>
             </a:r>
             <a:r>
               <a:rPr lang="de-DE" sz="2000" dirty="0" smtClean="0"/>
@@ -16263,7 +16277,7 @@
             <a:fld id="{3445AF6D-F46D-415C-AD3E-77E0038AE70E}" type="datetime1">
               <a:rPr lang="de-DE" smtClean="0"/>
               <a:pPr/>
-              <a:t>23.07.2013</a:t>
+              <a:t>24.07.2013</a:t>
             </a:fld>
             <a:endParaRPr lang="de-DE"/>
           </a:p>
@@ -16719,11 +16733,7 @@
             </a:r>
             <a:r>
               <a:rPr lang="de-DE" sz="2000" dirty="0" err="1" smtClean="0"/>
-              <a:t>neares</a:t>
-            </a:r>
-            <a:r>
-              <a:rPr lang="de-DE" sz="2000" dirty="0" err="1" smtClean="0"/>
-              <a:t>t</a:t>
+              <a:t>nearest</a:t>
             </a:r>
             <a:r>
               <a:rPr lang="de-DE" sz="2000" dirty="0" smtClean="0"/>
@@ -16882,7 +16892,7 @@
             <a:fld id="{3445AF6D-F46D-415C-AD3E-77E0038AE70E}" type="datetime1">
               <a:rPr lang="de-DE" smtClean="0"/>
               <a:pPr/>
-              <a:t>23.07.2013</a:t>
+              <a:t>24.07.2013</a:t>
             </a:fld>
             <a:endParaRPr lang="de-DE"/>
           </a:p>
@@ -17431,7 +17441,7 @@
             <a:fld id="{3445AF6D-F46D-415C-AD3E-77E0038AE70E}" type="datetime1">
               <a:rPr lang="de-DE" smtClean="0"/>
               <a:pPr/>
-              <a:t>23.07.2013</a:t>
+              <a:t>24.07.2013</a:t>
             </a:fld>
             <a:endParaRPr lang="de-DE"/>
           </a:p>
@@ -18051,7 +18061,7 @@
             <a:fld id="{3445AF6D-F46D-415C-AD3E-77E0038AE70E}" type="datetime1">
               <a:rPr lang="de-DE" smtClean="0"/>
               <a:pPr/>
-              <a:t>23.07.2013</a:t>
+              <a:t>24.07.2013</a:t>
             </a:fld>
             <a:endParaRPr lang="de-DE"/>
           </a:p>
@@ -18633,7 +18643,7 @@
             <a:fld id="{03B44CDA-7D88-4264-B0E0-D9AD28CBE73B}" type="datetime1">
               <a:rPr lang="de-DE" smtClean="0"/>
               <a:pPr/>
-              <a:t>23.07.2013</a:t>
+              <a:t>24.07.2013</a:t>
             </a:fld>
             <a:endParaRPr lang="de-DE"/>
           </a:p>
@@ -19265,7 +19275,7 @@
             <a:fld id="{03B44CDA-7D88-4264-B0E0-D9AD28CBE73B}" type="datetime1">
               <a:rPr lang="de-DE" smtClean="0"/>
               <a:pPr/>
-              <a:t>23.07.2013</a:t>
+              <a:t>24.07.2013</a:t>
             </a:fld>
             <a:endParaRPr lang="de-DE"/>
           </a:p>
@@ -19740,11 +19750,59 @@
             </a:r>
             <a:r>
               <a:rPr lang="de-DE" sz="2000" dirty="0" err="1" smtClean="0"/>
+              <a:t>Implemented</a:t>
+            </a:r>
+            <a:r>
+              <a:rPr lang="de-DE" sz="2000" dirty="0" smtClean="0"/>
+              <a:t> </a:t>
+            </a:r>
+            <a:r>
+              <a:rPr lang="de-DE" sz="2000" dirty="0" err="1" smtClean="0"/>
+              <a:t>for</a:t>
+            </a:r>
+            <a:r>
+              <a:rPr lang="de-DE" sz="2000" dirty="0" smtClean="0"/>
+              <a:t> </a:t>
+            </a:r>
+            <a:r>
+              <a:rPr lang="de-DE" sz="2000" dirty="0" err="1" smtClean="0"/>
+              <a:t>this</a:t>
+            </a:r>
+            <a:r>
+              <a:rPr lang="de-DE" sz="2000" dirty="0" smtClean="0"/>
+              <a:t> </a:t>
+            </a:r>
+            <a:r>
+              <a:rPr lang="de-DE" sz="2000" dirty="0" err="1" smtClean="0"/>
+              <a:t>thesis</a:t>
+            </a:r>
+            <a:r>
+              <a:rPr lang="de-DE" sz="2000" dirty="0" smtClean="0"/>
+              <a:t> in R </a:t>
+            </a:r>
+            <a:r>
+              <a:rPr lang="de-DE" sz="2000" dirty="0" err="1" smtClean="0"/>
+              <a:t>and</a:t>
+            </a:r>
+            <a:r>
+              <a:rPr lang="de-DE" sz="2000" dirty="0" smtClean="0"/>
+              <a:t> </a:t>
+            </a:r>
+            <a:r>
+              <a:rPr lang="de-DE" sz="2000" dirty="0" err="1" smtClean="0"/>
+              <a:t>Matlab</a:t>
+            </a:r>
+            <a:r>
+              <a:rPr lang="de-DE" sz="2000" dirty="0" smtClean="0"/>
+              <a:t>, </a:t>
+            </a:r>
+            <a:r>
+              <a:rPr lang="de-DE" sz="2000" dirty="0" err="1" smtClean="0"/>
               <a:t>Proof</a:t>
             </a:r>
             <a:r>
               <a:rPr lang="de-DE" sz="2000" dirty="0" smtClean="0"/>
-              <a:t> </a:t>
+              <a:t> 		</a:t>
             </a:r>
             <a:r>
               <a:rPr lang="de-DE" sz="2000" dirty="0" err="1" smtClean="0"/>
@@ -19760,7 +19818,11 @@
             </a:r>
             <a:r>
               <a:rPr lang="de-DE" sz="2000" dirty="0" smtClean="0"/>
-              <a:t> in </a:t>
+              <a:t> </a:t>
+            </a:r>
+            <a:r>
+              <a:rPr lang="de-DE" sz="2000" dirty="0" smtClean="0"/>
+              <a:t>in </a:t>
             </a:r>
             <a:r>
               <a:rPr lang="de-DE" sz="2000" dirty="0" err="1" smtClean="0"/>
@@ -19856,7 +19918,7 @@
             <a:fld id="{1F1E0E69-EC8C-4B55-B000-A21B4F200C17}" type="datetime1">
               <a:rPr lang="de-DE" smtClean="0"/>
               <a:pPr/>
-              <a:t>23.07.2013</a:t>
+              <a:t>24.07.2013</a:t>
             </a:fld>
             <a:endParaRPr lang="de-DE"/>
           </a:p>
@@ -19953,6 +20015,13 @@
   <p:clrMapOvr>
     <a:masterClrMapping/>
   </p:clrMapOvr>
+  <p:timing>
+    <p:tnLst>
+      <p:par>
+        <p:cTn id="1" dur="indefinite" restart="never" nodeType="tmRoot"/>
+      </p:par>
+    </p:tnLst>
+  </p:timing>
 </p:sld>
 </file>
 
@@ -20018,7 +20087,7 @@
             <a:fld id="{1F1E0E69-EC8C-4B55-B000-A21B4F200C17}" type="datetime1">
               <a:rPr lang="de-DE" smtClean="0"/>
               <a:pPr/>
-              <a:t>23.07.2013</a:t>
+              <a:t>24.07.2013</a:t>
             </a:fld>
             <a:endParaRPr lang="de-DE"/>
           </a:p>
@@ -20115,6 +20184,13 @@
   <p:clrMapOvr>
     <a:masterClrMapping/>
   </p:clrMapOvr>
+  <p:timing>
+    <p:tnLst>
+      <p:par>
+        <p:cTn id="1" dur="indefinite" restart="never" nodeType="tmRoot"/>
+      </p:par>
+    </p:tnLst>
+  </p:timing>
 </p:sld>
 </file>
 
@@ -20281,7 +20357,7 @@
             <a:fld id="{3445AF6D-F46D-415C-AD3E-77E0038AE70E}" type="datetime1">
               <a:rPr lang="de-DE" smtClean="0"/>
               <a:pPr/>
-              <a:t>23.07.2013</a:t>
+              <a:t>24.07.2013</a:t>
             </a:fld>
             <a:endParaRPr lang="de-DE"/>
           </a:p>
@@ -20490,7 +20566,7 @@
             <a:fld id="{3445AF6D-F46D-415C-AD3E-77E0038AE70E}" type="datetime1">
               <a:rPr lang="de-DE" smtClean="0"/>
               <a:pPr/>
-              <a:t>23.07.2013</a:t>
+              <a:t>24.07.2013</a:t>
             </a:fld>
             <a:endParaRPr lang="de-DE"/>
           </a:p>
@@ -20800,15 +20876,7 @@
             </a:r>
             <a:r>
               <a:rPr lang="de-DE" sz="2400" kern="0" dirty="0" smtClean="0"/>
-              <a:t>					</a:t>
-            </a:r>
-            <a:r>
-              <a:rPr lang="de-DE" sz="2400" kern="0" dirty="0" smtClean="0"/>
-              <a:t>	2.ball </a:t>
-            </a:r>
-            <a:r>
-              <a:rPr lang="de-DE" sz="2400" kern="0" dirty="0" smtClean="0"/>
-              <a:t>fault </a:t>
+              <a:t>						2.ball fault </a:t>
             </a:r>
             <a:r>
               <a:rPr lang="de-DE" sz="2400" kern="0" dirty="0" err="1" smtClean="0"/>
@@ -20868,12 +20936,8 @@
               <a:t> Case Western </a:t>
             </a:r>
             <a:r>
-              <a:rPr lang="de-DE" sz="1400" kern="0" dirty="0" err="1" smtClean="0"/>
-              <a:t>Univeristy</a:t>
-            </a:r>
-            <a:r>
               <a:rPr lang="de-DE" sz="1400" kern="0" dirty="0" smtClean="0"/>
-              <a:t>                                                               </a:t>
+              <a:t>University                                                               </a:t>
             </a:r>
             <a:endParaRPr lang="de-DE" sz="2400" kern="0" dirty="0" smtClean="0"/>
           </a:p>
@@ -21178,7 +21242,7 @@
             <a:fld id="{03B44CDA-7D88-4264-B0E0-D9AD28CBE73B}" type="datetime1">
               <a:rPr lang="de-DE" smtClean="0"/>
               <a:pPr/>
-              <a:t>23.07.2013</a:t>
+              <a:t>24.07.2013</a:t>
             </a:fld>
             <a:endParaRPr lang="de-DE"/>
           </a:p>
@@ -21633,7 +21697,7 @@
             <a:fld id="{3445AF6D-F46D-415C-AD3E-77E0038AE70E}" type="datetime1">
               <a:rPr lang="de-DE" smtClean="0"/>
               <a:pPr/>
-              <a:t>23.07.2013</a:t>
+              <a:t>24.07.2013</a:t>
             </a:fld>
             <a:endParaRPr lang="de-DE"/>
           </a:p>
@@ -22342,7 +22406,7 @@
             <a:fld id="{3445AF6D-F46D-415C-AD3E-77E0038AE70E}" type="datetime1">
               <a:rPr lang="de-DE" smtClean="0"/>
               <a:pPr/>
-              <a:t>23.07.2013</a:t>
+              <a:t>24.07.2013</a:t>
             </a:fld>
             <a:endParaRPr lang="de-DE"/>
           </a:p>
@@ -22533,11 +22597,7 @@
             </a:r>
             <a:r>
               <a:rPr lang="de-DE" dirty="0" smtClean="0"/>
-              <a:t> </a:t>
-            </a:r>
-            <a:r>
-              <a:rPr lang="de-DE" dirty="0" smtClean="0"/>
-              <a:t>fault</a:t>
+              <a:t> fault</a:t>
             </a:r>
             <a:endParaRPr lang="de-DE" dirty="0"/>
           </a:p>
@@ -22583,11 +22643,7 @@
             </a:r>
             <a:r>
               <a:rPr lang="de-DE" dirty="0" smtClean="0"/>
-              <a:t> </a:t>
-            </a:r>
-            <a:r>
-              <a:rPr lang="de-DE" dirty="0" smtClean="0"/>
-              <a:t>fault</a:t>
+              <a:t> fault</a:t>
             </a:r>
             <a:endParaRPr lang="de-DE" dirty="0"/>
           </a:p>
@@ -22756,7 +22812,7 @@
             <a:fld id="{3445AF6D-F46D-415C-AD3E-77E0038AE70E}" type="datetime1">
               <a:rPr lang="de-DE" smtClean="0"/>
               <a:pPr/>
-              <a:t>23.07.2013</a:t>
+              <a:t>24.07.2013</a:t>
             </a:fld>
             <a:endParaRPr lang="de-DE"/>
           </a:p>
@@ -25881,7 +25937,7 @@
             <a:fld id="{3445AF6D-F46D-415C-AD3E-77E0038AE70E}" type="datetime1">
               <a:rPr lang="de-DE" smtClean="0"/>
               <a:pPr/>
-              <a:t>23.07.2013</a:t>
+              <a:t>24.07.2013</a:t>
             </a:fld>
             <a:endParaRPr lang="de-DE"/>
           </a:p>
@@ -26097,6 +26153,69 @@
               <a:t>construction</a:t>
             </a:r>
             <a:endParaRPr lang="de-DE" sz="2400" dirty="0"/>
+          </a:p>
+        </p:txBody>
+      </p:sp>
+      <p:sp>
+        <p:nvSpPr>
+          <p:cNvPr id="13" name="Textfeld 12"/>
+          <p:cNvSpPr txBox="1"/>
+          <p:nvPr/>
+        </p:nvSpPr>
+        <p:spPr>
+          <a:xfrm>
+            <a:off x="1835696" y="4829090"/>
+            <a:ext cx="4824536" cy="400110"/>
+          </a:xfrm>
+          <a:prstGeom prst="rect">
+            <a:avLst/>
+          </a:prstGeom>
+          <a:noFill/>
+        </p:spPr>
+        <p:txBody>
+          <a:bodyPr wrap="square" rtlCol="0">
+            <a:spAutoFit/>
+          </a:bodyPr>
+          <a:lstStyle/>
+          <a:p>
+            <a:pPr algn="ctr"/>
+            <a:r>
+              <a:rPr lang="de-DE" sz="1400" dirty="0" smtClean="0"/>
+              <a:t>1 </a:t>
+            </a:r>
+            <a:r>
+              <a:rPr lang="de-DE" sz="1400" dirty="0" err="1" smtClean="0"/>
+              <a:t>feature</a:t>
+            </a:r>
+            <a:r>
+              <a:rPr lang="de-DE" sz="1400" dirty="0" smtClean="0"/>
+              <a:t> </a:t>
+            </a:r>
+            <a:r>
+              <a:rPr lang="de-DE" sz="1400" dirty="0" err="1" smtClean="0"/>
+              <a:t>data</a:t>
+            </a:r>
+            <a:r>
+              <a:rPr lang="de-DE" sz="1400" dirty="0" smtClean="0"/>
+              <a:t> </a:t>
+            </a:r>
+            <a:r>
+              <a:rPr lang="de-DE" sz="1400" dirty="0" err="1" smtClean="0"/>
+              <a:t>set</a:t>
+            </a:r>
+            <a:r>
+              <a:rPr lang="de-DE" sz="1400" dirty="0" smtClean="0"/>
+              <a:t> per </a:t>
+            </a:r>
+            <a:r>
+              <a:rPr lang="de-DE" sz="1400" dirty="0" err="1" smtClean="0"/>
+              <a:t>condition</a:t>
+            </a:r>
+            <a:r>
+              <a:rPr lang="de-DE" sz="2000" dirty="0" smtClean="0"/>
+              <a:t> </a:t>
+            </a:r>
+            <a:endParaRPr lang="de-DE" sz="2000" dirty="0"/>
           </a:p>
         </p:txBody>
       </p:sp>
@@ -26246,7 +26365,7 @@
             <a:fld id="{3445AF6D-F46D-415C-AD3E-77E0038AE70E}" type="datetime1">
               <a:rPr lang="de-DE" smtClean="0"/>
               <a:pPr/>
-              <a:t>23.07.2013</a:t>
+              <a:t>24.07.2013</a:t>
             </a:fld>
             <a:endParaRPr lang="de-DE"/>
           </a:p>
@@ -26559,7 +26678,7 @@
             <a:fld id="{3445AF6D-F46D-415C-AD3E-77E0038AE70E}" type="datetime1">
               <a:rPr lang="de-DE" smtClean="0"/>
               <a:pPr/>
-              <a:t>23.07.2013</a:t>
+              <a:t>24.07.2013</a:t>
             </a:fld>
             <a:endParaRPr lang="de-DE"/>
           </a:p>
@@ -26840,7 +26959,7 @@
             <a:fld id="{3445AF6D-F46D-415C-AD3E-77E0038AE70E}" type="datetime1">
               <a:rPr lang="de-DE" smtClean="0"/>
               <a:pPr/>
-              <a:t>23.07.2013</a:t>
+              <a:t>24.07.2013</a:t>
             </a:fld>
             <a:endParaRPr lang="de-DE"/>
           </a:p>
@@ -27127,7 +27246,6 @@
               <a:rPr lang="de-DE" i="1" dirty="0" smtClean="0"/>
               <a:t> </a:t>
             </a:r>
-            <a:endParaRPr lang="de-DE" i="1" dirty="0" smtClean="0"/>
           </a:p>
           <a:p>
             <a:pPr marL="0" indent="0" algn="ctr">
@@ -27206,7 +27324,6 @@
               <a:rPr lang="de-DE" i="1" dirty="0" smtClean="0"/>
               <a:t> </a:t>
             </a:r>
-            <a:endParaRPr lang="de-DE" i="1" dirty="0" smtClean="0"/>
           </a:p>
           <a:p>
             <a:pPr marL="0" indent="0" algn="ctr">
@@ -27214,11 +27331,7 @@
             </a:pPr>
             <a:r>
               <a:rPr lang="de-DE" i="1" dirty="0" smtClean="0"/>
-              <a:t>in </a:t>
-            </a:r>
-            <a:r>
-              <a:rPr lang="de-DE" i="1" dirty="0" smtClean="0"/>
-              <a:t>such a </a:t>
+              <a:t>in such a </a:t>
             </a:r>
             <a:r>
               <a:rPr lang="de-DE" i="1" dirty="0" err="1" smtClean="0"/>
@@ -27332,7 +27445,6 @@
               <a:rPr lang="de-DE" i="1" dirty="0" smtClean="0"/>
               <a:t> </a:t>
             </a:r>
-            <a:endParaRPr lang="de-DE" i="1" dirty="0" smtClean="0"/>
           </a:p>
           <a:p>
             <a:pPr marL="0" indent="0" algn="ctr">
@@ -27377,7 +27489,7 @@
             <a:fld id="{03B44CDA-7D88-4264-B0E0-D9AD28CBE73B}" type="datetime1">
               <a:rPr lang="de-DE" smtClean="0"/>
               <a:pPr/>
-              <a:t>23.07.2013</a:t>
+              <a:t>24.07.2013</a:t>
             </a:fld>
             <a:endParaRPr lang="de-DE"/>
           </a:p>
@@ -27629,7 +27741,7 @@
             <a:fld id="{3445AF6D-F46D-415C-AD3E-77E0038AE70E}" type="datetime1">
               <a:rPr lang="de-DE" smtClean="0"/>
               <a:pPr/>
-              <a:t>23.07.2013</a:t>
+              <a:t>24.07.2013</a:t>
             </a:fld>
             <a:endParaRPr lang="de-DE"/>
           </a:p>
@@ -27909,11 +28021,122 @@
             </a:r>
             <a:r>
               <a:rPr lang="de-DE" dirty="0" err="1" smtClean="0"/>
+              <a:t>one-class</a:t>
+            </a:r>
+            <a:r>
+              <a:rPr lang="de-DE" dirty="0" smtClean="0"/>
+              <a:t>- </a:t>
+            </a:r>
+            <a:r>
+              <a:rPr lang="de-DE" dirty="0" err="1" smtClean="0"/>
+              <a:t>classifiers</a:t>
+            </a:r>
+            <a:r>
+              <a:rPr lang="de-DE" dirty="0" smtClean="0"/>
+              <a:t> </a:t>
+            </a:r>
+            <a:r>
+              <a:rPr lang="de-DE" dirty="0" err="1" smtClean="0"/>
+              <a:t>for</a:t>
+            </a:r>
+            <a:r>
+              <a:rPr lang="de-DE" dirty="0" smtClean="0"/>
+              <a:t> </a:t>
+            </a:r>
+            <a:r>
+              <a:rPr lang="de-DE" dirty="0" err="1" smtClean="0"/>
+              <a:t>the</a:t>
+            </a:r>
+            <a:r>
+              <a:rPr lang="de-DE" dirty="0" smtClean="0"/>
+              <a:t> </a:t>
+            </a:r>
+            <a:r>
+              <a:rPr lang="de-DE" dirty="0" err="1" smtClean="0"/>
+              <a:t>roller</a:t>
+            </a:r>
+            <a:r>
+              <a:rPr lang="de-DE" dirty="0" smtClean="0"/>
+              <a:t> </a:t>
+            </a:r>
+            <a:r>
+              <a:rPr lang="de-DE" dirty="0" err="1" smtClean="0"/>
+              <a:t>bearing</a:t>
+            </a:r>
+            <a:r>
+              <a:rPr lang="de-DE" dirty="0" smtClean="0"/>
+              <a:t> </a:t>
+            </a:r>
+            <a:r>
+              <a:rPr lang="de-DE" dirty="0" err="1" smtClean="0"/>
+              <a:t>dataset</a:t>
+            </a:r>
+            <a:endParaRPr lang="de-DE" dirty="0" smtClean="0"/>
+          </a:p>
+          <a:p>
+            <a:r>
+              <a:rPr lang="de-DE" dirty="0" err="1" smtClean="0"/>
+              <a:t>excellent</a:t>
+            </a:r>
+            <a:r>
+              <a:rPr lang="de-DE" dirty="0" smtClean="0"/>
+              <a:t> </a:t>
+            </a:r>
+            <a:r>
+              <a:rPr lang="de-DE" dirty="0" err="1" smtClean="0"/>
+              <a:t>results</a:t>
+            </a:r>
+            <a:r>
+              <a:rPr lang="de-DE" dirty="0" smtClean="0"/>
+              <a:t> </a:t>
+            </a:r>
+            <a:r>
+              <a:rPr lang="de-DE" dirty="0" err="1" smtClean="0"/>
+              <a:t>with</a:t>
+            </a:r>
+            <a:r>
+              <a:rPr lang="de-DE" dirty="0" smtClean="0"/>
+              <a:t> </a:t>
+            </a:r>
+            <a:r>
+              <a:rPr lang="de-DE" dirty="0" err="1" smtClean="0"/>
+              <a:t>the</a:t>
+            </a:r>
+            <a:r>
+              <a:rPr lang="de-DE" dirty="0" smtClean="0"/>
+              <a:t> </a:t>
+            </a:r>
+            <a:r>
+              <a:rPr lang="de-DE" dirty="0" err="1" smtClean="0"/>
+              <a:t>new</a:t>
+            </a:r>
+            <a:r>
+              <a:rPr lang="de-DE" dirty="0" smtClean="0"/>
+              <a:t> </a:t>
+            </a:r>
+            <a:r>
+              <a:rPr lang="de-DE" dirty="0" err="1" smtClean="0"/>
+              <a:t>random</a:t>
+            </a:r>
+            <a:r>
+              <a:rPr lang="de-DE" dirty="0" smtClean="0"/>
+              <a:t> </a:t>
+            </a:r>
+            <a:r>
+              <a:rPr lang="de-DE" dirty="0" err="1" smtClean="0"/>
+              <a:t>forest</a:t>
+            </a:r>
+            <a:r>
+              <a:rPr lang="de-DE" dirty="0" smtClean="0"/>
+              <a:t> </a:t>
+            </a:r>
+            <a:r>
+              <a:rPr lang="de-DE" dirty="0" err="1" smtClean="0"/>
               <a:t>one</a:t>
             </a:r>
             <a:r>
-              <a:rPr lang="de-DE" dirty="0" err="1" smtClean="0"/>
-              <a:t>-</a:t>
+              <a:rPr lang="de-DE" dirty="0" smtClean="0"/>
+              <a:t> </a:t>
             </a:r>
             <a:r>
               <a:rPr lang="de-DE" dirty="0" err="1" smtClean="0"/>
@@ -27921,125 +28144,6 @@
             </a:r>
             <a:r>
               <a:rPr lang="de-DE" dirty="0" smtClean="0"/>
-              <a:t>- </a:t>
-            </a:r>
-            <a:r>
-              <a:rPr lang="de-DE" dirty="0" err="1" smtClean="0"/>
-              <a:t>classifiers</a:t>
-            </a:r>
-            <a:r>
-              <a:rPr lang="de-DE" dirty="0" smtClean="0"/>
-              <a:t> </a:t>
-            </a:r>
-            <a:r>
-              <a:rPr lang="de-DE" dirty="0" err="1" smtClean="0"/>
-              <a:t>for</a:t>
-            </a:r>
-            <a:r>
-              <a:rPr lang="de-DE" dirty="0" smtClean="0"/>
-              <a:t> </a:t>
-            </a:r>
-            <a:r>
-              <a:rPr lang="de-DE" dirty="0" err="1" smtClean="0"/>
-              <a:t>the</a:t>
-            </a:r>
-            <a:r>
-              <a:rPr lang="de-DE" dirty="0" smtClean="0"/>
-              <a:t> </a:t>
-            </a:r>
-            <a:r>
-              <a:rPr lang="de-DE" dirty="0" err="1" smtClean="0"/>
-              <a:t>roller</a:t>
-            </a:r>
-            <a:r>
-              <a:rPr lang="de-DE" dirty="0" smtClean="0"/>
-              <a:t> </a:t>
-            </a:r>
-            <a:r>
-              <a:rPr lang="de-DE" dirty="0" err="1" smtClean="0"/>
-              <a:t>bearing</a:t>
-            </a:r>
-            <a:r>
-              <a:rPr lang="de-DE" dirty="0" smtClean="0"/>
-              <a:t> </a:t>
-            </a:r>
-            <a:r>
-              <a:rPr lang="de-DE" dirty="0" err="1" smtClean="0"/>
-              <a:t>dataset</a:t>
-            </a:r>
-            <a:endParaRPr lang="de-DE" dirty="0" smtClean="0"/>
-          </a:p>
-          <a:p>
-            <a:r>
-              <a:rPr lang="de-DE" dirty="0" err="1" smtClean="0"/>
-              <a:t>excellent</a:t>
-            </a:r>
-            <a:r>
-              <a:rPr lang="de-DE" dirty="0" smtClean="0"/>
-              <a:t> </a:t>
-            </a:r>
-            <a:r>
-              <a:rPr lang="de-DE" dirty="0" err="1" smtClean="0"/>
-              <a:t>results</a:t>
-            </a:r>
-            <a:r>
-              <a:rPr lang="de-DE" dirty="0" smtClean="0"/>
-              <a:t> </a:t>
-            </a:r>
-            <a:r>
-              <a:rPr lang="de-DE" dirty="0" err="1" smtClean="0"/>
-              <a:t>with</a:t>
-            </a:r>
-            <a:r>
-              <a:rPr lang="de-DE" dirty="0" smtClean="0"/>
-              <a:t> </a:t>
-            </a:r>
-            <a:r>
-              <a:rPr lang="de-DE" dirty="0" err="1" smtClean="0"/>
-              <a:t>the</a:t>
-            </a:r>
-            <a:r>
-              <a:rPr lang="de-DE" dirty="0" smtClean="0"/>
-              <a:t> </a:t>
-            </a:r>
-            <a:r>
-              <a:rPr lang="de-DE" dirty="0" err="1" smtClean="0"/>
-              <a:t>new</a:t>
-            </a:r>
-            <a:r>
-              <a:rPr lang="de-DE" dirty="0" smtClean="0"/>
-              <a:t> </a:t>
-            </a:r>
-            <a:r>
-              <a:rPr lang="de-DE" dirty="0" err="1" smtClean="0"/>
-              <a:t>random</a:t>
-            </a:r>
-            <a:r>
-              <a:rPr lang="de-DE" dirty="0" smtClean="0"/>
-              <a:t> </a:t>
-            </a:r>
-            <a:r>
-              <a:rPr lang="de-DE" dirty="0" err="1" smtClean="0"/>
-              <a:t>forest</a:t>
-            </a:r>
-            <a:r>
-              <a:rPr lang="de-DE" dirty="0" smtClean="0"/>
-              <a:t> </a:t>
-            </a:r>
-            <a:r>
-              <a:rPr lang="de-DE" dirty="0" err="1" smtClean="0"/>
-              <a:t>one</a:t>
-            </a:r>
-            <a:r>
-              <a:rPr lang="de-DE" dirty="0" smtClean="0"/>
-              <a:t> </a:t>
-            </a:r>
-            <a:r>
-              <a:rPr lang="de-DE" dirty="0" err="1" smtClean="0"/>
-              <a:t>class</a:t>
-            </a:r>
-            <a:r>
-              <a:rPr lang="de-DE" dirty="0" smtClean="0"/>
               <a:t> </a:t>
             </a:r>
             <a:r>
@@ -28128,7 +28232,6 @@
               <a:rPr lang="de-DE" dirty="0" smtClean="0"/>
               <a:t>)</a:t>
             </a:r>
-            <a:endParaRPr lang="de-DE" dirty="0" smtClean="0"/>
           </a:p>
           <a:p>
             <a:r>
@@ -28205,7 +28308,7 @@
             <a:fld id="{03B44CDA-7D88-4264-B0E0-D9AD28CBE73B}" type="datetime1">
               <a:rPr lang="de-DE" smtClean="0"/>
               <a:pPr/>
-              <a:t>23.07.2013</a:t>
+              <a:t>24.07.2013</a:t>
             </a:fld>
             <a:endParaRPr lang="de-DE"/>
           </a:p>
@@ -28551,7 +28654,6 @@
               <a:rPr lang="de-DE" dirty="0" smtClean="0"/>
               <a:t>)</a:t>
             </a:r>
-            <a:endParaRPr lang="de-DE" dirty="0" smtClean="0"/>
           </a:p>
           <a:p>
             <a:endParaRPr lang="de-DE" dirty="0"/>
@@ -28631,7 +28733,7 @@
             <a:fld id="{03B44CDA-7D88-4264-B0E0-D9AD28CBE73B}" type="datetime1">
               <a:rPr lang="de-DE" smtClean="0"/>
               <a:pPr/>
-              <a:t>23.07.2013</a:t>
+              <a:t>24.07.2013</a:t>
             </a:fld>
             <a:endParaRPr lang="de-DE"/>
           </a:p>
@@ -28849,7 +28951,7 @@
             <a:fld id="{03B44CDA-7D88-4264-B0E0-D9AD28CBE73B}" type="datetime1">
               <a:rPr lang="de-DE" smtClean="0"/>
               <a:pPr/>
-              <a:t>23.07.2013</a:t>
+              <a:t>24.07.2013</a:t>
             </a:fld>
             <a:endParaRPr lang="de-DE"/>
           </a:p>
@@ -29038,11 +29140,7 @@
             </a:r>
             <a:r>
               <a:rPr lang="de-DE" dirty="0" smtClean="0"/>
-              <a:t> </a:t>
-            </a:r>
-            <a:r>
-              <a:rPr lang="de-DE" dirty="0" smtClean="0"/>
-              <a:t>(</a:t>
+              <a:t> (</a:t>
             </a:r>
             <a:r>
               <a:rPr lang="de-DE" dirty="0" err="1" smtClean="0"/>
@@ -29219,7 +29317,7 @@
             <a:fld id="{03B44CDA-7D88-4264-B0E0-D9AD28CBE73B}" type="datetime1">
               <a:rPr lang="de-DE" smtClean="0"/>
               <a:pPr/>
-              <a:t>23.07.2013</a:t>
+              <a:t>24.07.2013</a:t>
             </a:fld>
             <a:endParaRPr lang="de-DE"/>
           </a:p>
@@ -29388,7 +29486,7 @@
             <a:fld id="{3445AF6D-F46D-415C-AD3E-77E0038AE70E}" type="datetime1">
               <a:rPr lang="de-DE" smtClean="0"/>
               <a:pPr/>
-              <a:t>23.07.2013</a:t>
+              <a:t>24.07.2013</a:t>
             </a:fld>
             <a:endParaRPr lang="de-DE"/>
           </a:p>
@@ -30013,7 +30111,7 @@
             <a:fld id="{3445AF6D-F46D-415C-AD3E-77E0038AE70E}" type="datetime1">
               <a:rPr lang="de-DE" smtClean="0"/>
               <a:pPr/>
-              <a:t>23.07.2013</a:t>
+              <a:t>24.07.2013</a:t>
             </a:fld>
             <a:endParaRPr lang="de-DE"/>
           </a:p>
@@ -30464,7 +30562,7 @@
             <a:fld id="{1F1E0E69-EC8C-4B55-B000-A21B4F200C17}" type="datetime1">
               <a:rPr lang="de-DE" smtClean="0"/>
               <a:pPr/>
-              <a:t>23.07.2013</a:t>
+              <a:t>24.07.2013</a:t>
             </a:fld>
             <a:endParaRPr lang="de-DE"/>
           </a:p>
@@ -30561,6 +30659,13 @@
   <p:clrMapOvr>
     <a:masterClrMapping/>
   </p:clrMapOvr>
+  <p:timing>
+    <p:tnLst>
+      <p:par>
+        <p:cTn id="1" dur="indefinite" restart="never" nodeType="tmRoot"/>
+      </p:par>
+    </p:tnLst>
+  </p:timing>
 </p:sld>
 </file>
 
@@ -30748,7 +30853,7 @@
             <a:fld id="{03B44CDA-7D88-4264-B0E0-D9AD28CBE73B}" type="datetime1">
               <a:rPr lang="de-DE" smtClean="0"/>
               <a:pPr/>
-              <a:t>23.07.2013</a:t>
+              <a:t>24.07.2013</a:t>
             </a:fld>
             <a:endParaRPr lang="de-DE"/>
           </a:p>

</xml_diff>